<commit_message>
4.1 done, could add text
</commit_message>
<xml_diff>
--- a/Title Designs/Title Designs.pptx
+++ b/Title Designs/Title Designs.pptx
@@ -290,7 +290,7 @@
           <a:p>
             <a:fld id="{9F6A7E55-DFC4-46CD-9865-1BDB80A917C9}" type="datetimeFigureOut">
               <a:rPr lang="en-US" smtClean="0"/>
-              <a:t>8/12/2021</a:t>
+              <a:t>8/16/2021</a:t>
             </a:fld>
             <a:endParaRPr lang="en-US"/>
           </a:p>
@@ -488,7 +488,7 @@
           <a:p>
             <a:fld id="{9F6A7E55-DFC4-46CD-9865-1BDB80A917C9}" type="datetimeFigureOut">
               <a:rPr lang="en-US" smtClean="0"/>
-              <a:t>8/12/2021</a:t>
+              <a:t>8/16/2021</a:t>
             </a:fld>
             <a:endParaRPr lang="en-US"/>
           </a:p>
@@ -696,7 +696,7 @@
           <a:p>
             <a:fld id="{9F6A7E55-DFC4-46CD-9865-1BDB80A917C9}" type="datetimeFigureOut">
               <a:rPr lang="en-US" smtClean="0"/>
-              <a:t>8/12/2021</a:t>
+              <a:t>8/16/2021</a:t>
             </a:fld>
             <a:endParaRPr lang="en-US"/>
           </a:p>
@@ -894,7 +894,7 @@
           <a:p>
             <a:fld id="{9F6A7E55-DFC4-46CD-9865-1BDB80A917C9}" type="datetimeFigureOut">
               <a:rPr lang="en-US" smtClean="0"/>
-              <a:t>8/12/2021</a:t>
+              <a:t>8/16/2021</a:t>
             </a:fld>
             <a:endParaRPr lang="en-US"/>
           </a:p>
@@ -1169,7 +1169,7 @@
           <a:p>
             <a:fld id="{9F6A7E55-DFC4-46CD-9865-1BDB80A917C9}" type="datetimeFigureOut">
               <a:rPr lang="en-US" smtClean="0"/>
-              <a:t>8/12/2021</a:t>
+              <a:t>8/16/2021</a:t>
             </a:fld>
             <a:endParaRPr lang="en-US"/>
           </a:p>
@@ -1434,7 +1434,7 @@
           <a:p>
             <a:fld id="{9F6A7E55-DFC4-46CD-9865-1BDB80A917C9}" type="datetimeFigureOut">
               <a:rPr lang="en-US" smtClean="0"/>
-              <a:t>8/12/2021</a:t>
+              <a:t>8/16/2021</a:t>
             </a:fld>
             <a:endParaRPr lang="en-US"/>
           </a:p>
@@ -1846,7 +1846,7 @@
           <a:p>
             <a:fld id="{9F6A7E55-DFC4-46CD-9865-1BDB80A917C9}" type="datetimeFigureOut">
               <a:rPr lang="en-US" smtClean="0"/>
-              <a:t>8/12/2021</a:t>
+              <a:t>8/16/2021</a:t>
             </a:fld>
             <a:endParaRPr lang="en-US"/>
           </a:p>
@@ -1987,7 +1987,7 @@
           <a:p>
             <a:fld id="{9F6A7E55-DFC4-46CD-9865-1BDB80A917C9}" type="datetimeFigureOut">
               <a:rPr lang="en-US" smtClean="0"/>
-              <a:t>8/12/2021</a:t>
+              <a:t>8/16/2021</a:t>
             </a:fld>
             <a:endParaRPr lang="en-US"/>
           </a:p>
@@ -2100,7 +2100,7 @@
           <a:p>
             <a:fld id="{9F6A7E55-DFC4-46CD-9865-1BDB80A917C9}" type="datetimeFigureOut">
               <a:rPr lang="en-US" smtClean="0"/>
-              <a:t>8/12/2021</a:t>
+              <a:t>8/16/2021</a:t>
             </a:fld>
             <a:endParaRPr lang="en-US"/>
           </a:p>
@@ -2411,7 +2411,7 @@
           <a:p>
             <a:fld id="{9F6A7E55-DFC4-46CD-9865-1BDB80A917C9}" type="datetimeFigureOut">
               <a:rPr lang="en-US" smtClean="0"/>
-              <a:t>8/12/2021</a:t>
+              <a:t>8/16/2021</a:t>
             </a:fld>
             <a:endParaRPr lang="en-US"/>
           </a:p>
@@ -2699,7 +2699,7 @@
           <a:p>
             <a:fld id="{9F6A7E55-DFC4-46CD-9865-1BDB80A917C9}" type="datetimeFigureOut">
               <a:rPr lang="en-US" smtClean="0"/>
-              <a:t>8/12/2021</a:t>
+              <a:t>8/16/2021</a:t>
             </a:fld>
             <a:endParaRPr lang="en-US"/>
           </a:p>
@@ -2940,7 +2940,7 @@
           <a:p>
             <a:fld id="{9F6A7E55-DFC4-46CD-9865-1BDB80A917C9}" type="datetimeFigureOut">
               <a:rPr lang="en-US" smtClean="0"/>
-              <a:t>8/12/2021</a:t>
+              <a:t>8/16/2021</a:t>
             </a:fld>
             <a:endParaRPr lang="en-US"/>
           </a:p>
@@ -8027,8 +8027,23 @@
                 </a:solidFill>
                 <a:latin typeface="Palatino Linotype" panose="02040502050505030304" pitchFamily="18" charset="0"/>
               </a:rPr>
-              <a:t>4.1 Crystallizer</a:t>
-            </a:r>
+              <a:t>4.1 Introduction to Solids and </a:t>
+            </a:r>
+            <a:r>
+              <a:rPr lang="en-US" sz="3200">
+                <a:solidFill>
+                  <a:srgbClr val="4D4E53"/>
+                </a:solidFill>
+                <a:latin typeface="Palatino Linotype" panose="02040502050505030304" pitchFamily="18" charset="0"/>
+              </a:rPr>
+              <a:t>Solid Separators</a:t>
+            </a:r>
+            <a:endParaRPr lang="en-US" sz="3200" dirty="0">
+              <a:solidFill>
+                <a:srgbClr val="4D4E53"/>
+              </a:solidFill>
+              <a:latin typeface="Palatino Linotype" panose="02040502050505030304" pitchFamily="18" charset="0"/>
+            </a:endParaRPr>
           </a:p>
         </p:txBody>
       </p:sp>

</xml_diff>

<commit_message>
module 4 title designs; 4.1 video small change
</commit_message>
<xml_diff>
--- a/Title Designs/Title Designs.pptx
+++ b/Title Designs/Title Designs.pptx
@@ -9,23 +9,27 @@
     <p:sldId id="272" r:id="rId3"/>
     <p:sldId id="273" r:id="rId4"/>
     <p:sldId id="274" r:id="rId5"/>
-    <p:sldId id="275" r:id="rId6"/>
-    <p:sldId id="277" r:id="rId7"/>
-    <p:sldId id="278" r:id="rId8"/>
-    <p:sldId id="279" r:id="rId9"/>
-    <p:sldId id="276" r:id="rId10"/>
-    <p:sldId id="280" r:id="rId11"/>
-    <p:sldId id="281" r:id="rId12"/>
-    <p:sldId id="287" r:id="rId13"/>
-    <p:sldId id="282" r:id="rId14"/>
-    <p:sldId id="267" r:id="rId15"/>
-    <p:sldId id="268" r:id="rId16"/>
-    <p:sldId id="269" r:id="rId17"/>
-    <p:sldId id="283" r:id="rId18"/>
-    <p:sldId id="284" r:id="rId19"/>
-    <p:sldId id="285" r:id="rId20"/>
-    <p:sldId id="270" r:id="rId21"/>
-    <p:sldId id="286" r:id="rId22"/>
+    <p:sldId id="288" r:id="rId6"/>
+    <p:sldId id="289" r:id="rId7"/>
+    <p:sldId id="290" r:id="rId8"/>
+    <p:sldId id="291" r:id="rId9"/>
+    <p:sldId id="275" r:id="rId10"/>
+    <p:sldId id="277" r:id="rId11"/>
+    <p:sldId id="278" r:id="rId12"/>
+    <p:sldId id="279" r:id="rId13"/>
+    <p:sldId id="276" r:id="rId14"/>
+    <p:sldId id="280" r:id="rId15"/>
+    <p:sldId id="281" r:id="rId16"/>
+    <p:sldId id="287" r:id="rId17"/>
+    <p:sldId id="282" r:id="rId18"/>
+    <p:sldId id="267" r:id="rId19"/>
+    <p:sldId id="268" r:id="rId20"/>
+    <p:sldId id="269" r:id="rId21"/>
+    <p:sldId id="283" r:id="rId22"/>
+    <p:sldId id="284" r:id="rId23"/>
+    <p:sldId id="285" r:id="rId24"/>
+    <p:sldId id="270" r:id="rId25"/>
+    <p:sldId id="286" r:id="rId26"/>
   </p:sldIdLst>
   <p:sldSz cx="12192000" cy="6858000"/>
   <p:notesSz cx="6858000" cy="9144000"/>
@@ -3701,7 +3705,7 @@
               <a:rPr lang="en-US" sz="4400" dirty="0">
                 <a:latin typeface="Franklin Gothic Demi" panose="020B0703020102020204" pitchFamily="34" charset="0"/>
               </a:rPr>
-              <a:t>Chapter 6: Pressure Changers</a:t>
+              <a:t>Chapter 5: Heat Exchangers</a:t>
             </a:r>
           </a:p>
         </p:txBody>
@@ -3745,7 +3749,7 @@
                 </a:solidFill>
                 <a:latin typeface="Palatino Linotype" panose="02040502050505030304" pitchFamily="18" charset="0"/>
               </a:rPr>
-              <a:t>6.2 Compressors</a:t>
+              <a:t>5.2 Rigorous Heat Exchanger Model</a:t>
             </a:r>
           </a:p>
         </p:txBody>
@@ -3948,7 +3952,7 @@
     </p:spTree>
     <p:extLst>
       <p:ext uri="{BB962C8B-B14F-4D97-AF65-F5344CB8AC3E}">
-        <p14:creationId xmlns:p14="http://schemas.microsoft.com/office/powerpoint/2010/main" val="2022873747"/>
+        <p14:creationId xmlns:p14="http://schemas.microsoft.com/office/powerpoint/2010/main" val="3094772626"/>
       </p:ext>
     </p:extLst>
   </p:cSld>
@@ -4010,7 +4014,7 @@
               <a:rPr lang="en-US" sz="4400" dirty="0">
                 <a:latin typeface="Franklin Gothic Demi" panose="020B0703020102020204" pitchFamily="34" charset="0"/>
               </a:rPr>
-              <a:t>Chapter 6: Pressure Changers</a:t>
+              <a:t>Chapter 5: Heat Exchangers</a:t>
             </a:r>
           </a:p>
         </p:txBody>
@@ -4054,7 +4058,7 @@
                 </a:solidFill>
                 <a:latin typeface="Palatino Linotype" panose="02040502050505030304" pitchFamily="18" charset="0"/>
               </a:rPr>
-              <a:t>6.3 Pipes</a:t>
+              <a:t>5.3 Heat Model</a:t>
             </a:r>
           </a:p>
         </p:txBody>
@@ -4257,7 +4261,7 @@
     </p:spTree>
     <p:extLst>
       <p:ext uri="{BB962C8B-B14F-4D97-AF65-F5344CB8AC3E}">
-        <p14:creationId xmlns:p14="http://schemas.microsoft.com/office/powerpoint/2010/main" val="80787561"/>
+        <p14:creationId xmlns:p14="http://schemas.microsoft.com/office/powerpoint/2010/main" val="3351130367"/>
       </p:ext>
     </p:extLst>
   </p:cSld>
@@ -4319,7 +4323,7 @@
               <a:rPr lang="en-US" sz="4400" dirty="0">
                 <a:latin typeface="Franklin Gothic Demi" panose="020B0703020102020204" pitchFamily="34" charset="0"/>
               </a:rPr>
-              <a:t>Chapter 6: Pressure Changers</a:t>
+              <a:t>Chapter 5: Heat Exchangers</a:t>
             </a:r>
           </a:p>
         </p:txBody>
@@ -4363,7 +4367,7 @@
                 </a:solidFill>
                 <a:latin typeface="Palatino Linotype" panose="02040502050505030304" pitchFamily="18" charset="0"/>
               </a:rPr>
-              <a:t>6.4 Valves</a:t>
+              <a:t>5.4 Ethyl Acetate Plant Heat Exchanger</a:t>
             </a:r>
           </a:p>
         </p:txBody>
@@ -4566,7 +4570,7 @@
     </p:spTree>
     <p:extLst>
       <p:ext uri="{BB962C8B-B14F-4D97-AF65-F5344CB8AC3E}">
-        <p14:creationId xmlns:p14="http://schemas.microsoft.com/office/powerpoint/2010/main" val="149539290"/>
+        <p14:creationId xmlns:p14="http://schemas.microsoft.com/office/powerpoint/2010/main" val="2001936663"/>
       </p:ext>
     </p:extLst>
   </p:cSld>
@@ -4672,7 +4676,7 @@
                 </a:solidFill>
                 <a:latin typeface="Palatino Linotype" panose="02040502050505030304" pitchFamily="18" charset="0"/>
               </a:rPr>
-              <a:t>6.5 Ethyl Acetate Plant Pressure Changers</a:t>
+              <a:t>6.1 Pumps</a:t>
             </a:r>
           </a:p>
         </p:txBody>
@@ -4875,7 +4879,7 @@
     </p:spTree>
     <p:extLst>
       <p:ext uri="{BB962C8B-B14F-4D97-AF65-F5344CB8AC3E}">
-        <p14:creationId xmlns:p14="http://schemas.microsoft.com/office/powerpoint/2010/main" val="42729710"/>
+        <p14:creationId xmlns:p14="http://schemas.microsoft.com/office/powerpoint/2010/main" val="594451192"/>
       </p:ext>
     </p:extLst>
   </p:cSld>
@@ -4920,7 +4924,7 @@
         </p:nvSpPr>
         <p:spPr>
           <a:xfrm>
-            <a:off x="144780" y="5016877"/>
+            <a:off x="144779" y="4786090"/>
             <a:ext cx="11902439" cy="1246495"/>
           </a:xfrm>
           <a:ln>
@@ -4937,17 +4941,17 @@
               <a:rPr lang="en-US" sz="4400" dirty="0">
                 <a:latin typeface="Franklin Gothic Demi" panose="020B0703020102020204" pitchFamily="34" charset="0"/>
               </a:rPr>
-              <a:t>Chapter 7: Ethyl Acetate Production Plant</a:t>
-            </a:r>
-          </a:p>
-        </p:txBody>
-      </p:sp>
-      <p:sp>
-        <p:nvSpPr>
-          <p:cNvPr id="12" name="TextBox 11">
-            <a:extLst>
-              <a:ext uri="{FF2B5EF4-FFF2-40B4-BE49-F238E27FC236}">
-                <a16:creationId xmlns:a16="http://schemas.microsoft.com/office/drawing/2014/main" id="{65EFFB45-2256-41F0-B651-136B5ECC47D8}"/>
+              <a:t>Chapter 6: Pressure Changers</a:t>
+            </a:r>
+          </a:p>
+        </p:txBody>
+      </p:sp>
+      <p:sp>
+        <p:nvSpPr>
+          <p:cNvPr id="13" name="TextBox 12">
+            <a:extLst>
+              <a:ext uri="{FF2B5EF4-FFF2-40B4-BE49-F238E27FC236}">
+                <a16:creationId xmlns:a16="http://schemas.microsoft.com/office/drawing/2014/main" id="{CB9CFEEB-613D-4ADB-AB7E-7E2D4DA2BB5E}"/>
               </a:ext>
             </a:extLst>
           </p:cNvPr>
@@ -4956,7 +4960,51 @@
         </p:nvSpPr>
         <p:spPr>
           <a:xfrm>
-            <a:off x="144780" y="3875157"/>
+            <a:off x="144779" y="5815591"/>
+            <a:ext cx="11902439" cy="584775"/>
+          </a:xfrm>
+          <a:prstGeom prst="rect">
+            <a:avLst/>
+          </a:prstGeom>
+          <a:noFill/>
+          <a:ln>
+            <a:noFill/>
+          </a:ln>
+        </p:spPr>
+        <p:txBody>
+          <a:bodyPr wrap="square" rtlCol="0" anchor="ctr">
+            <a:spAutoFit/>
+          </a:bodyPr>
+          <a:lstStyle/>
+          <a:p>
+            <a:pPr algn="ctr"/>
+            <a:r>
+              <a:rPr lang="en-US" sz="3200" dirty="0">
+                <a:solidFill>
+                  <a:srgbClr val="4D4E53"/>
+                </a:solidFill>
+                <a:latin typeface="Palatino Linotype" panose="02040502050505030304" pitchFamily="18" charset="0"/>
+              </a:rPr>
+              <a:t>6.2 Compressors</a:t>
+            </a:r>
+          </a:p>
+        </p:txBody>
+      </p:sp>
+      <p:sp>
+        <p:nvSpPr>
+          <p:cNvPr id="12" name="TextBox 11">
+            <a:extLst>
+              <a:ext uri="{FF2B5EF4-FFF2-40B4-BE49-F238E27FC236}">
+                <a16:creationId xmlns:a16="http://schemas.microsoft.com/office/drawing/2014/main" id="{65EFFB45-2256-41F0-B651-136B5ECC47D8}"/>
+              </a:ext>
+            </a:extLst>
+          </p:cNvPr>
+          <p:cNvSpPr txBox="1"/>
+          <p:nvPr/>
+        </p:nvSpPr>
+        <p:spPr>
+          <a:xfrm>
+            <a:off x="144780" y="3770382"/>
             <a:ext cx="11902439" cy="1246495"/>
           </a:xfrm>
           <a:prstGeom prst="rect">
@@ -5119,7 +5167,7 @@
         </p:blipFill>
         <p:spPr bwMode="auto">
           <a:xfrm>
-            <a:off x="4046773" y="1489242"/>
+            <a:off x="4046773" y="1451142"/>
             <a:ext cx="4022254" cy="2262518"/>
           </a:xfrm>
           <a:prstGeom prst="rect">
@@ -5140,7 +5188,7 @@
     </p:spTree>
     <p:extLst>
       <p:ext uri="{BB962C8B-B14F-4D97-AF65-F5344CB8AC3E}">
-        <p14:creationId xmlns:p14="http://schemas.microsoft.com/office/powerpoint/2010/main" val="3807671136"/>
+        <p14:creationId xmlns:p14="http://schemas.microsoft.com/office/powerpoint/2010/main" val="2022873747"/>
       </p:ext>
     </p:extLst>
   </p:cSld>
@@ -5202,7 +5250,7 @@
               <a:rPr lang="en-US" sz="4400" dirty="0">
                 <a:latin typeface="Franklin Gothic Demi" panose="020B0703020102020204" pitchFamily="34" charset="0"/>
               </a:rPr>
-              <a:t>Chapter 8: Batch Models</a:t>
+              <a:t>Chapter 6: Pressure Changers</a:t>
             </a:r>
           </a:p>
         </p:txBody>
@@ -5246,7 +5294,7 @@
                 </a:solidFill>
                 <a:latin typeface="Palatino Linotype" panose="02040502050505030304" pitchFamily="18" charset="0"/>
               </a:rPr>
-              <a:t>8.1 Batch Reactors</a:t>
+              <a:t>6.3 Pipes</a:t>
             </a:r>
           </a:p>
         </p:txBody>
@@ -5449,7 +5497,7 @@
     </p:spTree>
     <p:extLst>
       <p:ext uri="{BB962C8B-B14F-4D97-AF65-F5344CB8AC3E}">
-        <p14:creationId xmlns:p14="http://schemas.microsoft.com/office/powerpoint/2010/main" val="1611154029"/>
+        <p14:creationId xmlns:p14="http://schemas.microsoft.com/office/powerpoint/2010/main" val="80787561"/>
       </p:ext>
     </p:extLst>
   </p:cSld>
@@ -5511,7 +5559,7 @@
               <a:rPr lang="en-US" sz="4400" dirty="0">
                 <a:latin typeface="Franklin Gothic Demi" panose="020B0703020102020204" pitchFamily="34" charset="0"/>
               </a:rPr>
-              <a:t>Chapter 9: Advanced Principles of Aspen Plus</a:t>
+              <a:t>Chapter 6: Pressure Changers</a:t>
             </a:r>
           </a:p>
         </p:txBody>
@@ -5530,8 +5578,8 @@
         </p:nvSpPr>
         <p:spPr>
           <a:xfrm>
-            <a:off x="144779" y="5838675"/>
-            <a:ext cx="11902439" cy="538609"/>
+            <a:off x="144779" y="5815591"/>
+            <a:ext cx="11902439" cy="584775"/>
           </a:xfrm>
           <a:prstGeom prst="rect">
             <a:avLst/>
@@ -5549,13 +5597,13 @@
           <a:p>
             <a:pPr algn="ctr"/>
             <a:r>
-              <a:rPr lang="en-US" sz="2800" dirty="0">
+              <a:rPr lang="en-US" sz="3200" dirty="0">
                 <a:solidFill>
                   <a:srgbClr val="4D4E53"/>
                 </a:solidFill>
                 <a:latin typeface="Palatino Linotype" panose="02040502050505030304" pitchFamily="18" charset="0"/>
               </a:rPr>
-              <a:t>9.1 Finding Thermophysical Properties and Generating TXY Diagrams</a:t>
+              <a:t>6.4 Valves</a:t>
             </a:r>
           </a:p>
         </p:txBody>
@@ -5758,7 +5806,7 @@
     </p:spTree>
     <p:extLst>
       <p:ext uri="{BB962C8B-B14F-4D97-AF65-F5344CB8AC3E}">
-        <p14:creationId xmlns:p14="http://schemas.microsoft.com/office/powerpoint/2010/main" val="3160527228"/>
+        <p14:creationId xmlns:p14="http://schemas.microsoft.com/office/powerpoint/2010/main" val="149539290"/>
       </p:ext>
     </p:extLst>
   </p:cSld>
@@ -5820,7 +5868,7 @@
               <a:rPr lang="en-US" sz="4400" dirty="0">
                 <a:latin typeface="Franklin Gothic Demi" panose="020B0703020102020204" pitchFamily="34" charset="0"/>
               </a:rPr>
-              <a:t>Chapter 9: Advanced Principles of Aspen Plus</a:t>
+              <a:t>Chapter 6: Pressure Changers</a:t>
             </a:r>
           </a:p>
         </p:txBody>
@@ -5839,7 +5887,7 @@
         </p:nvSpPr>
         <p:spPr>
           <a:xfrm>
-            <a:off x="144779" y="5815592"/>
+            <a:off x="144779" y="5815591"/>
             <a:ext cx="11902439" cy="584775"/>
           </a:xfrm>
           <a:prstGeom prst="rect">
@@ -5864,7 +5912,7 @@
                 </a:solidFill>
                 <a:latin typeface="Palatino Linotype" panose="02040502050505030304" pitchFamily="18" charset="0"/>
               </a:rPr>
-              <a:t>9.2 Running a Sensitivity Analysis</a:t>
+              <a:t>6.5 Ethyl Acetate Plant Pressure Changers</a:t>
             </a:r>
           </a:p>
         </p:txBody>
@@ -6067,7 +6115,7 @@
     </p:spTree>
     <p:extLst>
       <p:ext uri="{BB962C8B-B14F-4D97-AF65-F5344CB8AC3E}">
-        <p14:creationId xmlns:p14="http://schemas.microsoft.com/office/powerpoint/2010/main" val="3453843008"/>
+        <p14:creationId xmlns:p14="http://schemas.microsoft.com/office/powerpoint/2010/main" val="42729710"/>
       </p:ext>
     </p:extLst>
   </p:cSld>
@@ -6112,7 +6160,7 @@
         </p:nvSpPr>
         <p:spPr>
           <a:xfrm>
-            <a:off x="144779" y="4786090"/>
+            <a:off x="144780" y="5016877"/>
             <a:ext cx="11902439" cy="1246495"/>
           </a:xfrm>
           <a:ln>
@@ -6129,17 +6177,17 @@
               <a:rPr lang="en-US" sz="4400" dirty="0">
                 <a:latin typeface="Franklin Gothic Demi" panose="020B0703020102020204" pitchFamily="34" charset="0"/>
               </a:rPr>
-              <a:t>Chapter 9: Advanced Principles of Aspen Plus</a:t>
-            </a:r>
-          </a:p>
-        </p:txBody>
-      </p:sp>
-      <p:sp>
-        <p:nvSpPr>
-          <p:cNvPr id="13" name="TextBox 12">
-            <a:extLst>
-              <a:ext uri="{FF2B5EF4-FFF2-40B4-BE49-F238E27FC236}">
-                <a16:creationId xmlns:a16="http://schemas.microsoft.com/office/drawing/2014/main" id="{CB9CFEEB-613D-4ADB-AB7E-7E2D4DA2BB5E}"/>
+              <a:t>Chapter 7: Ethyl Acetate Production Plant</a:t>
+            </a:r>
+          </a:p>
+        </p:txBody>
+      </p:sp>
+      <p:sp>
+        <p:nvSpPr>
+          <p:cNvPr id="12" name="TextBox 11">
+            <a:extLst>
+              <a:ext uri="{FF2B5EF4-FFF2-40B4-BE49-F238E27FC236}">
+                <a16:creationId xmlns:a16="http://schemas.microsoft.com/office/drawing/2014/main" id="{65EFFB45-2256-41F0-B651-136B5ECC47D8}"/>
               </a:ext>
             </a:extLst>
           </p:cNvPr>
@@ -6148,51 +6196,7 @@
         </p:nvSpPr>
         <p:spPr>
           <a:xfrm>
-            <a:off x="144779" y="5815592"/>
-            <a:ext cx="11902439" cy="584775"/>
-          </a:xfrm>
-          <a:prstGeom prst="rect">
-            <a:avLst/>
-          </a:prstGeom>
-          <a:noFill/>
-          <a:ln>
-            <a:noFill/>
-          </a:ln>
-        </p:spPr>
-        <p:txBody>
-          <a:bodyPr wrap="square" rtlCol="0" anchor="ctr">
-            <a:spAutoFit/>
-          </a:bodyPr>
-          <a:lstStyle/>
-          <a:p>
-            <a:pPr algn="ctr"/>
-            <a:r>
-              <a:rPr lang="en-US" sz="3200" dirty="0">
-                <a:solidFill>
-                  <a:srgbClr val="4D4E53"/>
-                </a:solidFill>
-                <a:latin typeface="Palatino Linotype" panose="02040502050505030304" pitchFamily="18" charset="0"/>
-              </a:rPr>
-              <a:t>9.3 Design Specifications</a:t>
-            </a:r>
-          </a:p>
-        </p:txBody>
-      </p:sp>
-      <p:sp>
-        <p:nvSpPr>
-          <p:cNvPr id="12" name="TextBox 11">
-            <a:extLst>
-              <a:ext uri="{FF2B5EF4-FFF2-40B4-BE49-F238E27FC236}">
-                <a16:creationId xmlns:a16="http://schemas.microsoft.com/office/drawing/2014/main" id="{65EFFB45-2256-41F0-B651-136B5ECC47D8}"/>
-              </a:ext>
-            </a:extLst>
-          </p:cNvPr>
-          <p:cNvSpPr txBox="1"/>
-          <p:nvPr/>
-        </p:nvSpPr>
-        <p:spPr>
-          <a:xfrm>
-            <a:off x="144780" y="3770382"/>
+            <a:off x="144780" y="3875157"/>
             <a:ext cx="11902439" cy="1246495"/>
           </a:xfrm>
           <a:prstGeom prst="rect">
@@ -6355,7 +6359,7 @@
         </p:blipFill>
         <p:spPr bwMode="auto">
           <a:xfrm>
-            <a:off x="4046773" y="1451142"/>
+            <a:off x="4046773" y="1489242"/>
             <a:ext cx="4022254" cy="2262518"/>
           </a:xfrm>
           <a:prstGeom prst="rect">
@@ -6376,7 +6380,7 @@
     </p:spTree>
     <p:extLst>
       <p:ext uri="{BB962C8B-B14F-4D97-AF65-F5344CB8AC3E}">
-        <p14:creationId xmlns:p14="http://schemas.microsoft.com/office/powerpoint/2010/main" val="1025950290"/>
+        <p14:creationId xmlns:p14="http://schemas.microsoft.com/office/powerpoint/2010/main" val="3807671136"/>
       </p:ext>
     </p:extLst>
   </p:cSld>
@@ -6438,7 +6442,7 @@
               <a:rPr lang="en-US" sz="4400" dirty="0">
                 <a:latin typeface="Franklin Gothic Demi" panose="020B0703020102020204" pitchFamily="34" charset="0"/>
               </a:rPr>
-              <a:t>Chapter 9: Advanced Principles of Aspen Plus</a:t>
+              <a:t>Chapter 8: Batch Models</a:t>
             </a:r>
           </a:p>
         </p:txBody>
@@ -6457,7 +6461,7 @@
         </p:nvSpPr>
         <p:spPr>
           <a:xfrm>
-            <a:off x="144779" y="5815592"/>
+            <a:off x="144779" y="5815591"/>
             <a:ext cx="11902439" cy="584775"/>
           </a:xfrm>
           <a:prstGeom prst="rect">
@@ -6482,7 +6486,7 @@
                 </a:solidFill>
                 <a:latin typeface="Palatino Linotype" panose="02040502050505030304" pitchFamily="18" charset="0"/>
               </a:rPr>
-              <a:t>9.4 Calculator Blocks</a:t>
+              <a:t>8.1 Batch Reactors</a:t>
             </a:r>
           </a:p>
         </p:txBody>
@@ -6685,7 +6689,7 @@
     </p:spTree>
     <p:extLst>
       <p:ext uri="{BB962C8B-B14F-4D97-AF65-F5344CB8AC3E}">
-        <p14:creationId xmlns:p14="http://schemas.microsoft.com/office/powerpoint/2010/main" val="2392678193"/>
+        <p14:creationId xmlns:p14="http://schemas.microsoft.com/office/powerpoint/2010/main" val="1611154029"/>
       </p:ext>
     </p:extLst>
   </p:cSld>
@@ -7056,7 +7060,7 @@
               <a:rPr lang="en-US" sz="4400" dirty="0">
                 <a:latin typeface="Franklin Gothic Demi" panose="020B0703020102020204" pitchFamily="34" charset="0"/>
               </a:rPr>
-              <a:t>Chapter 10: Appendix</a:t>
+              <a:t>Chapter 9: Advanced Principles of Aspen Plus</a:t>
             </a:r>
           </a:p>
         </p:txBody>
@@ -7075,8 +7079,8 @@
         </p:nvSpPr>
         <p:spPr>
           <a:xfrm>
-            <a:off x="144779" y="5815591"/>
-            <a:ext cx="11902439" cy="584775"/>
+            <a:off x="144779" y="5838675"/>
+            <a:ext cx="11902439" cy="538609"/>
           </a:xfrm>
           <a:prstGeom prst="rect">
             <a:avLst/>
@@ -7094,13 +7098,13 @@
           <a:p>
             <a:pPr algn="ctr"/>
             <a:r>
-              <a:rPr lang="en-US" sz="3200" dirty="0">
+              <a:rPr lang="en-US" sz="2800" dirty="0">
                 <a:solidFill>
                   <a:srgbClr val="4D4E53"/>
                 </a:solidFill>
                 <a:latin typeface="Palatino Linotype" panose="02040502050505030304" pitchFamily="18" charset="0"/>
               </a:rPr>
-              <a:t>10.1 Tips and Tricks</a:t>
+              <a:t>9.1 Finding Thermophysical Properties and Generating TXY Diagrams</a:t>
             </a:r>
           </a:p>
         </p:txBody>
@@ -7303,7 +7307,7 @@
     </p:spTree>
     <p:extLst>
       <p:ext uri="{BB962C8B-B14F-4D97-AF65-F5344CB8AC3E}">
-        <p14:creationId xmlns:p14="http://schemas.microsoft.com/office/powerpoint/2010/main" val="598986591"/>
+        <p14:creationId xmlns:p14="http://schemas.microsoft.com/office/powerpoint/2010/main" val="3160527228"/>
       </p:ext>
     </p:extLst>
   </p:cSld>
@@ -7365,7 +7369,7 @@
               <a:rPr lang="en-US" sz="4400" dirty="0">
                 <a:latin typeface="Franklin Gothic Demi" panose="020B0703020102020204" pitchFamily="34" charset="0"/>
               </a:rPr>
-              <a:t>Chapter 10: Appendix</a:t>
+              <a:t>Chapter 9: Advanced Principles of Aspen Plus</a:t>
             </a:r>
           </a:p>
         </p:txBody>
@@ -7384,7 +7388,7 @@
         </p:nvSpPr>
         <p:spPr>
           <a:xfrm>
-            <a:off x="144779" y="5815591"/>
+            <a:off x="144779" y="5815592"/>
             <a:ext cx="11902439" cy="584775"/>
           </a:xfrm>
           <a:prstGeom prst="rect">
@@ -7409,7 +7413,7 @@
                 </a:solidFill>
                 <a:latin typeface="Palatino Linotype" panose="02040502050505030304" pitchFamily="18" charset="0"/>
               </a:rPr>
-              <a:t>10.2 Financial Analysis</a:t>
+              <a:t>9.2 Running a Sensitivity Analysis</a:t>
             </a:r>
           </a:p>
         </p:txBody>
@@ -7612,7 +7616,7 @@
     </p:spTree>
     <p:extLst>
       <p:ext uri="{BB962C8B-B14F-4D97-AF65-F5344CB8AC3E}">
-        <p14:creationId xmlns:p14="http://schemas.microsoft.com/office/powerpoint/2010/main" val="3927957602"/>
+        <p14:creationId xmlns:p14="http://schemas.microsoft.com/office/powerpoint/2010/main" val="3453843008"/>
       </p:ext>
     </p:extLst>
   </p:cSld>
@@ -7622,7 +7626,7 @@
 </p:sld>
 </file>
 
-<file path=ppt/slides/slide3.xml><?xml version="1.0" encoding="utf-8"?>
+<file path=ppt/slides/slide22.xml><?xml version="1.0" encoding="utf-8"?>
 <p:sld xmlns:a="http://schemas.openxmlformats.org/drawingml/2006/main" xmlns:r="http://schemas.openxmlformats.org/officeDocument/2006/relationships" xmlns:p="http://schemas.openxmlformats.org/presentationml/2006/main">
   <p:cSld>
     <p:spTree>
@@ -7674,7 +7678,7 @@
               <a:rPr lang="en-US" sz="4400" dirty="0">
                 <a:latin typeface="Franklin Gothic Demi" panose="020B0703020102020204" pitchFamily="34" charset="0"/>
               </a:rPr>
-              <a:t>Chapter 3: Separators</a:t>
+              <a:t>Chapter 9: Advanced Principles of Aspen Plus</a:t>
             </a:r>
           </a:p>
         </p:txBody>
@@ -7693,7 +7697,7 @@
         </p:nvSpPr>
         <p:spPr>
           <a:xfrm>
-            <a:off x="144779" y="5815591"/>
+            <a:off x="144779" y="5815592"/>
             <a:ext cx="11902439" cy="584775"/>
           </a:xfrm>
           <a:prstGeom prst="rect">
@@ -7718,7 +7722,7 @@
                 </a:solidFill>
                 <a:latin typeface="Palatino Linotype" panose="02040502050505030304" pitchFamily="18" charset="0"/>
               </a:rPr>
-              <a:t>3.1 Flash Separators</a:t>
+              <a:t>9.3 Design Specifications</a:t>
             </a:r>
           </a:p>
         </p:txBody>
@@ -7921,7 +7925,7 @@
     </p:spTree>
     <p:extLst>
       <p:ext uri="{BB962C8B-B14F-4D97-AF65-F5344CB8AC3E}">
-        <p14:creationId xmlns:p14="http://schemas.microsoft.com/office/powerpoint/2010/main" val="2409316716"/>
+        <p14:creationId xmlns:p14="http://schemas.microsoft.com/office/powerpoint/2010/main" val="1025950290"/>
       </p:ext>
     </p:extLst>
   </p:cSld>
@@ -7931,7 +7935,7 @@
 </p:sld>
 </file>
 
-<file path=ppt/slides/slide4.xml><?xml version="1.0" encoding="utf-8"?>
+<file path=ppt/slides/slide23.xml><?xml version="1.0" encoding="utf-8"?>
 <p:sld xmlns:a="http://schemas.openxmlformats.org/drawingml/2006/main" xmlns:r="http://schemas.openxmlformats.org/officeDocument/2006/relationships" xmlns:p="http://schemas.openxmlformats.org/presentationml/2006/main">
   <p:cSld>
     <p:spTree>
@@ -7983,7 +7987,7 @@
               <a:rPr lang="en-US" sz="4400" dirty="0">
                 <a:latin typeface="Franklin Gothic Demi" panose="020B0703020102020204" pitchFamily="34" charset="0"/>
               </a:rPr>
-              <a:t>Chapter 4: Solids and Solid Separators</a:t>
+              <a:t>Chapter 9: Advanced Principles of Aspen Plus</a:t>
             </a:r>
           </a:p>
         </p:txBody>
@@ -8002,7 +8006,7 @@
         </p:nvSpPr>
         <p:spPr>
           <a:xfrm>
-            <a:off x="144779" y="5815591"/>
+            <a:off x="144779" y="5815592"/>
             <a:ext cx="11902439" cy="584775"/>
           </a:xfrm>
           <a:prstGeom prst="rect">
@@ -8027,23 +8031,8 @@
                 </a:solidFill>
                 <a:latin typeface="Palatino Linotype" panose="02040502050505030304" pitchFamily="18" charset="0"/>
               </a:rPr>
-              <a:t>4.1 Introduction to Solids and </a:t>
-            </a:r>
-            <a:r>
-              <a:rPr lang="en-US" sz="3200">
-                <a:solidFill>
-                  <a:srgbClr val="4D4E53"/>
-                </a:solidFill>
-                <a:latin typeface="Palatino Linotype" panose="02040502050505030304" pitchFamily="18" charset="0"/>
-              </a:rPr>
-              <a:t>Solid Separators</a:t>
-            </a:r>
-            <a:endParaRPr lang="en-US" sz="3200" dirty="0">
-              <a:solidFill>
-                <a:srgbClr val="4D4E53"/>
-              </a:solidFill>
-              <a:latin typeface="Palatino Linotype" panose="02040502050505030304" pitchFamily="18" charset="0"/>
-            </a:endParaRPr>
+              <a:t>9.4 Calculator Blocks</a:t>
+            </a:r>
           </a:p>
         </p:txBody>
       </p:sp>
@@ -8245,7 +8234,7 @@
     </p:spTree>
     <p:extLst>
       <p:ext uri="{BB962C8B-B14F-4D97-AF65-F5344CB8AC3E}">
-        <p14:creationId xmlns:p14="http://schemas.microsoft.com/office/powerpoint/2010/main" val="459946364"/>
+        <p14:creationId xmlns:p14="http://schemas.microsoft.com/office/powerpoint/2010/main" val="2392678193"/>
       </p:ext>
     </p:extLst>
   </p:cSld>
@@ -8255,7 +8244,7 @@
 </p:sld>
 </file>
 
-<file path=ppt/slides/slide5.xml><?xml version="1.0" encoding="utf-8"?>
+<file path=ppt/slides/slide24.xml><?xml version="1.0" encoding="utf-8"?>
 <p:sld xmlns:a="http://schemas.openxmlformats.org/drawingml/2006/main" xmlns:r="http://schemas.openxmlformats.org/officeDocument/2006/relationships" xmlns:p="http://schemas.openxmlformats.org/presentationml/2006/main">
   <p:cSld>
     <p:spTree>
@@ -8307,7 +8296,7 @@
               <a:rPr lang="en-US" sz="4400" dirty="0">
                 <a:latin typeface="Franklin Gothic Demi" panose="020B0703020102020204" pitchFamily="34" charset="0"/>
               </a:rPr>
-              <a:t>Chapter 5: Heat Exchangers</a:t>
+              <a:t>Chapter 10: Appendix</a:t>
             </a:r>
           </a:p>
         </p:txBody>
@@ -8351,7 +8340,7 @@
                 </a:solidFill>
                 <a:latin typeface="Palatino Linotype" panose="02040502050505030304" pitchFamily="18" charset="0"/>
               </a:rPr>
-              <a:t>5.1 Shortcut Heat Exchanger Model</a:t>
+              <a:t>10.1 Tips and Tricks</a:t>
             </a:r>
           </a:p>
         </p:txBody>
@@ -8554,7 +8543,7 @@
     </p:spTree>
     <p:extLst>
       <p:ext uri="{BB962C8B-B14F-4D97-AF65-F5344CB8AC3E}">
-        <p14:creationId xmlns:p14="http://schemas.microsoft.com/office/powerpoint/2010/main" val="3914296768"/>
+        <p14:creationId xmlns:p14="http://schemas.microsoft.com/office/powerpoint/2010/main" val="598986591"/>
       </p:ext>
     </p:extLst>
   </p:cSld>
@@ -8564,7 +8553,7 @@
 </p:sld>
 </file>
 
-<file path=ppt/slides/slide6.xml><?xml version="1.0" encoding="utf-8"?>
+<file path=ppt/slides/slide25.xml><?xml version="1.0" encoding="utf-8"?>
 <p:sld xmlns:a="http://schemas.openxmlformats.org/drawingml/2006/main" xmlns:r="http://schemas.openxmlformats.org/officeDocument/2006/relationships" xmlns:p="http://schemas.openxmlformats.org/presentationml/2006/main">
   <p:cSld>
     <p:spTree>
@@ -8616,7 +8605,7 @@
               <a:rPr lang="en-US" sz="4400" dirty="0">
                 <a:latin typeface="Franklin Gothic Demi" panose="020B0703020102020204" pitchFamily="34" charset="0"/>
               </a:rPr>
-              <a:t>Chapter 5: Heat Exchangers</a:t>
+              <a:t>Chapter 10: Appendix</a:t>
             </a:r>
           </a:p>
         </p:txBody>
@@ -8660,7 +8649,7 @@
                 </a:solidFill>
                 <a:latin typeface="Palatino Linotype" panose="02040502050505030304" pitchFamily="18" charset="0"/>
               </a:rPr>
-              <a:t>5.2 Rigorous Heat Exchanger Model</a:t>
+              <a:t>10.2 Financial Analysis</a:t>
             </a:r>
           </a:p>
         </p:txBody>
@@ -8863,7 +8852,7 @@
     </p:spTree>
     <p:extLst>
       <p:ext uri="{BB962C8B-B14F-4D97-AF65-F5344CB8AC3E}">
-        <p14:creationId xmlns:p14="http://schemas.microsoft.com/office/powerpoint/2010/main" val="3094772626"/>
+        <p14:creationId xmlns:p14="http://schemas.microsoft.com/office/powerpoint/2010/main" val="3927957602"/>
       </p:ext>
     </p:extLst>
   </p:cSld>
@@ -8873,7 +8862,7 @@
 </p:sld>
 </file>
 
-<file path=ppt/slides/slide7.xml><?xml version="1.0" encoding="utf-8"?>
+<file path=ppt/slides/slide3.xml><?xml version="1.0" encoding="utf-8"?>
 <p:sld xmlns:a="http://schemas.openxmlformats.org/drawingml/2006/main" xmlns:r="http://schemas.openxmlformats.org/officeDocument/2006/relationships" xmlns:p="http://schemas.openxmlformats.org/presentationml/2006/main">
   <p:cSld>
     <p:spTree>
@@ -8925,7 +8914,7 @@
               <a:rPr lang="en-US" sz="4400" dirty="0">
                 <a:latin typeface="Franklin Gothic Demi" panose="020B0703020102020204" pitchFamily="34" charset="0"/>
               </a:rPr>
-              <a:t>Chapter 5: Heat Exchangers</a:t>
+              <a:t>Chapter 3: Separators</a:t>
             </a:r>
           </a:p>
         </p:txBody>
@@ -8969,7 +8958,7 @@
                 </a:solidFill>
                 <a:latin typeface="Palatino Linotype" panose="02040502050505030304" pitchFamily="18" charset="0"/>
               </a:rPr>
-              <a:t>5.3 Heat Model</a:t>
+              <a:t>3.1 Flash Separators</a:t>
             </a:r>
           </a:p>
         </p:txBody>
@@ -9172,7 +9161,7 @@
     </p:spTree>
     <p:extLst>
       <p:ext uri="{BB962C8B-B14F-4D97-AF65-F5344CB8AC3E}">
-        <p14:creationId xmlns:p14="http://schemas.microsoft.com/office/powerpoint/2010/main" val="3351130367"/>
+        <p14:creationId xmlns:p14="http://schemas.microsoft.com/office/powerpoint/2010/main" val="2409316716"/>
       </p:ext>
     </p:extLst>
   </p:cSld>
@@ -9182,7 +9171,7 @@
 </p:sld>
 </file>
 
-<file path=ppt/slides/slide8.xml><?xml version="1.0" encoding="utf-8"?>
+<file path=ppt/slides/slide4.xml><?xml version="1.0" encoding="utf-8"?>
 <p:sld xmlns:a="http://schemas.openxmlformats.org/drawingml/2006/main" xmlns:r="http://schemas.openxmlformats.org/officeDocument/2006/relationships" xmlns:p="http://schemas.openxmlformats.org/presentationml/2006/main">
   <p:cSld>
     <p:spTree>
@@ -9234,7 +9223,7 @@
               <a:rPr lang="en-US" sz="4400" dirty="0">
                 <a:latin typeface="Franklin Gothic Demi" panose="020B0703020102020204" pitchFamily="34" charset="0"/>
               </a:rPr>
-              <a:t>Chapter 5: Heat Exchangers</a:t>
+              <a:t>Chapter 4: Solids and Solid Separators</a:t>
             </a:r>
           </a:p>
         </p:txBody>
@@ -9278,7 +9267,7 @@
                 </a:solidFill>
                 <a:latin typeface="Palatino Linotype" panose="02040502050505030304" pitchFamily="18" charset="0"/>
               </a:rPr>
-              <a:t>5.4 Ethyl Acetate Plant Heat Exchanger</a:t>
+              <a:t>4.1 Solids and Solid Separators Overview</a:t>
             </a:r>
           </a:p>
         </p:txBody>
@@ -9481,7 +9470,7 @@
     </p:spTree>
     <p:extLst>
       <p:ext uri="{BB962C8B-B14F-4D97-AF65-F5344CB8AC3E}">
-        <p14:creationId xmlns:p14="http://schemas.microsoft.com/office/powerpoint/2010/main" val="2001936663"/>
+        <p14:creationId xmlns:p14="http://schemas.microsoft.com/office/powerpoint/2010/main" val="459946364"/>
       </p:ext>
     </p:extLst>
   </p:cSld>
@@ -9491,7 +9480,7 @@
 </p:sld>
 </file>
 
-<file path=ppt/slides/slide9.xml><?xml version="1.0" encoding="utf-8"?>
+<file path=ppt/slides/slide5.xml><?xml version="1.0" encoding="utf-8"?>
 <p:sld xmlns:a="http://schemas.openxmlformats.org/drawingml/2006/main" xmlns:r="http://schemas.openxmlformats.org/officeDocument/2006/relationships" xmlns:p="http://schemas.openxmlformats.org/presentationml/2006/main">
   <p:cSld>
     <p:spTree>
@@ -9543,7 +9532,7 @@
               <a:rPr lang="en-US" sz="4400" dirty="0">
                 <a:latin typeface="Franklin Gothic Demi" panose="020B0703020102020204" pitchFamily="34" charset="0"/>
               </a:rPr>
-              <a:t>Chapter 6: Pressure Changers</a:t>
+              <a:t>Chapter 4: Solids and Solid Separators</a:t>
             </a:r>
           </a:p>
         </p:txBody>
@@ -9587,7 +9576,7 @@
                 </a:solidFill>
                 <a:latin typeface="Palatino Linotype" panose="02040502050505030304" pitchFamily="18" charset="0"/>
               </a:rPr>
-              <a:t>6.1 Pumps</a:t>
+              <a:t>4.2 Crystallizer</a:t>
             </a:r>
           </a:p>
         </p:txBody>
@@ -9790,7 +9779,1243 @@
     </p:spTree>
     <p:extLst>
       <p:ext uri="{BB962C8B-B14F-4D97-AF65-F5344CB8AC3E}">
-        <p14:creationId xmlns:p14="http://schemas.microsoft.com/office/powerpoint/2010/main" val="594451192"/>
+        <p14:creationId xmlns:p14="http://schemas.microsoft.com/office/powerpoint/2010/main" val="4042433097"/>
+      </p:ext>
+    </p:extLst>
+  </p:cSld>
+  <p:clrMapOvr>
+    <a:masterClrMapping/>
+  </p:clrMapOvr>
+</p:sld>
+</file>
+
+<file path=ppt/slides/slide6.xml><?xml version="1.0" encoding="utf-8"?>
+<p:sld xmlns:a="http://schemas.openxmlformats.org/drawingml/2006/main" xmlns:r="http://schemas.openxmlformats.org/officeDocument/2006/relationships" xmlns:p="http://schemas.openxmlformats.org/presentationml/2006/main">
+  <p:cSld>
+    <p:spTree>
+      <p:nvGrpSpPr>
+        <p:cNvPr id="1" name=""/>
+        <p:cNvGrpSpPr/>
+        <p:nvPr/>
+      </p:nvGrpSpPr>
+      <p:grpSpPr>
+        <a:xfrm>
+          <a:off x="0" y="0"/>
+          <a:ext cx="0" cy="0"/>
+          <a:chOff x="0" y="0"/>
+          <a:chExt cx="0" cy="0"/>
+        </a:xfrm>
+      </p:grpSpPr>
+      <p:sp>
+        <p:nvSpPr>
+          <p:cNvPr id="2" name="Title 1">
+            <a:extLst>
+              <a:ext uri="{FF2B5EF4-FFF2-40B4-BE49-F238E27FC236}">
+                <a16:creationId xmlns:a16="http://schemas.microsoft.com/office/drawing/2014/main" id="{EAEE2CE1-2F3B-4DFE-BF38-6E2208CF6BC3}"/>
+              </a:ext>
+            </a:extLst>
+          </p:cNvPr>
+          <p:cNvSpPr>
+            <a:spLocks noGrp="1"/>
+          </p:cNvSpPr>
+          <p:nvPr>
+            <p:ph type="ctrTitle"/>
+          </p:nvPr>
+        </p:nvSpPr>
+        <p:spPr>
+          <a:xfrm>
+            <a:off x="144779" y="4786090"/>
+            <a:ext cx="11902439" cy="1246495"/>
+          </a:xfrm>
+          <a:ln>
+            <a:noFill/>
+          </a:ln>
+        </p:spPr>
+        <p:txBody>
+          <a:bodyPr anchor="ctr">
+            <a:noAutofit/>
+          </a:bodyPr>
+          <a:lstStyle/>
+          <a:p>
+            <a:r>
+              <a:rPr lang="en-US" sz="4400" dirty="0">
+                <a:latin typeface="Franklin Gothic Demi" panose="020B0703020102020204" pitchFamily="34" charset="0"/>
+              </a:rPr>
+              <a:t>Chapter 4: Solids and Solid Separators</a:t>
+            </a:r>
+          </a:p>
+        </p:txBody>
+      </p:sp>
+      <p:sp>
+        <p:nvSpPr>
+          <p:cNvPr id="13" name="TextBox 12">
+            <a:extLst>
+              <a:ext uri="{FF2B5EF4-FFF2-40B4-BE49-F238E27FC236}">
+                <a16:creationId xmlns:a16="http://schemas.microsoft.com/office/drawing/2014/main" id="{CB9CFEEB-613D-4ADB-AB7E-7E2D4DA2BB5E}"/>
+              </a:ext>
+            </a:extLst>
+          </p:cNvPr>
+          <p:cNvSpPr txBox="1"/>
+          <p:nvPr/>
+        </p:nvSpPr>
+        <p:spPr>
+          <a:xfrm>
+            <a:off x="144779" y="5815591"/>
+            <a:ext cx="11902439" cy="584775"/>
+          </a:xfrm>
+          <a:prstGeom prst="rect">
+            <a:avLst/>
+          </a:prstGeom>
+          <a:noFill/>
+          <a:ln>
+            <a:noFill/>
+          </a:ln>
+        </p:spPr>
+        <p:txBody>
+          <a:bodyPr wrap="square" rtlCol="0" anchor="ctr">
+            <a:spAutoFit/>
+          </a:bodyPr>
+          <a:lstStyle/>
+          <a:p>
+            <a:pPr algn="ctr"/>
+            <a:r>
+              <a:rPr lang="en-US" sz="3200" dirty="0">
+                <a:solidFill>
+                  <a:srgbClr val="4D4E53"/>
+                </a:solidFill>
+                <a:latin typeface="Palatino Linotype" panose="02040502050505030304" pitchFamily="18" charset="0"/>
+              </a:rPr>
+              <a:t>4.3 Dryer</a:t>
+            </a:r>
+          </a:p>
+        </p:txBody>
+      </p:sp>
+      <p:sp>
+        <p:nvSpPr>
+          <p:cNvPr id="12" name="TextBox 11">
+            <a:extLst>
+              <a:ext uri="{FF2B5EF4-FFF2-40B4-BE49-F238E27FC236}">
+                <a16:creationId xmlns:a16="http://schemas.microsoft.com/office/drawing/2014/main" id="{65EFFB45-2256-41F0-B651-136B5ECC47D8}"/>
+              </a:ext>
+            </a:extLst>
+          </p:cNvPr>
+          <p:cNvSpPr txBox="1"/>
+          <p:nvPr/>
+        </p:nvSpPr>
+        <p:spPr>
+          <a:xfrm>
+            <a:off x="144780" y="3770382"/>
+            <a:ext cx="11902439" cy="1246495"/>
+          </a:xfrm>
+          <a:prstGeom prst="rect">
+            <a:avLst/>
+          </a:prstGeom>
+          <a:noFill/>
+          <a:ln>
+            <a:noFill/>
+          </a:ln>
+        </p:spPr>
+        <p:txBody>
+          <a:bodyPr wrap="square" rtlCol="0" anchor="ctr">
+            <a:spAutoFit/>
+          </a:bodyPr>
+          <a:lstStyle/>
+          <a:p>
+            <a:pPr algn="ctr"/>
+            <a:r>
+              <a:rPr lang="en-US" sz="7500" dirty="0">
+                <a:solidFill>
+                  <a:srgbClr val="B31B1B"/>
+                </a:solidFill>
+                <a:latin typeface="Franklin Gothic Heavy" panose="020B0903020102020204" pitchFamily="34" charset="0"/>
+              </a:rPr>
+              <a:t>ASPEN PLUS V11</a:t>
+            </a:r>
+          </a:p>
+        </p:txBody>
+      </p:sp>
+      <p:grpSp>
+        <p:nvGrpSpPr>
+          <p:cNvPr id="3" name="Group 2">
+            <a:extLst>
+              <a:ext uri="{FF2B5EF4-FFF2-40B4-BE49-F238E27FC236}">
+                <a16:creationId xmlns:a16="http://schemas.microsoft.com/office/drawing/2014/main" id="{15B81395-E22E-4AD0-994F-85E49604CB5E}"/>
+              </a:ext>
+            </a:extLst>
+          </p:cNvPr>
+          <p:cNvGrpSpPr/>
+          <p:nvPr/>
+        </p:nvGrpSpPr>
+        <p:grpSpPr>
+          <a:xfrm>
+            <a:off x="591645" y="368734"/>
+            <a:ext cx="10803298" cy="863644"/>
+            <a:chOff x="591645" y="368734"/>
+            <a:chExt cx="10803298" cy="863644"/>
+          </a:xfrm>
+        </p:grpSpPr>
+        <p:pic>
+          <p:nvPicPr>
+            <p:cNvPr id="5" name="Picture 4">
+              <a:extLst>
+                <a:ext uri="{FF2B5EF4-FFF2-40B4-BE49-F238E27FC236}">
+                  <a16:creationId xmlns:a16="http://schemas.microsoft.com/office/drawing/2014/main" id="{F685A961-0326-493A-8B03-8FB4C1C0458C}"/>
+                </a:ext>
+              </a:extLst>
+            </p:cNvPr>
+            <p:cNvPicPr>
+              <a:picLocks noChangeAspect="1"/>
+            </p:cNvPicPr>
+            <p:nvPr/>
+          </p:nvPicPr>
+          <p:blipFill>
+            <a:blip r:embed="rId2">
+              <a:extLst>
+                <a:ext uri="{28A0092B-C50C-407E-A947-70E740481C1C}">
+                  <a14:useLocalDpi xmlns:a14="http://schemas.microsoft.com/office/drawing/2010/main" val="0"/>
+                </a:ext>
+              </a:extLst>
+            </a:blip>
+            <a:stretch>
+              <a:fillRect/>
+            </a:stretch>
+          </p:blipFill>
+          <p:spPr>
+            <a:xfrm>
+              <a:off x="1570988" y="368734"/>
+              <a:ext cx="9823955" cy="863644"/>
+            </a:xfrm>
+            <a:prstGeom prst="rect">
+              <a:avLst/>
+            </a:prstGeom>
+          </p:spPr>
+        </p:pic>
+        <p:pic>
+          <p:nvPicPr>
+            <p:cNvPr id="16" name="Picture 4">
+              <a:extLst>
+                <a:ext uri="{FF2B5EF4-FFF2-40B4-BE49-F238E27FC236}">
+                  <a16:creationId xmlns:a16="http://schemas.microsoft.com/office/drawing/2014/main" id="{8EEF5CFD-BE3B-4325-813E-0FE18760F972}"/>
+                </a:ext>
+              </a:extLst>
+            </p:cNvPr>
+            <p:cNvPicPr>
+              <a:picLocks noChangeAspect="1" noChangeArrowheads="1"/>
+            </p:cNvPicPr>
+            <p:nvPr/>
+          </p:nvPicPr>
+          <p:blipFill>
+            <a:blip r:embed="rId3">
+              <a:extLst>
+                <a:ext uri="{28A0092B-C50C-407E-A947-70E740481C1C}">
+                  <a14:useLocalDpi xmlns:a14="http://schemas.microsoft.com/office/drawing/2010/main" val="0"/>
+                </a:ext>
+              </a:extLst>
+            </a:blip>
+            <a:srcRect/>
+            <a:stretch>
+              <a:fillRect/>
+            </a:stretch>
+          </p:blipFill>
+          <p:spPr bwMode="auto">
+            <a:xfrm>
+              <a:off x="591645" y="420022"/>
+              <a:ext cx="709904" cy="690562"/>
+            </a:xfrm>
+            <a:prstGeom prst="rect">
+              <a:avLst/>
+            </a:prstGeom>
+            <a:noFill/>
+            <a:extLst>
+              <a:ext uri="{909E8E84-426E-40DD-AFC4-6F175D3DCCD1}">
+                <a14:hiddenFill xmlns:a14="http://schemas.microsoft.com/office/drawing/2010/main">
+                  <a:solidFill>
+                    <a:srgbClr val="FFFFFF"/>
+                  </a:solidFill>
+                </a14:hiddenFill>
+              </a:ext>
+            </a:extLst>
+          </p:spPr>
+        </p:pic>
+      </p:grpSp>
+      <p:pic>
+        <p:nvPicPr>
+          <p:cNvPr id="4100" name="Picture 4" descr="Intellectual Property Officer, Center for Technology Licensing at Cornell  University - Vortechs Group">
+            <a:extLst>
+              <a:ext uri="{FF2B5EF4-FFF2-40B4-BE49-F238E27FC236}">
+                <a16:creationId xmlns:a16="http://schemas.microsoft.com/office/drawing/2014/main" id="{0609AFD2-FFE2-40E9-91D2-CAD7E959791C}"/>
+              </a:ext>
+            </a:extLst>
+          </p:cNvPr>
+          <p:cNvPicPr>
+            <a:picLocks noChangeAspect="1" noChangeArrowheads="1"/>
+          </p:cNvPicPr>
+          <p:nvPr/>
+        </p:nvPicPr>
+        <p:blipFill>
+          <a:blip r:embed="rId4">
+            <a:extLst>
+              <a:ext uri="{28A0092B-C50C-407E-A947-70E740481C1C}">
+                <a14:useLocalDpi xmlns:a14="http://schemas.microsoft.com/office/drawing/2010/main" val="0"/>
+              </a:ext>
+            </a:extLst>
+          </a:blip>
+          <a:srcRect/>
+          <a:stretch>
+            <a:fillRect/>
+          </a:stretch>
+        </p:blipFill>
+        <p:spPr bwMode="auto">
+          <a:xfrm>
+            <a:off x="4046773" y="1451142"/>
+            <a:ext cx="4022254" cy="2262518"/>
+          </a:xfrm>
+          <a:prstGeom prst="rect">
+            <a:avLst/>
+          </a:prstGeom>
+          <a:noFill/>
+          <a:extLst>
+            <a:ext uri="{909E8E84-426E-40DD-AFC4-6F175D3DCCD1}">
+              <a14:hiddenFill xmlns:a14="http://schemas.microsoft.com/office/drawing/2010/main">
+                <a:solidFill>
+                  <a:srgbClr val="FFFFFF"/>
+                </a:solidFill>
+              </a14:hiddenFill>
+            </a:ext>
+          </a:extLst>
+        </p:spPr>
+      </p:pic>
+    </p:spTree>
+    <p:extLst>
+      <p:ext uri="{BB962C8B-B14F-4D97-AF65-F5344CB8AC3E}">
+        <p14:creationId xmlns:p14="http://schemas.microsoft.com/office/powerpoint/2010/main" val="422364884"/>
+      </p:ext>
+    </p:extLst>
+  </p:cSld>
+  <p:clrMapOvr>
+    <a:masterClrMapping/>
+  </p:clrMapOvr>
+</p:sld>
+</file>
+
+<file path=ppt/slides/slide7.xml><?xml version="1.0" encoding="utf-8"?>
+<p:sld xmlns:a="http://schemas.openxmlformats.org/drawingml/2006/main" xmlns:r="http://schemas.openxmlformats.org/officeDocument/2006/relationships" xmlns:p="http://schemas.openxmlformats.org/presentationml/2006/main">
+  <p:cSld>
+    <p:spTree>
+      <p:nvGrpSpPr>
+        <p:cNvPr id="1" name=""/>
+        <p:cNvGrpSpPr/>
+        <p:nvPr/>
+      </p:nvGrpSpPr>
+      <p:grpSpPr>
+        <a:xfrm>
+          <a:off x="0" y="0"/>
+          <a:ext cx="0" cy="0"/>
+          <a:chOff x="0" y="0"/>
+          <a:chExt cx="0" cy="0"/>
+        </a:xfrm>
+      </p:grpSpPr>
+      <p:sp>
+        <p:nvSpPr>
+          <p:cNvPr id="2" name="Title 1">
+            <a:extLst>
+              <a:ext uri="{FF2B5EF4-FFF2-40B4-BE49-F238E27FC236}">
+                <a16:creationId xmlns:a16="http://schemas.microsoft.com/office/drawing/2014/main" id="{EAEE2CE1-2F3B-4DFE-BF38-6E2208CF6BC3}"/>
+              </a:ext>
+            </a:extLst>
+          </p:cNvPr>
+          <p:cNvSpPr>
+            <a:spLocks noGrp="1"/>
+          </p:cNvSpPr>
+          <p:nvPr>
+            <p:ph type="ctrTitle"/>
+          </p:nvPr>
+        </p:nvSpPr>
+        <p:spPr>
+          <a:xfrm>
+            <a:off x="144779" y="4786090"/>
+            <a:ext cx="11902439" cy="1246495"/>
+          </a:xfrm>
+          <a:ln>
+            <a:noFill/>
+          </a:ln>
+        </p:spPr>
+        <p:txBody>
+          <a:bodyPr anchor="ctr">
+            <a:noAutofit/>
+          </a:bodyPr>
+          <a:lstStyle/>
+          <a:p>
+            <a:r>
+              <a:rPr lang="en-US" sz="4400" dirty="0">
+                <a:latin typeface="Franklin Gothic Demi" panose="020B0703020102020204" pitchFamily="34" charset="0"/>
+              </a:rPr>
+              <a:t>Chapter 4: Solids and Solid Separators</a:t>
+            </a:r>
+          </a:p>
+        </p:txBody>
+      </p:sp>
+      <p:sp>
+        <p:nvSpPr>
+          <p:cNvPr id="13" name="TextBox 12">
+            <a:extLst>
+              <a:ext uri="{FF2B5EF4-FFF2-40B4-BE49-F238E27FC236}">
+                <a16:creationId xmlns:a16="http://schemas.microsoft.com/office/drawing/2014/main" id="{CB9CFEEB-613D-4ADB-AB7E-7E2D4DA2BB5E}"/>
+              </a:ext>
+            </a:extLst>
+          </p:cNvPr>
+          <p:cNvSpPr txBox="1"/>
+          <p:nvPr/>
+        </p:nvSpPr>
+        <p:spPr>
+          <a:xfrm>
+            <a:off x="144779" y="5815591"/>
+            <a:ext cx="11902439" cy="584775"/>
+          </a:xfrm>
+          <a:prstGeom prst="rect">
+            <a:avLst/>
+          </a:prstGeom>
+          <a:noFill/>
+          <a:ln>
+            <a:noFill/>
+          </a:ln>
+        </p:spPr>
+        <p:txBody>
+          <a:bodyPr wrap="square" rtlCol="0" anchor="ctr">
+            <a:spAutoFit/>
+          </a:bodyPr>
+          <a:lstStyle/>
+          <a:p>
+            <a:pPr algn="ctr"/>
+            <a:r>
+              <a:rPr lang="en-US" sz="3200" dirty="0">
+                <a:solidFill>
+                  <a:srgbClr val="4D4E53"/>
+                </a:solidFill>
+                <a:latin typeface="Palatino Linotype" panose="02040502050505030304" pitchFamily="18" charset="0"/>
+              </a:rPr>
+              <a:t>4.4 Filtration</a:t>
+            </a:r>
+          </a:p>
+        </p:txBody>
+      </p:sp>
+      <p:sp>
+        <p:nvSpPr>
+          <p:cNvPr id="12" name="TextBox 11">
+            <a:extLst>
+              <a:ext uri="{FF2B5EF4-FFF2-40B4-BE49-F238E27FC236}">
+                <a16:creationId xmlns:a16="http://schemas.microsoft.com/office/drawing/2014/main" id="{65EFFB45-2256-41F0-B651-136B5ECC47D8}"/>
+              </a:ext>
+            </a:extLst>
+          </p:cNvPr>
+          <p:cNvSpPr txBox="1"/>
+          <p:nvPr/>
+        </p:nvSpPr>
+        <p:spPr>
+          <a:xfrm>
+            <a:off x="144780" y="3770382"/>
+            <a:ext cx="11902439" cy="1246495"/>
+          </a:xfrm>
+          <a:prstGeom prst="rect">
+            <a:avLst/>
+          </a:prstGeom>
+          <a:noFill/>
+          <a:ln>
+            <a:noFill/>
+          </a:ln>
+        </p:spPr>
+        <p:txBody>
+          <a:bodyPr wrap="square" rtlCol="0" anchor="ctr">
+            <a:spAutoFit/>
+          </a:bodyPr>
+          <a:lstStyle/>
+          <a:p>
+            <a:pPr algn="ctr"/>
+            <a:r>
+              <a:rPr lang="en-US" sz="7500" dirty="0">
+                <a:solidFill>
+                  <a:srgbClr val="B31B1B"/>
+                </a:solidFill>
+                <a:latin typeface="Franklin Gothic Heavy" panose="020B0903020102020204" pitchFamily="34" charset="0"/>
+              </a:rPr>
+              <a:t>ASPEN PLUS V11</a:t>
+            </a:r>
+          </a:p>
+        </p:txBody>
+      </p:sp>
+      <p:grpSp>
+        <p:nvGrpSpPr>
+          <p:cNvPr id="3" name="Group 2">
+            <a:extLst>
+              <a:ext uri="{FF2B5EF4-FFF2-40B4-BE49-F238E27FC236}">
+                <a16:creationId xmlns:a16="http://schemas.microsoft.com/office/drawing/2014/main" id="{15B81395-E22E-4AD0-994F-85E49604CB5E}"/>
+              </a:ext>
+            </a:extLst>
+          </p:cNvPr>
+          <p:cNvGrpSpPr/>
+          <p:nvPr/>
+        </p:nvGrpSpPr>
+        <p:grpSpPr>
+          <a:xfrm>
+            <a:off x="591645" y="368734"/>
+            <a:ext cx="10803298" cy="863644"/>
+            <a:chOff x="591645" y="368734"/>
+            <a:chExt cx="10803298" cy="863644"/>
+          </a:xfrm>
+        </p:grpSpPr>
+        <p:pic>
+          <p:nvPicPr>
+            <p:cNvPr id="5" name="Picture 4">
+              <a:extLst>
+                <a:ext uri="{FF2B5EF4-FFF2-40B4-BE49-F238E27FC236}">
+                  <a16:creationId xmlns:a16="http://schemas.microsoft.com/office/drawing/2014/main" id="{F685A961-0326-493A-8B03-8FB4C1C0458C}"/>
+                </a:ext>
+              </a:extLst>
+            </p:cNvPr>
+            <p:cNvPicPr>
+              <a:picLocks noChangeAspect="1"/>
+            </p:cNvPicPr>
+            <p:nvPr/>
+          </p:nvPicPr>
+          <p:blipFill>
+            <a:blip r:embed="rId2">
+              <a:extLst>
+                <a:ext uri="{28A0092B-C50C-407E-A947-70E740481C1C}">
+                  <a14:useLocalDpi xmlns:a14="http://schemas.microsoft.com/office/drawing/2010/main" val="0"/>
+                </a:ext>
+              </a:extLst>
+            </a:blip>
+            <a:stretch>
+              <a:fillRect/>
+            </a:stretch>
+          </p:blipFill>
+          <p:spPr>
+            <a:xfrm>
+              <a:off x="1570988" y="368734"/>
+              <a:ext cx="9823955" cy="863644"/>
+            </a:xfrm>
+            <a:prstGeom prst="rect">
+              <a:avLst/>
+            </a:prstGeom>
+          </p:spPr>
+        </p:pic>
+        <p:pic>
+          <p:nvPicPr>
+            <p:cNvPr id="16" name="Picture 4">
+              <a:extLst>
+                <a:ext uri="{FF2B5EF4-FFF2-40B4-BE49-F238E27FC236}">
+                  <a16:creationId xmlns:a16="http://schemas.microsoft.com/office/drawing/2014/main" id="{8EEF5CFD-BE3B-4325-813E-0FE18760F972}"/>
+                </a:ext>
+              </a:extLst>
+            </p:cNvPr>
+            <p:cNvPicPr>
+              <a:picLocks noChangeAspect="1" noChangeArrowheads="1"/>
+            </p:cNvPicPr>
+            <p:nvPr/>
+          </p:nvPicPr>
+          <p:blipFill>
+            <a:blip r:embed="rId3">
+              <a:extLst>
+                <a:ext uri="{28A0092B-C50C-407E-A947-70E740481C1C}">
+                  <a14:useLocalDpi xmlns:a14="http://schemas.microsoft.com/office/drawing/2010/main" val="0"/>
+                </a:ext>
+              </a:extLst>
+            </a:blip>
+            <a:srcRect/>
+            <a:stretch>
+              <a:fillRect/>
+            </a:stretch>
+          </p:blipFill>
+          <p:spPr bwMode="auto">
+            <a:xfrm>
+              <a:off x="591645" y="420022"/>
+              <a:ext cx="709904" cy="690562"/>
+            </a:xfrm>
+            <a:prstGeom prst="rect">
+              <a:avLst/>
+            </a:prstGeom>
+            <a:noFill/>
+            <a:extLst>
+              <a:ext uri="{909E8E84-426E-40DD-AFC4-6F175D3DCCD1}">
+                <a14:hiddenFill xmlns:a14="http://schemas.microsoft.com/office/drawing/2010/main">
+                  <a:solidFill>
+                    <a:srgbClr val="FFFFFF"/>
+                  </a:solidFill>
+                </a14:hiddenFill>
+              </a:ext>
+            </a:extLst>
+          </p:spPr>
+        </p:pic>
+      </p:grpSp>
+      <p:pic>
+        <p:nvPicPr>
+          <p:cNvPr id="4100" name="Picture 4" descr="Intellectual Property Officer, Center for Technology Licensing at Cornell  University - Vortechs Group">
+            <a:extLst>
+              <a:ext uri="{FF2B5EF4-FFF2-40B4-BE49-F238E27FC236}">
+                <a16:creationId xmlns:a16="http://schemas.microsoft.com/office/drawing/2014/main" id="{0609AFD2-FFE2-40E9-91D2-CAD7E959791C}"/>
+              </a:ext>
+            </a:extLst>
+          </p:cNvPr>
+          <p:cNvPicPr>
+            <a:picLocks noChangeAspect="1" noChangeArrowheads="1"/>
+          </p:cNvPicPr>
+          <p:nvPr/>
+        </p:nvPicPr>
+        <p:blipFill>
+          <a:blip r:embed="rId4">
+            <a:extLst>
+              <a:ext uri="{28A0092B-C50C-407E-A947-70E740481C1C}">
+                <a14:useLocalDpi xmlns:a14="http://schemas.microsoft.com/office/drawing/2010/main" val="0"/>
+              </a:ext>
+            </a:extLst>
+          </a:blip>
+          <a:srcRect/>
+          <a:stretch>
+            <a:fillRect/>
+          </a:stretch>
+        </p:blipFill>
+        <p:spPr bwMode="auto">
+          <a:xfrm>
+            <a:off x="4046773" y="1451142"/>
+            <a:ext cx="4022254" cy="2262518"/>
+          </a:xfrm>
+          <a:prstGeom prst="rect">
+            <a:avLst/>
+          </a:prstGeom>
+          <a:noFill/>
+          <a:extLst>
+            <a:ext uri="{909E8E84-426E-40DD-AFC4-6F175D3DCCD1}">
+              <a14:hiddenFill xmlns:a14="http://schemas.microsoft.com/office/drawing/2010/main">
+                <a:solidFill>
+                  <a:srgbClr val="FFFFFF"/>
+                </a:solidFill>
+              </a14:hiddenFill>
+            </a:ext>
+          </a:extLst>
+        </p:spPr>
+      </p:pic>
+    </p:spTree>
+    <p:extLst>
+      <p:ext uri="{BB962C8B-B14F-4D97-AF65-F5344CB8AC3E}">
+        <p14:creationId xmlns:p14="http://schemas.microsoft.com/office/powerpoint/2010/main" val="1659431757"/>
+      </p:ext>
+    </p:extLst>
+  </p:cSld>
+  <p:clrMapOvr>
+    <a:masterClrMapping/>
+  </p:clrMapOvr>
+</p:sld>
+</file>
+
+<file path=ppt/slides/slide8.xml><?xml version="1.0" encoding="utf-8"?>
+<p:sld xmlns:a="http://schemas.openxmlformats.org/drawingml/2006/main" xmlns:r="http://schemas.openxmlformats.org/officeDocument/2006/relationships" xmlns:p="http://schemas.openxmlformats.org/presentationml/2006/main">
+  <p:cSld>
+    <p:spTree>
+      <p:nvGrpSpPr>
+        <p:cNvPr id="1" name=""/>
+        <p:cNvGrpSpPr/>
+        <p:nvPr/>
+      </p:nvGrpSpPr>
+      <p:grpSpPr>
+        <a:xfrm>
+          <a:off x="0" y="0"/>
+          <a:ext cx="0" cy="0"/>
+          <a:chOff x="0" y="0"/>
+          <a:chExt cx="0" cy="0"/>
+        </a:xfrm>
+      </p:grpSpPr>
+      <p:sp>
+        <p:nvSpPr>
+          <p:cNvPr id="2" name="Title 1">
+            <a:extLst>
+              <a:ext uri="{FF2B5EF4-FFF2-40B4-BE49-F238E27FC236}">
+                <a16:creationId xmlns:a16="http://schemas.microsoft.com/office/drawing/2014/main" id="{EAEE2CE1-2F3B-4DFE-BF38-6E2208CF6BC3}"/>
+              </a:ext>
+            </a:extLst>
+          </p:cNvPr>
+          <p:cNvSpPr>
+            <a:spLocks noGrp="1"/>
+          </p:cNvSpPr>
+          <p:nvPr>
+            <p:ph type="ctrTitle"/>
+          </p:nvPr>
+        </p:nvSpPr>
+        <p:spPr>
+          <a:xfrm>
+            <a:off x="144779" y="4786090"/>
+            <a:ext cx="11902439" cy="1246495"/>
+          </a:xfrm>
+          <a:ln>
+            <a:noFill/>
+          </a:ln>
+        </p:spPr>
+        <p:txBody>
+          <a:bodyPr anchor="ctr">
+            <a:noAutofit/>
+          </a:bodyPr>
+          <a:lstStyle/>
+          <a:p>
+            <a:r>
+              <a:rPr lang="en-US" sz="4400" dirty="0">
+                <a:latin typeface="Franklin Gothic Demi" panose="020B0703020102020204" pitchFamily="34" charset="0"/>
+              </a:rPr>
+              <a:t>Chapter 4: Solids and Solid Separators</a:t>
+            </a:r>
+          </a:p>
+        </p:txBody>
+      </p:sp>
+      <p:sp>
+        <p:nvSpPr>
+          <p:cNvPr id="13" name="TextBox 12">
+            <a:extLst>
+              <a:ext uri="{FF2B5EF4-FFF2-40B4-BE49-F238E27FC236}">
+                <a16:creationId xmlns:a16="http://schemas.microsoft.com/office/drawing/2014/main" id="{CB9CFEEB-613D-4ADB-AB7E-7E2D4DA2BB5E}"/>
+              </a:ext>
+            </a:extLst>
+          </p:cNvPr>
+          <p:cNvSpPr txBox="1"/>
+          <p:nvPr/>
+        </p:nvSpPr>
+        <p:spPr>
+          <a:xfrm>
+            <a:off x="144779" y="5815591"/>
+            <a:ext cx="11902439" cy="584775"/>
+          </a:xfrm>
+          <a:prstGeom prst="rect">
+            <a:avLst/>
+          </a:prstGeom>
+          <a:noFill/>
+          <a:ln>
+            <a:noFill/>
+          </a:ln>
+        </p:spPr>
+        <p:txBody>
+          <a:bodyPr wrap="square" rtlCol="0" anchor="ctr">
+            <a:spAutoFit/>
+          </a:bodyPr>
+          <a:lstStyle/>
+          <a:p>
+            <a:pPr algn="ctr"/>
+            <a:r>
+              <a:rPr lang="en-US" sz="3200" dirty="0">
+                <a:solidFill>
+                  <a:srgbClr val="4D4E53"/>
+                </a:solidFill>
+                <a:latin typeface="Palatino Linotype" panose="02040502050505030304" pitchFamily="18" charset="0"/>
+              </a:rPr>
+              <a:t>4.5 Ethyl Acetate Plant Dryer</a:t>
+            </a:r>
+          </a:p>
+        </p:txBody>
+      </p:sp>
+      <p:sp>
+        <p:nvSpPr>
+          <p:cNvPr id="12" name="TextBox 11">
+            <a:extLst>
+              <a:ext uri="{FF2B5EF4-FFF2-40B4-BE49-F238E27FC236}">
+                <a16:creationId xmlns:a16="http://schemas.microsoft.com/office/drawing/2014/main" id="{65EFFB45-2256-41F0-B651-136B5ECC47D8}"/>
+              </a:ext>
+            </a:extLst>
+          </p:cNvPr>
+          <p:cNvSpPr txBox="1"/>
+          <p:nvPr/>
+        </p:nvSpPr>
+        <p:spPr>
+          <a:xfrm>
+            <a:off x="144780" y="3770382"/>
+            <a:ext cx="11902439" cy="1246495"/>
+          </a:xfrm>
+          <a:prstGeom prst="rect">
+            <a:avLst/>
+          </a:prstGeom>
+          <a:noFill/>
+          <a:ln>
+            <a:noFill/>
+          </a:ln>
+        </p:spPr>
+        <p:txBody>
+          <a:bodyPr wrap="square" rtlCol="0" anchor="ctr">
+            <a:spAutoFit/>
+          </a:bodyPr>
+          <a:lstStyle/>
+          <a:p>
+            <a:pPr algn="ctr"/>
+            <a:r>
+              <a:rPr lang="en-US" sz="7500" dirty="0">
+                <a:solidFill>
+                  <a:srgbClr val="B31B1B"/>
+                </a:solidFill>
+                <a:latin typeface="Franklin Gothic Heavy" panose="020B0903020102020204" pitchFamily="34" charset="0"/>
+              </a:rPr>
+              <a:t>ASPEN PLUS V11</a:t>
+            </a:r>
+          </a:p>
+        </p:txBody>
+      </p:sp>
+      <p:grpSp>
+        <p:nvGrpSpPr>
+          <p:cNvPr id="3" name="Group 2">
+            <a:extLst>
+              <a:ext uri="{FF2B5EF4-FFF2-40B4-BE49-F238E27FC236}">
+                <a16:creationId xmlns:a16="http://schemas.microsoft.com/office/drawing/2014/main" id="{15B81395-E22E-4AD0-994F-85E49604CB5E}"/>
+              </a:ext>
+            </a:extLst>
+          </p:cNvPr>
+          <p:cNvGrpSpPr/>
+          <p:nvPr/>
+        </p:nvGrpSpPr>
+        <p:grpSpPr>
+          <a:xfrm>
+            <a:off x="591645" y="368734"/>
+            <a:ext cx="10803298" cy="863644"/>
+            <a:chOff x="591645" y="368734"/>
+            <a:chExt cx="10803298" cy="863644"/>
+          </a:xfrm>
+        </p:grpSpPr>
+        <p:pic>
+          <p:nvPicPr>
+            <p:cNvPr id="5" name="Picture 4">
+              <a:extLst>
+                <a:ext uri="{FF2B5EF4-FFF2-40B4-BE49-F238E27FC236}">
+                  <a16:creationId xmlns:a16="http://schemas.microsoft.com/office/drawing/2014/main" id="{F685A961-0326-493A-8B03-8FB4C1C0458C}"/>
+                </a:ext>
+              </a:extLst>
+            </p:cNvPr>
+            <p:cNvPicPr>
+              <a:picLocks noChangeAspect="1"/>
+            </p:cNvPicPr>
+            <p:nvPr/>
+          </p:nvPicPr>
+          <p:blipFill>
+            <a:blip r:embed="rId2">
+              <a:extLst>
+                <a:ext uri="{28A0092B-C50C-407E-A947-70E740481C1C}">
+                  <a14:useLocalDpi xmlns:a14="http://schemas.microsoft.com/office/drawing/2010/main" val="0"/>
+                </a:ext>
+              </a:extLst>
+            </a:blip>
+            <a:stretch>
+              <a:fillRect/>
+            </a:stretch>
+          </p:blipFill>
+          <p:spPr>
+            <a:xfrm>
+              <a:off x="1570988" y="368734"/>
+              <a:ext cx="9823955" cy="863644"/>
+            </a:xfrm>
+            <a:prstGeom prst="rect">
+              <a:avLst/>
+            </a:prstGeom>
+          </p:spPr>
+        </p:pic>
+        <p:pic>
+          <p:nvPicPr>
+            <p:cNvPr id="16" name="Picture 4">
+              <a:extLst>
+                <a:ext uri="{FF2B5EF4-FFF2-40B4-BE49-F238E27FC236}">
+                  <a16:creationId xmlns:a16="http://schemas.microsoft.com/office/drawing/2014/main" id="{8EEF5CFD-BE3B-4325-813E-0FE18760F972}"/>
+                </a:ext>
+              </a:extLst>
+            </p:cNvPr>
+            <p:cNvPicPr>
+              <a:picLocks noChangeAspect="1" noChangeArrowheads="1"/>
+            </p:cNvPicPr>
+            <p:nvPr/>
+          </p:nvPicPr>
+          <p:blipFill>
+            <a:blip r:embed="rId3">
+              <a:extLst>
+                <a:ext uri="{28A0092B-C50C-407E-A947-70E740481C1C}">
+                  <a14:useLocalDpi xmlns:a14="http://schemas.microsoft.com/office/drawing/2010/main" val="0"/>
+                </a:ext>
+              </a:extLst>
+            </a:blip>
+            <a:srcRect/>
+            <a:stretch>
+              <a:fillRect/>
+            </a:stretch>
+          </p:blipFill>
+          <p:spPr bwMode="auto">
+            <a:xfrm>
+              <a:off x="591645" y="420022"/>
+              <a:ext cx="709904" cy="690562"/>
+            </a:xfrm>
+            <a:prstGeom prst="rect">
+              <a:avLst/>
+            </a:prstGeom>
+            <a:noFill/>
+            <a:extLst>
+              <a:ext uri="{909E8E84-426E-40DD-AFC4-6F175D3DCCD1}">
+                <a14:hiddenFill xmlns:a14="http://schemas.microsoft.com/office/drawing/2010/main">
+                  <a:solidFill>
+                    <a:srgbClr val="FFFFFF"/>
+                  </a:solidFill>
+                </a14:hiddenFill>
+              </a:ext>
+            </a:extLst>
+          </p:spPr>
+        </p:pic>
+      </p:grpSp>
+      <p:pic>
+        <p:nvPicPr>
+          <p:cNvPr id="4100" name="Picture 4" descr="Intellectual Property Officer, Center for Technology Licensing at Cornell  University - Vortechs Group">
+            <a:extLst>
+              <a:ext uri="{FF2B5EF4-FFF2-40B4-BE49-F238E27FC236}">
+                <a16:creationId xmlns:a16="http://schemas.microsoft.com/office/drawing/2014/main" id="{0609AFD2-FFE2-40E9-91D2-CAD7E959791C}"/>
+              </a:ext>
+            </a:extLst>
+          </p:cNvPr>
+          <p:cNvPicPr>
+            <a:picLocks noChangeAspect="1" noChangeArrowheads="1"/>
+          </p:cNvPicPr>
+          <p:nvPr/>
+        </p:nvPicPr>
+        <p:blipFill>
+          <a:blip r:embed="rId4">
+            <a:extLst>
+              <a:ext uri="{28A0092B-C50C-407E-A947-70E740481C1C}">
+                <a14:useLocalDpi xmlns:a14="http://schemas.microsoft.com/office/drawing/2010/main" val="0"/>
+              </a:ext>
+            </a:extLst>
+          </a:blip>
+          <a:srcRect/>
+          <a:stretch>
+            <a:fillRect/>
+          </a:stretch>
+        </p:blipFill>
+        <p:spPr bwMode="auto">
+          <a:xfrm>
+            <a:off x="4046773" y="1451142"/>
+            <a:ext cx="4022254" cy="2262518"/>
+          </a:xfrm>
+          <a:prstGeom prst="rect">
+            <a:avLst/>
+          </a:prstGeom>
+          <a:noFill/>
+          <a:extLst>
+            <a:ext uri="{909E8E84-426E-40DD-AFC4-6F175D3DCCD1}">
+              <a14:hiddenFill xmlns:a14="http://schemas.microsoft.com/office/drawing/2010/main">
+                <a:solidFill>
+                  <a:srgbClr val="FFFFFF"/>
+                </a:solidFill>
+              </a14:hiddenFill>
+            </a:ext>
+          </a:extLst>
+        </p:spPr>
+      </p:pic>
+    </p:spTree>
+    <p:extLst>
+      <p:ext uri="{BB962C8B-B14F-4D97-AF65-F5344CB8AC3E}">
+        <p14:creationId xmlns:p14="http://schemas.microsoft.com/office/powerpoint/2010/main" val="1171978533"/>
+      </p:ext>
+    </p:extLst>
+  </p:cSld>
+  <p:clrMapOvr>
+    <a:masterClrMapping/>
+  </p:clrMapOvr>
+</p:sld>
+</file>
+
+<file path=ppt/slides/slide9.xml><?xml version="1.0" encoding="utf-8"?>
+<p:sld xmlns:a="http://schemas.openxmlformats.org/drawingml/2006/main" xmlns:r="http://schemas.openxmlformats.org/officeDocument/2006/relationships" xmlns:p="http://schemas.openxmlformats.org/presentationml/2006/main">
+  <p:cSld>
+    <p:spTree>
+      <p:nvGrpSpPr>
+        <p:cNvPr id="1" name=""/>
+        <p:cNvGrpSpPr/>
+        <p:nvPr/>
+      </p:nvGrpSpPr>
+      <p:grpSpPr>
+        <a:xfrm>
+          <a:off x="0" y="0"/>
+          <a:ext cx="0" cy="0"/>
+          <a:chOff x="0" y="0"/>
+          <a:chExt cx="0" cy="0"/>
+        </a:xfrm>
+      </p:grpSpPr>
+      <p:sp>
+        <p:nvSpPr>
+          <p:cNvPr id="2" name="Title 1">
+            <a:extLst>
+              <a:ext uri="{FF2B5EF4-FFF2-40B4-BE49-F238E27FC236}">
+                <a16:creationId xmlns:a16="http://schemas.microsoft.com/office/drawing/2014/main" id="{EAEE2CE1-2F3B-4DFE-BF38-6E2208CF6BC3}"/>
+              </a:ext>
+            </a:extLst>
+          </p:cNvPr>
+          <p:cNvSpPr>
+            <a:spLocks noGrp="1"/>
+          </p:cNvSpPr>
+          <p:nvPr>
+            <p:ph type="ctrTitle"/>
+          </p:nvPr>
+        </p:nvSpPr>
+        <p:spPr>
+          <a:xfrm>
+            <a:off x="144779" y="4786090"/>
+            <a:ext cx="11902439" cy="1246495"/>
+          </a:xfrm>
+          <a:ln>
+            <a:noFill/>
+          </a:ln>
+        </p:spPr>
+        <p:txBody>
+          <a:bodyPr anchor="ctr">
+            <a:noAutofit/>
+          </a:bodyPr>
+          <a:lstStyle/>
+          <a:p>
+            <a:r>
+              <a:rPr lang="en-US" sz="4400" dirty="0">
+                <a:latin typeface="Franklin Gothic Demi" panose="020B0703020102020204" pitchFamily="34" charset="0"/>
+              </a:rPr>
+              <a:t>Chapter 5: Heat Exchangers</a:t>
+            </a:r>
+          </a:p>
+        </p:txBody>
+      </p:sp>
+      <p:sp>
+        <p:nvSpPr>
+          <p:cNvPr id="13" name="TextBox 12">
+            <a:extLst>
+              <a:ext uri="{FF2B5EF4-FFF2-40B4-BE49-F238E27FC236}">
+                <a16:creationId xmlns:a16="http://schemas.microsoft.com/office/drawing/2014/main" id="{CB9CFEEB-613D-4ADB-AB7E-7E2D4DA2BB5E}"/>
+              </a:ext>
+            </a:extLst>
+          </p:cNvPr>
+          <p:cNvSpPr txBox="1"/>
+          <p:nvPr/>
+        </p:nvSpPr>
+        <p:spPr>
+          <a:xfrm>
+            <a:off x="144779" y="5815591"/>
+            <a:ext cx="11902439" cy="584775"/>
+          </a:xfrm>
+          <a:prstGeom prst="rect">
+            <a:avLst/>
+          </a:prstGeom>
+          <a:noFill/>
+          <a:ln>
+            <a:noFill/>
+          </a:ln>
+        </p:spPr>
+        <p:txBody>
+          <a:bodyPr wrap="square" rtlCol="0" anchor="ctr">
+            <a:spAutoFit/>
+          </a:bodyPr>
+          <a:lstStyle/>
+          <a:p>
+            <a:pPr algn="ctr"/>
+            <a:r>
+              <a:rPr lang="en-US" sz="3200" dirty="0">
+                <a:solidFill>
+                  <a:srgbClr val="4D4E53"/>
+                </a:solidFill>
+                <a:latin typeface="Palatino Linotype" panose="02040502050505030304" pitchFamily="18" charset="0"/>
+              </a:rPr>
+              <a:t>5.1 Shortcut Heat Exchanger Model</a:t>
+            </a:r>
+          </a:p>
+        </p:txBody>
+      </p:sp>
+      <p:sp>
+        <p:nvSpPr>
+          <p:cNvPr id="12" name="TextBox 11">
+            <a:extLst>
+              <a:ext uri="{FF2B5EF4-FFF2-40B4-BE49-F238E27FC236}">
+                <a16:creationId xmlns:a16="http://schemas.microsoft.com/office/drawing/2014/main" id="{65EFFB45-2256-41F0-B651-136B5ECC47D8}"/>
+              </a:ext>
+            </a:extLst>
+          </p:cNvPr>
+          <p:cNvSpPr txBox="1"/>
+          <p:nvPr/>
+        </p:nvSpPr>
+        <p:spPr>
+          <a:xfrm>
+            <a:off x="144780" y="3770382"/>
+            <a:ext cx="11902439" cy="1246495"/>
+          </a:xfrm>
+          <a:prstGeom prst="rect">
+            <a:avLst/>
+          </a:prstGeom>
+          <a:noFill/>
+          <a:ln>
+            <a:noFill/>
+          </a:ln>
+        </p:spPr>
+        <p:txBody>
+          <a:bodyPr wrap="square" rtlCol="0" anchor="ctr">
+            <a:spAutoFit/>
+          </a:bodyPr>
+          <a:lstStyle/>
+          <a:p>
+            <a:pPr algn="ctr"/>
+            <a:r>
+              <a:rPr lang="en-US" sz="7500" dirty="0">
+                <a:solidFill>
+                  <a:srgbClr val="B31B1B"/>
+                </a:solidFill>
+                <a:latin typeface="Franklin Gothic Heavy" panose="020B0903020102020204" pitchFamily="34" charset="0"/>
+              </a:rPr>
+              <a:t>ASPEN PLUS V11</a:t>
+            </a:r>
+          </a:p>
+        </p:txBody>
+      </p:sp>
+      <p:grpSp>
+        <p:nvGrpSpPr>
+          <p:cNvPr id="3" name="Group 2">
+            <a:extLst>
+              <a:ext uri="{FF2B5EF4-FFF2-40B4-BE49-F238E27FC236}">
+                <a16:creationId xmlns:a16="http://schemas.microsoft.com/office/drawing/2014/main" id="{15B81395-E22E-4AD0-994F-85E49604CB5E}"/>
+              </a:ext>
+            </a:extLst>
+          </p:cNvPr>
+          <p:cNvGrpSpPr/>
+          <p:nvPr/>
+        </p:nvGrpSpPr>
+        <p:grpSpPr>
+          <a:xfrm>
+            <a:off x="591645" y="368734"/>
+            <a:ext cx="10803298" cy="863644"/>
+            <a:chOff x="591645" y="368734"/>
+            <a:chExt cx="10803298" cy="863644"/>
+          </a:xfrm>
+        </p:grpSpPr>
+        <p:pic>
+          <p:nvPicPr>
+            <p:cNvPr id="5" name="Picture 4">
+              <a:extLst>
+                <a:ext uri="{FF2B5EF4-FFF2-40B4-BE49-F238E27FC236}">
+                  <a16:creationId xmlns:a16="http://schemas.microsoft.com/office/drawing/2014/main" id="{F685A961-0326-493A-8B03-8FB4C1C0458C}"/>
+                </a:ext>
+              </a:extLst>
+            </p:cNvPr>
+            <p:cNvPicPr>
+              <a:picLocks noChangeAspect="1"/>
+            </p:cNvPicPr>
+            <p:nvPr/>
+          </p:nvPicPr>
+          <p:blipFill>
+            <a:blip r:embed="rId2">
+              <a:extLst>
+                <a:ext uri="{28A0092B-C50C-407E-A947-70E740481C1C}">
+                  <a14:useLocalDpi xmlns:a14="http://schemas.microsoft.com/office/drawing/2010/main" val="0"/>
+                </a:ext>
+              </a:extLst>
+            </a:blip>
+            <a:stretch>
+              <a:fillRect/>
+            </a:stretch>
+          </p:blipFill>
+          <p:spPr>
+            <a:xfrm>
+              <a:off x="1570988" y="368734"/>
+              <a:ext cx="9823955" cy="863644"/>
+            </a:xfrm>
+            <a:prstGeom prst="rect">
+              <a:avLst/>
+            </a:prstGeom>
+          </p:spPr>
+        </p:pic>
+        <p:pic>
+          <p:nvPicPr>
+            <p:cNvPr id="16" name="Picture 4">
+              <a:extLst>
+                <a:ext uri="{FF2B5EF4-FFF2-40B4-BE49-F238E27FC236}">
+                  <a16:creationId xmlns:a16="http://schemas.microsoft.com/office/drawing/2014/main" id="{8EEF5CFD-BE3B-4325-813E-0FE18760F972}"/>
+                </a:ext>
+              </a:extLst>
+            </p:cNvPr>
+            <p:cNvPicPr>
+              <a:picLocks noChangeAspect="1" noChangeArrowheads="1"/>
+            </p:cNvPicPr>
+            <p:nvPr/>
+          </p:nvPicPr>
+          <p:blipFill>
+            <a:blip r:embed="rId3">
+              <a:extLst>
+                <a:ext uri="{28A0092B-C50C-407E-A947-70E740481C1C}">
+                  <a14:useLocalDpi xmlns:a14="http://schemas.microsoft.com/office/drawing/2010/main" val="0"/>
+                </a:ext>
+              </a:extLst>
+            </a:blip>
+            <a:srcRect/>
+            <a:stretch>
+              <a:fillRect/>
+            </a:stretch>
+          </p:blipFill>
+          <p:spPr bwMode="auto">
+            <a:xfrm>
+              <a:off x="591645" y="420022"/>
+              <a:ext cx="709904" cy="690562"/>
+            </a:xfrm>
+            <a:prstGeom prst="rect">
+              <a:avLst/>
+            </a:prstGeom>
+            <a:noFill/>
+            <a:extLst>
+              <a:ext uri="{909E8E84-426E-40DD-AFC4-6F175D3DCCD1}">
+                <a14:hiddenFill xmlns:a14="http://schemas.microsoft.com/office/drawing/2010/main">
+                  <a:solidFill>
+                    <a:srgbClr val="FFFFFF"/>
+                  </a:solidFill>
+                </a14:hiddenFill>
+              </a:ext>
+            </a:extLst>
+          </p:spPr>
+        </p:pic>
+      </p:grpSp>
+      <p:pic>
+        <p:nvPicPr>
+          <p:cNvPr id="4100" name="Picture 4" descr="Intellectual Property Officer, Center for Technology Licensing at Cornell  University - Vortechs Group">
+            <a:extLst>
+              <a:ext uri="{FF2B5EF4-FFF2-40B4-BE49-F238E27FC236}">
+                <a16:creationId xmlns:a16="http://schemas.microsoft.com/office/drawing/2014/main" id="{0609AFD2-FFE2-40E9-91D2-CAD7E959791C}"/>
+              </a:ext>
+            </a:extLst>
+          </p:cNvPr>
+          <p:cNvPicPr>
+            <a:picLocks noChangeAspect="1" noChangeArrowheads="1"/>
+          </p:cNvPicPr>
+          <p:nvPr/>
+        </p:nvPicPr>
+        <p:blipFill>
+          <a:blip r:embed="rId4">
+            <a:extLst>
+              <a:ext uri="{28A0092B-C50C-407E-A947-70E740481C1C}">
+                <a14:useLocalDpi xmlns:a14="http://schemas.microsoft.com/office/drawing/2010/main" val="0"/>
+              </a:ext>
+            </a:extLst>
+          </a:blip>
+          <a:srcRect/>
+          <a:stretch>
+            <a:fillRect/>
+          </a:stretch>
+        </p:blipFill>
+        <p:spPr bwMode="auto">
+          <a:xfrm>
+            <a:off x="4046773" y="1451142"/>
+            <a:ext cx="4022254" cy="2262518"/>
+          </a:xfrm>
+          <a:prstGeom prst="rect">
+            <a:avLst/>
+          </a:prstGeom>
+          <a:noFill/>
+          <a:extLst>
+            <a:ext uri="{909E8E84-426E-40DD-AFC4-6F175D3DCCD1}">
+              <a14:hiddenFill xmlns:a14="http://schemas.microsoft.com/office/drawing/2010/main">
+                <a:solidFill>
+                  <a:srgbClr val="FFFFFF"/>
+                </a:solidFill>
+              </a14:hiddenFill>
+            </a:ext>
+          </a:extLst>
+        </p:spPr>
+      </p:pic>
+    </p:spTree>
+    <p:extLst>
+      <p:ext uri="{BB962C8B-B14F-4D97-AF65-F5344CB8AC3E}">
+        <p14:creationId xmlns:p14="http://schemas.microsoft.com/office/powerpoint/2010/main" val="3914296768"/>
       </p:ext>
     </p:extLst>
   </p:cSld>

</xml_diff>

<commit_message>
Fixed 9.2 and 9.3 title mixup. Updated 3.3 graphics/text.
Working on 9.2 and 9.3 text/graphics
</commit_message>
<xml_diff>
--- a/Title Designs/Title Designs.pptx
+++ b/Title Designs/Title Designs.pptx
@@ -294,7 +294,7 @@
           <a:p>
             <a:fld id="{9F6A7E55-DFC4-46CD-9865-1BDB80A917C9}" type="datetimeFigureOut">
               <a:rPr lang="en-US" smtClean="0"/>
-              <a:t>8/16/2021</a:t>
+              <a:t>9/9/2021</a:t>
             </a:fld>
             <a:endParaRPr lang="en-US"/>
           </a:p>
@@ -492,7 +492,7 @@
           <a:p>
             <a:fld id="{9F6A7E55-DFC4-46CD-9865-1BDB80A917C9}" type="datetimeFigureOut">
               <a:rPr lang="en-US" smtClean="0"/>
-              <a:t>8/16/2021</a:t>
+              <a:t>9/9/2021</a:t>
             </a:fld>
             <a:endParaRPr lang="en-US"/>
           </a:p>
@@ -700,7 +700,7 @@
           <a:p>
             <a:fld id="{9F6A7E55-DFC4-46CD-9865-1BDB80A917C9}" type="datetimeFigureOut">
               <a:rPr lang="en-US" smtClean="0"/>
-              <a:t>8/16/2021</a:t>
+              <a:t>9/9/2021</a:t>
             </a:fld>
             <a:endParaRPr lang="en-US"/>
           </a:p>
@@ -898,7 +898,7 @@
           <a:p>
             <a:fld id="{9F6A7E55-DFC4-46CD-9865-1BDB80A917C9}" type="datetimeFigureOut">
               <a:rPr lang="en-US" smtClean="0"/>
-              <a:t>8/16/2021</a:t>
+              <a:t>9/9/2021</a:t>
             </a:fld>
             <a:endParaRPr lang="en-US"/>
           </a:p>
@@ -1173,7 +1173,7 @@
           <a:p>
             <a:fld id="{9F6A7E55-DFC4-46CD-9865-1BDB80A917C9}" type="datetimeFigureOut">
               <a:rPr lang="en-US" smtClean="0"/>
-              <a:t>8/16/2021</a:t>
+              <a:t>9/9/2021</a:t>
             </a:fld>
             <a:endParaRPr lang="en-US"/>
           </a:p>
@@ -1438,7 +1438,7 @@
           <a:p>
             <a:fld id="{9F6A7E55-DFC4-46CD-9865-1BDB80A917C9}" type="datetimeFigureOut">
               <a:rPr lang="en-US" smtClean="0"/>
-              <a:t>8/16/2021</a:t>
+              <a:t>9/9/2021</a:t>
             </a:fld>
             <a:endParaRPr lang="en-US"/>
           </a:p>
@@ -1850,7 +1850,7 @@
           <a:p>
             <a:fld id="{9F6A7E55-DFC4-46CD-9865-1BDB80A917C9}" type="datetimeFigureOut">
               <a:rPr lang="en-US" smtClean="0"/>
-              <a:t>8/16/2021</a:t>
+              <a:t>9/9/2021</a:t>
             </a:fld>
             <a:endParaRPr lang="en-US"/>
           </a:p>
@@ -1991,7 +1991,7 @@
           <a:p>
             <a:fld id="{9F6A7E55-DFC4-46CD-9865-1BDB80A917C9}" type="datetimeFigureOut">
               <a:rPr lang="en-US" smtClean="0"/>
-              <a:t>8/16/2021</a:t>
+              <a:t>9/9/2021</a:t>
             </a:fld>
             <a:endParaRPr lang="en-US"/>
           </a:p>
@@ -2104,7 +2104,7 @@
           <a:p>
             <a:fld id="{9F6A7E55-DFC4-46CD-9865-1BDB80A917C9}" type="datetimeFigureOut">
               <a:rPr lang="en-US" smtClean="0"/>
-              <a:t>8/16/2021</a:t>
+              <a:t>9/9/2021</a:t>
             </a:fld>
             <a:endParaRPr lang="en-US"/>
           </a:p>
@@ -2415,7 +2415,7 @@
           <a:p>
             <a:fld id="{9F6A7E55-DFC4-46CD-9865-1BDB80A917C9}" type="datetimeFigureOut">
               <a:rPr lang="en-US" smtClean="0"/>
-              <a:t>8/16/2021</a:t>
+              <a:t>9/9/2021</a:t>
             </a:fld>
             <a:endParaRPr lang="en-US"/>
           </a:p>
@@ -2703,7 +2703,7 @@
           <a:p>
             <a:fld id="{9F6A7E55-DFC4-46CD-9865-1BDB80A917C9}" type="datetimeFigureOut">
               <a:rPr lang="en-US" smtClean="0"/>
-              <a:t>8/16/2021</a:t>
+              <a:t>9/9/2021</a:t>
             </a:fld>
             <a:endParaRPr lang="en-US"/>
           </a:p>
@@ -2944,7 +2944,7 @@
           <a:p>
             <a:fld id="{9F6A7E55-DFC4-46CD-9865-1BDB80A917C9}" type="datetimeFigureOut">
               <a:rPr lang="en-US" smtClean="0"/>
-              <a:t>8/16/2021</a:t>
+              <a:t>9/9/2021</a:t>
             </a:fld>
             <a:endParaRPr lang="en-US"/>
           </a:p>
@@ -7413,7 +7413,7 @@
                 </a:solidFill>
                 <a:latin typeface="Palatino Linotype" panose="02040502050505030304" pitchFamily="18" charset="0"/>
               </a:rPr>
-              <a:t>9.2 Running a Sensitivity Analysis</a:t>
+              <a:t>9.2 Design Specifications</a:t>
             </a:r>
           </a:p>
         </p:txBody>
@@ -7722,7 +7722,7 @@
                 </a:solidFill>
                 <a:latin typeface="Palatino Linotype" panose="02040502050505030304" pitchFamily="18" charset="0"/>
               </a:rPr>
-              <a:t>9.3 Design Specifications</a:t>
+              <a:t>9.3 Running a Sensitivity Analysis</a:t>
             </a:r>
           </a:p>
         </p:txBody>

</xml_diff>

<commit_message>
Fixed titles. Updated Videos. Fixed Issues
</commit_message>
<xml_diff>
--- a/Title Designs/Title Designs.pptx
+++ b/Title Designs/Title Designs.pptx
@@ -15,21 +15,20 @@
     <p:sldId id="291" r:id="rId9"/>
     <p:sldId id="275" r:id="rId10"/>
     <p:sldId id="277" r:id="rId11"/>
-    <p:sldId id="278" r:id="rId12"/>
-    <p:sldId id="279" r:id="rId13"/>
-    <p:sldId id="276" r:id="rId14"/>
-    <p:sldId id="280" r:id="rId15"/>
-    <p:sldId id="281" r:id="rId16"/>
-    <p:sldId id="287" r:id="rId17"/>
-    <p:sldId id="282" r:id="rId18"/>
-    <p:sldId id="267" r:id="rId19"/>
-    <p:sldId id="268" r:id="rId20"/>
-    <p:sldId id="269" r:id="rId21"/>
-    <p:sldId id="283" r:id="rId22"/>
-    <p:sldId id="284" r:id="rId23"/>
-    <p:sldId id="285" r:id="rId24"/>
-    <p:sldId id="270" r:id="rId25"/>
-    <p:sldId id="286" r:id="rId26"/>
+    <p:sldId id="279" r:id="rId12"/>
+    <p:sldId id="276" r:id="rId13"/>
+    <p:sldId id="280" r:id="rId14"/>
+    <p:sldId id="281" r:id="rId15"/>
+    <p:sldId id="287" r:id="rId16"/>
+    <p:sldId id="282" r:id="rId17"/>
+    <p:sldId id="267" r:id="rId18"/>
+    <p:sldId id="269" r:id="rId19"/>
+    <p:sldId id="283" r:id="rId20"/>
+    <p:sldId id="284" r:id="rId21"/>
+    <p:sldId id="285" r:id="rId22"/>
+    <p:sldId id="268" r:id="rId23"/>
+    <p:sldId id="270" r:id="rId24"/>
+    <p:sldId id="286" r:id="rId25"/>
   </p:sldIdLst>
   <p:sldSz cx="12192000" cy="6858000"/>
   <p:notesSz cx="6858000" cy="9144000"/>
@@ -294,7 +293,7 @@
           <a:p>
             <a:fld id="{9F6A7E55-DFC4-46CD-9865-1BDB80A917C9}" type="datetimeFigureOut">
               <a:rPr lang="en-US" smtClean="0"/>
-              <a:t>9/9/2021</a:t>
+              <a:t>9/23/2021</a:t>
             </a:fld>
             <a:endParaRPr lang="en-US"/>
           </a:p>
@@ -492,7 +491,7 @@
           <a:p>
             <a:fld id="{9F6A7E55-DFC4-46CD-9865-1BDB80A917C9}" type="datetimeFigureOut">
               <a:rPr lang="en-US" smtClean="0"/>
-              <a:t>9/9/2021</a:t>
+              <a:t>9/23/2021</a:t>
             </a:fld>
             <a:endParaRPr lang="en-US"/>
           </a:p>
@@ -700,7 +699,7 @@
           <a:p>
             <a:fld id="{9F6A7E55-DFC4-46CD-9865-1BDB80A917C9}" type="datetimeFigureOut">
               <a:rPr lang="en-US" smtClean="0"/>
-              <a:t>9/9/2021</a:t>
+              <a:t>9/23/2021</a:t>
             </a:fld>
             <a:endParaRPr lang="en-US"/>
           </a:p>
@@ -898,7 +897,7 @@
           <a:p>
             <a:fld id="{9F6A7E55-DFC4-46CD-9865-1BDB80A917C9}" type="datetimeFigureOut">
               <a:rPr lang="en-US" smtClean="0"/>
-              <a:t>9/9/2021</a:t>
+              <a:t>9/23/2021</a:t>
             </a:fld>
             <a:endParaRPr lang="en-US"/>
           </a:p>
@@ -1173,7 +1172,7 @@
           <a:p>
             <a:fld id="{9F6A7E55-DFC4-46CD-9865-1BDB80A917C9}" type="datetimeFigureOut">
               <a:rPr lang="en-US" smtClean="0"/>
-              <a:t>9/9/2021</a:t>
+              <a:t>9/23/2021</a:t>
             </a:fld>
             <a:endParaRPr lang="en-US"/>
           </a:p>
@@ -1438,7 +1437,7 @@
           <a:p>
             <a:fld id="{9F6A7E55-DFC4-46CD-9865-1BDB80A917C9}" type="datetimeFigureOut">
               <a:rPr lang="en-US" smtClean="0"/>
-              <a:t>9/9/2021</a:t>
+              <a:t>9/23/2021</a:t>
             </a:fld>
             <a:endParaRPr lang="en-US"/>
           </a:p>
@@ -1850,7 +1849,7 @@
           <a:p>
             <a:fld id="{9F6A7E55-DFC4-46CD-9865-1BDB80A917C9}" type="datetimeFigureOut">
               <a:rPr lang="en-US" smtClean="0"/>
-              <a:t>9/9/2021</a:t>
+              <a:t>9/23/2021</a:t>
             </a:fld>
             <a:endParaRPr lang="en-US"/>
           </a:p>
@@ -1991,7 +1990,7 @@
           <a:p>
             <a:fld id="{9F6A7E55-DFC4-46CD-9865-1BDB80A917C9}" type="datetimeFigureOut">
               <a:rPr lang="en-US" smtClean="0"/>
-              <a:t>9/9/2021</a:t>
+              <a:t>9/23/2021</a:t>
             </a:fld>
             <a:endParaRPr lang="en-US"/>
           </a:p>
@@ -2104,7 +2103,7 @@
           <a:p>
             <a:fld id="{9F6A7E55-DFC4-46CD-9865-1BDB80A917C9}" type="datetimeFigureOut">
               <a:rPr lang="en-US" smtClean="0"/>
-              <a:t>9/9/2021</a:t>
+              <a:t>9/23/2021</a:t>
             </a:fld>
             <a:endParaRPr lang="en-US"/>
           </a:p>
@@ -2415,7 +2414,7 @@
           <a:p>
             <a:fld id="{9F6A7E55-DFC4-46CD-9865-1BDB80A917C9}" type="datetimeFigureOut">
               <a:rPr lang="en-US" smtClean="0"/>
-              <a:t>9/9/2021</a:t>
+              <a:t>9/23/2021</a:t>
             </a:fld>
             <a:endParaRPr lang="en-US"/>
           </a:p>
@@ -2703,7 +2702,7 @@
           <a:p>
             <a:fld id="{9F6A7E55-DFC4-46CD-9865-1BDB80A917C9}" type="datetimeFigureOut">
               <a:rPr lang="en-US" smtClean="0"/>
-              <a:t>9/9/2021</a:t>
+              <a:t>9/23/2021</a:t>
             </a:fld>
             <a:endParaRPr lang="en-US"/>
           </a:p>
@@ -2944,7 +2943,7 @@
           <a:p>
             <a:fld id="{9F6A7E55-DFC4-46CD-9865-1BDB80A917C9}" type="datetimeFigureOut">
               <a:rPr lang="en-US" smtClean="0"/>
-              <a:t>9/9/2021</a:t>
+              <a:t>9/23/2021</a:t>
             </a:fld>
             <a:endParaRPr lang="en-US"/>
           </a:p>
@@ -4052,13 +4051,22 @@
           <a:p>
             <a:pPr algn="ctr"/>
             <a:r>
+              <a:rPr lang="en-US" sz="3200">
+                <a:solidFill>
+                  <a:srgbClr val="4D4E53"/>
+                </a:solidFill>
+                <a:latin typeface="Palatino Linotype" panose="02040502050505030304" pitchFamily="18" charset="0"/>
+              </a:rPr>
+              <a:t>5.3 Ethyl Acetate Plant </a:t>
+            </a:r>
+            <a:r>
               <a:rPr lang="en-US" sz="3200" dirty="0">
                 <a:solidFill>
                   <a:srgbClr val="4D4E53"/>
                 </a:solidFill>
                 <a:latin typeface="Palatino Linotype" panose="02040502050505030304" pitchFamily="18" charset="0"/>
               </a:rPr>
-              <a:t>5.3 Heat Model</a:t>
+              <a:t>Heat Exchanger</a:t>
             </a:r>
           </a:p>
         </p:txBody>
@@ -4261,7 +4269,7 @@
     </p:spTree>
     <p:extLst>
       <p:ext uri="{BB962C8B-B14F-4D97-AF65-F5344CB8AC3E}">
-        <p14:creationId xmlns:p14="http://schemas.microsoft.com/office/powerpoint/2010/main" val="3351130367"/>
+        <p14:creationId xmlns:p14="http://schemas.microsoft.com/office/powerpoint/2010/main" val="2001936663"/>
       </p:ext>
     </p:extLst>
   </p:cSld>
@@ -4323,7 +4331,7 @@
               <a:rPr lang="en-US" sz="4400" dirty="0">
                 <a:latin typeface="Franklin Gothic Demi" panose="020B0703020102020204" pitchFamily="34" charset="0"/>
               </a:rPr>
-              <a:t>Chapter 5: Heat Exchangers</a:t>
+              <a:t>Chapter 6: Pressure Changers</a:t>
             </a:r>
           </a:p>
         </p:txBody>
@@ -4367,7 +4375,7 @@
                 </a:solidFill>
                 <a:latin typeface="Palatino Linotype" panose="02040502050505030304" pitchFamily="18" charset="0"/>
               </a:rPr>
-              <a:t>5.4 Ethyl Acetate Plant Heat Exchanger</a:t>
+              <a:t>6.1 Pumps</a:t>
             </a:r>
           </a:p>
         </p:txBody>
@@ -4570,7 +4578,7 @@
     </p:spTree>
     <p:extLst>
       <p:ext uri="{BB962C8B-B14F-4D97-AF65-F5344CB8AC3E}">
-        <p14:creationId xmlns:p14="http://schemas.microsoft.com/office/powerpoint/2010/main" val="2001936663"/>
+        <p14:creationId xmlns:p14="http://schemas.microsoft.com/office/powerpoint/2010/main" val="594451192"/>
       </p:ext>
     </p:extLst>
   </p:cSld>
@@ -4676,7 +4684,7 @@
                 </a:solidFill>
                 <a:latin typeface="Palatino Linotype" panose="02040502050505030304" pitchFamily="18" charset="0"/>
               </a:rPr>
-              <a:t>6.1 Pumps</a:t>
+              <a:t>6.2 Compressors</a:t>
             </a:r>
           </a:p>
         </p:txBody>
@@ -4879,7 +4887,7 @@
     </p:spTree>
     <p:extLst>
       <p:ext uri="{BB962C8B-B14F-4D97-AF65-F5344CB8AC3E}">
-        <p14:creationId xmlns:p14="http://schemas.microsoft.com/office/powerpoint/2010/main" val="594451192"/>
+        <p14:creationId xmlns:p14="http://schemas.microsoft.com/office/powerpoint/2010/main" val="2022873747"/>
       </p:ext>
     </p:extLst>
   </p:cSld>
@@ -4985,7 +4993,7 @@
                 </a:solidFill>
                 <a:latin typeface="Palatino Linotype" panose="02040502050505030304" pitchFamily="18" charset="0"/>
               </a:rPr>
-              <a:t>6.2 Compressors</a:t>
+              <a:t>6.3 Pipes</a:t>
             </a:r>
           </a:p>
         </p:txBody>
@@ -5188,7 +5196,7 @@
     </p:spTree>
     <p:extLst>
       <p:ext uri="{BB962C8B-B14F-4D97-AF65-F5344CB8AC3E}">
-        <p14:creationId xmlns:p14="http://schemas.microsoft.com/office/powerpoint/2010/main" val="2022873747"/>
+        <p14:creationId xmlns:p14="http://schemas.microsoft.com/office/powerpoint/2010/main" val="80787561"/>
       </p:ext>
     </p:extLst>
   </p:cSld>
@@ -5294,7 +5302,7 @@
                 </a:solidFill>
                 <a:latin typeface="Palatino Linotype" panose="02040502050505030304" pitchFamily="18" charset="0"/>
               </a:rPr>
-              <a:t>6.3 Pipes</a:t>
+              <a:t>6.4 Valves</a:t>
             </a:r>
           </a:p>
         </p:txBody>
@@ -5497,7 +5505,7 @@
     </p:spTree>
     <p:extLst>
       <p:ext uri="{BB962C8B-B14F-4D97-AF65-F5344CB8AC3E}">
-        <p14:creationId xmlns:p14="http://schemas.microsoft.com/office/powerpoint/2010/main" val="80787561"/>
+        <p14:creationId xmlns:p14="http://schemas.microsoft.com/office/powerpoint/2010/main" val="149539290"/>
       </p:ext>
     </p:extLst>
   </p:cSld>
@@ -5603,7 +5611,7 @@
                 </a:solidFill>
                 <a:latin typeface="Palatino Linotype" panose="02040502050505030304" pitchFamily="18" charset="0"/>
               </a:rPr>
-              <a:t>6.4 Valves</a:t>
+              <a:t>6.5 Ethyl Acetate Plant Pressure Changers</a:t>
             </a:r>
           </a:p>
         </p:txBody>
@@ -5806,7 +5814,7 @@
     </p:spTree>
     <p:extLst>
       <p:ext uri="{BB962C8B-B14F-4D97-AF65-F5344CB8AC3E}">
-        <p14:creationId xmlns:p14="http://schemas.microsoft.com/office/powerpoint/2010/main" val="149539290"/>
+        <p14:creationId xmlns:p14="http://schemas.microsoft.com/office/powerpoint/2010/main" val="42729710"/>
       </p:ext>
     </p:extLst>
   </p:cSld>
@@ -5851,7 +5859,7 @@
         </p:nvSpPr>
         <p:spPr>
           <a:xfrm>
-            <a:off x="144779" y="4786090"/>
+            <a:off x="144780" y="5016877"/>
             <a:ext cx="11902439" cy="1246495"/>
           </a:xfrm>
           <a:ln>
@@ -5868,17 +5876,17 @@
               <a:rPr lang="en-US" sz="4400" dirty="0">
                 <a:latin typeface="Franklin Gothic Demi" panose="020B0703020102020204" pitchFamily="34" charset="0"/>
               </a:rPr>
-              <a:t>Chapter 6: Pressure Changers</a:t>
-            </a:r>
-          </a:p>
-        </p:txBody>
-      </p:sp>
-      <p:sp>
-        <p:nvSpPr>
-          <p:cNvPr id="13" name="TextBox 12">
-            <a:extLst>
-              <a:ext uri="{FF2B5EF4-FFF2-40B4-BE49-F238E27FC236}">
-                <a16:creationId xmlns:a16="http://schemas.microsoft.com/office/drawing/2014/main" id="{CB9CFEEB-613D-4ADB-AB7E-7E2D4DA2BB5E}"/>
+              <a:t>Chapter 7: Ethyl Acetate Production Plant</a:t>
+            </a:r>
+          </a:p>
+        </p:txBody>
+      </p:sp>
+      <p:sp>
+        <p:nvSpPr>
+          <p:cNvPr id="12" name="TextBox 11">
+            <a:extLst>
+              <a:ext uri="{FF2B5EF4-FFF2-40B4-BE49-F238E27FC236}">
+                <a16:creationId xmlns:a16="http://schemas.microsoft.com/office/drawing/2014/main" id="{65EFFB45-2256-41F0-B651-136B5ECC47D8}"/>
               </a:ext>
             </a:extLst>
           </p:cNvPr>
@@ -5887,51 +5895,7 @@
         </p:nvSpPr>
         <p:spPr>
           <a:xfrm>
-            <a:off x="144779" y="5815591"/>
-            <a:ext cx="11902439" cy="584775"/>
-          </a:xfrm>
-          <a:prstGeom prst="rect">
-            <a:avLst/>
-          </a:prstGeom>
-          <a:noFill/>
-          <a:ln>
-            <a:noFill/>
-          </a:ln>
-        </p:spPr>
-        <p:txBody>
-          <a:bodyPr wrap="square" rtlCol="0" anchor="ctr">
-            <a:spAutoFit/>
-          </a:bodyPr>
-          <a:lstStyle/>
-          <a:p>
-            <a:pPr algn="ctr"/>
-            <a:r>
-              <a:rPr lang="en-US" sz="3200" dirty="0">
-                <a:solidFill>
-                  <a:srgbClr val="4D4E53"/>
-                </a:solidFill>
-                <a:latin typeface="Palatino Linotype" panose="02040502050505030304" pitchFamily="18" charset="0"/>
-              </a:rPr>
-              <a:t>6.5 Ethyl Acetate Plant Pressure Changers</a:t>
-            </a:r>
-          </a:p>
-        </p:txBody>
-      </p:sp>
-      <p:sp>
-        <p:nvSpPr>
-          <p:cNvPr id="12" name="TextBox 11">
-            <a:extLst>
-              <a:ext uri="{FF2B5EF4-FFF2-40B4-BE49-F238E27FC236}">
-                <a16:creationId xmlns:a16="http://schemas.microsoft.com/office/drawing/2014/main" id="{65EFFB45-2256-41F0-B651-136B5ECC47D8}"/>
-              </a:ext>
-            </a:extLst>
-          </p:cNvPr>
-          <p:cNvSpPr txBox="1"/>
-          <p:nvPr/>
-        </p:nvSpPr>
-        <p:spPr>
-          <a:xfrm>
-            <a:off x="144780" y="3770382"/>
+            <a:off x="144780" y="3875157"/>
             <a:ext cx="11902439" cy="1246495"/>
           </a:xfrm>
           <a:prstGeom prst="rect">
@@ -6094,7 +6058,7 @@
         </p:blipFill>
         <p:spPr bwMode="auto">
           <a:xfrm>
-            <a:off x="4046773" y="1451142"/>
+            <a:off x="4046773" y="1489242"/>
             <a:ext cx="4022254" cy="2262518"/>
           </a:xfrm>
           <a:prstGeom prst="rect">
@@ -6115,7 +6079,7 @@
     </p:spTree>
     <p:extLst>
       <p:ext uri="{BB962C8B-B14F-4D97-AF65-F5344CB8AC3E}">
-        <p14:creationId xmlns:p14="http://schemas.microsoft.com/office/powerpoint/2010/main" val="42729710"/>
+        <p14:creationId xmlns:p14="http://schemas.microsoft.com/office/powerpoint/2010/main" val="3807671136"/>
       </p:ext>
     </p:extLst>
   </p:cSld>
@@ -6160,7 +6124,7 @@
         </p:nvSpPr>
         <p:spPr>
           <a:xfrm>
-            <a:off x="144780" y="5016877"/>
+            <a:off x="144779" y="4786090"/>
             <a:ext cx="11902439" cy="1246495"/>
           </a:xfrm>
           <a:ln>
@@ -6177,17 +6141,17 @@
               <a:rPr lang="en-US" sz="4400" dirty="0">
                 <a:latin typeface="Franklin Gothic Demi" panose="020B0703020102020204" pitchFamily="34" charset="0"/>
               </a:rPr>
-              <a:t>Chapter 7: Ethyl Acetate Production Plant</a:t>
-            </a:r>
-          </a:p>
-        </p:txBody>
-      </p:sp>
-      <p:sp>
-        <p:nvSpPr>
-          <p:cNvPr id="12" name="TextBox 11">
-            <a:extLst>
-              <a:ext uri="{FF2B5EF4-FFF2-40B4-BE49-F238E27FC236}">
-                <a16:creationId xmlns:a16="http://schemas.microsoft.com/office/drawing/2014/main" id="{65EFFB45-2256-41F0-B651-136B5ECC47D8}"/>
+              <a:t>Chapter 7: Advanced Principles of Aspen Plus</a:t>
+            </a:r>
+          </a:p>
+        </p:txBody>
+      </p:sp>
+      <p:sp>
+        <p:nvSpPr>
+          <p:cNvPr id="13" name="TextBox 12">
+            <a:extLst>
+              <a:ext uri="{FF2B5EF4-FFF2-40B4-BE49-F238E27FC236}">
+                <a16:creationId xmlns:a16="http://schemas.microsoft.com/office/drawing/2014/main" id="{CB9CFEEB-613D-4ADB-AB7E-7E2D4DA2BB5E}"/>
               </a:ext>
             </a:extLst>
           </p:cNvPr>
@@ -6196,7 +6160,51 @@
         </p:nvSpPr>
         <p:spPr>
           <a:xfrm>
-            <a:off x="144780" y="3875157"/>
+            <a:off x="144779" y="5838675"/>
+            <a:ext cx="11902439" cy="538609"/>
+          </a:xfrm>
+          <a:prstGeom prst="rect">
+            <a:avLst/>
+          </a:prstGeom>
+          <a:noFill/>
+          <a:ln>
+            <a:noFill/>
+          </a:ln>
+        </p:spPr>
+        <p:txBody>
+          <a:bodyPr wrap="square" rtlCol="0" anchor="ctr">
+            <a:spAutoFit/>
+          </a:bodyPr>
+          <a:lstStyle/>
+          <a:p>
+            <a:pPr algn="ctr"/>
+            <a:r>
+              <a:rPr lang="en-US" sz="2800" dirty="0">
+                <a:solidFill>
+                  <a:srgbClr val="4D4E53"/>
+                </a:solidFill>
+                <a:latin typeface="Palatino Linotype" panose="02040502050505030304" pitchFamily="18" charset="0"/>
+              </a:rPr>
+              <a:t>7.1 Finding Thermophysical Properties and Generating TXY Diagrams</a:t>
+            </a:r>
+          </a:p>
+        </p:txBody>
+      </p:sp>
+      <p:sp>
+        <p:nvSpPr>
+          <p:cNvPr id="12" name="TextBox 11">
+            <a:extLst>
+              <a:ext uri="{FF2B5EF4-FFF2-40B4-BE49-F238E27FC236}">
+                <a16:creationId xmlns:a16="http://schemas.microsoft.com/office/drawing/2014/main" id="{65EFFB45-2256-41F0-B651-136B5ECC47D8}"/>
+              </a:ext>
+            </a:extLst>
+          </p:cNvPr>
+          <p:cNvSpPr txBox="1"/>
+          <p:nvPr/>
+        </p:nvSpPr>
+        <p:spPr>
+          <a:xfrm>
+            <a:off x="144780" y="3770382"/>
             <a:ext cx="11902439" cy="1246495"/>
           </a:xfrm>
           <a:prstGeom prst="rect">
@@ -6359,7 +6367,7 @@
         </p:blipFill>
         <p:spPr bwMode="auto">
           <a:xfrm>
-            <a:off x="4046773" y="1489242"/>
+            <a:off x="4046773" y="1451142"/>
             <a:ext cx="4022254" cy="2262518"/>
           </a:xfrm>
           <a:prstGeom prst="rect">
@@ -6380,7 +6388,7 @@
     </p:spTree>
     <p:extLst>
       <p:ext uri="{BB962C8B-B14F-4D97-AF65-F5344CB8AC3E}">
-        <p14:creationId xmlns:p14="http://schemas.microsoft.com/office/powerpoint/2010/main" val="3807671136"/>
+        <p14:creationId xmlns:p14="http://schemas.microsoft.com/office/powerpoint/2010/main" val="3160527228"/>
       </p:ext>
     </p:extLst>
   </p:cSld>
@@ -6442,7 +6450,7 @@
               <a:rPr lang="en-US" sz="4400" dirty="0">
                 <a:latin typeface="Franklin Gothic Demi" panose="020B0703020102020204" pitchFamily="34" charset="0"/>
               </a:rPr>
-              <a:t>Chapter 8: Batch Models</a:t>
+              <a:t>Chapter 7: Advanced Principles of Aspen Plus</a:t>
             </a:r>
           </a:p>
         </p:txBody>
@@ -6461,7 +6469,7 @@
         </p:nvSpPr>
         <p:spPr>
           <a:xfrm>
-            <a:off x="144779" y="5815591"/>
+            <a:off x="144779" y="5815592"/>
             <a:ext cx="11902439" cy="584775"/>
           </a:xfrm>
           <a:prstGeom prst="rect">
@@ -6486,7 +6494,7 @@
                 </a:solidFill>
                 <a:latin typeface="Palatino Linotype" panose="02040502050505030304" pitchFamily="18" charset="0"/>
               </a:rPr>
-              <a:t>8.1 Batch Reactors</a:t>
+              <a:t>7.2 Design Specifications</a:t>
             </a:r>
           </a:p>
         </p:txBody>
@@ -6689,7 +6697,7 @@
     </p:spTree>
     <p:extLst>
       <p:ext uri="{BB962C8B-B14F-4D97-AF65-F5344CB8AC3E}">
-        <p14:creationId xmlns:p14="http://schemas.microsoft.com/office/powerpoint/2010/main" val="1611154029"/>
+        <p14:creationId xmlns:p14="http://schemas.microsoft.com/office/powerpoint/2010/main" val="3453843008"/>
       </p:ext>
     </p:extLst>
   </p:cSld>
@@ -7060,7 +7068,7 @@
               <a:rPr lang="en-US" sz="4400" dirty="0">
                 <a:latin typeface="Franklin Gothic Demi" panose="020B0703020102020204" pitchFamily="34" charset="0"/>
               </a:rPr>
-              <a:t>Chapter 9: Advanced Principles of Aspen Plus</a:t>
+              <a:t>Chapter 7: Advanced Principles of Aspen Plus</a:t>
             </a:r>
           </a:p>
         </p:txBody>
@@ -7079,8 +7087,8 @@
         </p:nvSpPr>
         <p:spPr>
           <a:xfrm>
-            <a:off x="144779" y="5838675"/>
-            <a:ext cx="11902439" cy="538609"/>
+            <a:off x="144779" y="5815592"/>
+            <a:ext cx="11902439" cy="584775"/>
           </a:xfrm>
           <a:prstGeom prst="rect">
             <a:avLst/>
@@ -7098,13 +7106,13 @@
           <a:p>
             <a:pPr algn="ctr"/>
             <a:r>
-              <a:rPr lang="en-US" sz="2800" dirty="0">
+              <a:rPr lang="en-US" sz="3200" dirty="0">
                 <a:solidFill>
                   <a:srgbClr val="4D4E53"/>
                 </a:solidFill>
                 <a:latin typeface="Palatino Linotype" panose="02040502050505030304" pitchFamily="18" charset="0"/>
               </a:rPr>
-              <a:t>9.1 Finding Thermophysical Properties and Generating TXY Diagrams</a:t>
+              <a:t>7.3 Running a Sensitivity Analysis</a:t>
             </a:r>
           </a:p>
         </p:txBody>
@@ -7307,7 +7315,7 @@
     </p:spTree>
     <p:extLst>
       <p:ext uri="{BB962C8B-B14F-4D97-AF65-F5344CB8AC3E}">
-        <p14:creationId xmlns:p14="http://schemas.microsoft.com/office/powerpoint/2010/main" val="3160527228"/>
+        <p14:creationId xmlns:p14="http://schemas.microsoft.com/office/powerpoint/2010/main" val="1025950290"/>
       </p:ext>
     </p:extLst>
   </p:cSld>
@@ -7369,7 +7377,7 @@
               <a:rPr lang="en-US" sz="4400" dirty="0">
                 <a:latin typeface="Franklin Gothic Demi" panose="020B0703020102020204" pitchFamily="34" charset="0"/>
               </a:rPr>
-              <a:t>Chapter 9: Advanced Principles of Aspen Plus</a:t>
+              <a:t>Chapter 7: Advanced Principles of Aspen Plus</a:t>
             </a:r>
           </a:p>
         </p:txBody>
@@ -7413,7 +7421,7 @@
                 </a:solidFill>
                 <a:latin typeface="Palatino Linotype" panose="02040502050505030304" pitchFamily="18" charset="0"/>
               </a:rPr>
-              <a:t>9.2 Design Specifications</a:t>
+              <a:t>7.4 Calculator Blocks</a:t>
             </a:r>
           </a:p>
         </p:txBody>
@@ -7616,7 +7624,7 @@
     </p:spTree>
     <p:extLst>
       <p:ext uri="{BB962C8B-B14F-4D97-AF65-F5344CB8AC3E}">
-        <p14:creationId xmlns:p14="http://schemas.microsoft.com/office/powerpoint/2010/main" val="3453843008"/>
+        <p14:creationId xmlns:p14="http://schemas.microsoft.com/office/powerpoint/2010/main" val="2392678193"/>
       </p:ext>
     </p:extLst>
   </p:cSld>
@@ -7678,7 +7686,7 @@
               <a:rPr lang="en-US" sz="4400" dirty="0">
                 <a:latin typeface="Franklin Gothic Demi" panose="020B0703020102020204" pitchFamily="34" charset="0"/>
               </a:rPr>
-              <a:t>Chapter 9: Advanced Principles of Aspen Plus</a:t>
+              <a:t>Chapter 8: Batch Models</a:t>
             </a:r>
           </a:p>
         </p:txBody>
@@ -7697,7 +7705,7 @@
         </p:nvSpPr>
         <p:spPr>
           <a:xfrm>
-            <a:off x="144779" y="5815592"/>
+            <a:off x="144779" y="5815591"/>
             <a:ext cx="11902439" cy="584775"/>
           </a:xfrm>
           <a:prstGeom prst="rect">
@@ -7722,7 +7730,7 @@
                 </a:solidFill>
                 <a:latin typeface="Palatino Linotype" panose="02040502050505030304" pitchFamily="18" charset="0"/>
               </a:rPr>
-              <a:t>9.3 Running a Sensitivity Analysis</a:t>
+              <a:t>8.1 Batch Reactors</a:t>
             </a:r>
           </a:p>
         </p:txBody>
@@ -7925,7 +7933,7 @@
     </p:spTree>
     <p:extLst>
       <p:ext uri="{BB962C8B-B14F-4D97-AF65-F5344CB8AC3E}">
-        <p14:creationId xmlns:p14="http://schemas.microsoft.com/office/powerpoint/2010/main" val="1025950290"/>
+        <p14:creationId xmlns:p14="http://schemas.microsoft.com/office/powerpoint/2010/main" val="1611154029"/>
       </p:ext>
     </p:extLst>
   </p:cSld>
@@ -7987,7 +7995,7 @@
               <a:rPr lang="en-US" sz="4400" dirty="0">
                 <a:latin typeface="Franklin Gothic Demi" panose="020B0703020102020204" pitchFamily="34" charset="0"/>
               </a:rPr>
-              <a:t>Chapter 9: Advanced Principles of Aspen Plus</a:t>
+              <a:t>Chapter 10: Appendix</a:t>
             </a:r>
           </a:p>
         </p:txBody>
@@ -8006,7 +8014,7 @@
         </p:nvSpPr>
         <p:spPr>
           <a:xfrm>
-            <a:off x="144779" y="5815592"/>
+            <a:off x="144779" y="5815591"/>
             <a:ext cx="11902439" cy="584775"/>
           </a:xfrm>
           <a:prstGeom prst="rect">
@@ -8031,7 +8039,7 @@
                 </a:solidFill>
                 <a:latin typeface="Palatino Linotype" panose="02040502050505030304" pitchFamily="18" charset="0"/>
               </a:rPr>
-              <a:t>9.4 Calculator Blocks</a:t>
+              <a:t>10.1 Tips and Tricks</a:t>
             </a:r>
           </a:p>
         </p:txBody>
@@ -8234,7 +8242,7 @@
     </p:spTree>
     <p:extLst>
       <p:ext uri="{BB962C8B-B14F-4D97-AF65-F5344CB8AC3E}">
-        <p14:creationId xmlns:p14="http://schemas.microsoft.com/office/powerpoint/2010/main" val="2392678193"/>
+        <p14:creationId xmlns:p14="http://schemas.microsoft.com/office/powerpoint/2010/main" val="598986591"/>
       </p:ext>
     </p:extLst>
   </p:cSld>
@@ -8245,315 +8253,6 @@
 </file>
 
 <file path=ppt/slides/slide24.xml><?xml version="1.0" encoding="utf-8"?>
-<p:sld xmlns:a="http://schemas.openxmlformats.org/drawingml/2006/main" xmlns:r="http://schemas.openxmlformats.org/officeDocument/2006/relationships" xmlns:p="http://schemas.openxmlformats.org/presentationml/2006/main">
-  <p:cSld>
-    <p:spTree>
-      <p:nvGrpSpPr>
-        <p:cNvPr id="1" name=""/>
-        <p:cNvGrpSpPr/>
-        <p:nvPr/>
-      </p:nvGrpSpPr>
-      <p:grpSpPr>
-        <a:xfrm>
-          <a:off x="0" y="0"/>
-          <a:ext cx="0" cy="0"/>
-          <a:chOff x="0" y="0"/>
-          <a:chExt cx="0" cy="0"/>
-        </a:xfrm>
-      </p:grpSpPr>
-      <p:sp>
-        <p:nvSpPr>
-          <p:cNvPr id="2" name="Title 1">
-            <a:extLst>
-              <a:ext uri="{FF2B5EF4-FFF2-40B4-BE49-F238E27FC236}">
-                <a16:creationId xmlns:a16="http://schemas.microsoft.com/office/drawing/2014/main" id="{EAEE2CE1-2F3B-4DFE-BF38-6E2208CF6BC3}"/>
-              </a:ext>
-            </a:extLst>
-          </p:cNvPr>
-          <p:cNvSpPr>
-            <a:spLocks noGrp="1"/>
-          </p:cNvSpPr>
-          <p:nvPr>
-            <p:ph type="ctrTitle"/>
-          </p:nvPr>
-        </p:nvSpPr>
-        <p:spPr>
-          <a:xfrm>
-            <a:off x="144779" y="4786090"/>
-            <a:ext cx="11902439" cy="1246495"/>
-          </a:xfrm>
-          <a:ln>
-            <a:noFill/>
-          </a:ln>
-        </p:spPr>
-        <p:txBody>
-          <a:bodyPr anchor="ctr">
-            <a:noAutofit/>
-          </a:bodyPr>
-          <a:lstStyle/>
-          <a:p>
-            <a:r>
-              <a:rPr lang="en-US" sz="4400" dirty="0">
-                <a:latin typeface="Franklin Gothic Demi" panose="020B0703020102020204" pitchFamily="34" charset="0"/>
-              </a:rPr>
-              <a:t>Chapter 10: Appendix</a:t>
-            </a:r>
-          </a:p>
-        </p:txBody>
-      </p:sp>
-      <p:sp>
-        <p:nvSpPr>
-          <p:cNvPr id="13" name="TextBox 12">
-            <a:extLst>
-              <a:ext uri="{FF2B5EF4-FFF2-40B4-BE49-F238E27FC236}">
-                <a16:creationId xmlns:a16="http://schemas.microsoft.com/office/drawing/2014/main" id="{CB9CFEEB-613D-4ADB-AB7E-7E2D4DA2BB5E}"/>
-              </a:ext>
-            </a:extLst>
-          </p:cNvPr>
-          <p:cNvSpPr txBox="1"/>
-          <p:nvPr/>
-        </p:nvSpPr>
-        <p:spPr>
-          <a:xfrm>
-            <a:off x="144779" y="5815591"/>
-            <a:ext cx="11902439" cy="584775"/>
-          </a:xfrm>
-          <a:prstGeom prst="rect">
-            <a:avLst/>
-          </a:prstGeom>
-          <a:noFill/>
-          <a:ln>
-            <a:noFill/>
-          </a:ln>
-        </p:spPr>
-        <p:txBody>
-          <a:bodyPr wrap="square" rtlCol="0" anchor="ctr">
-            <a:spAutoFit/>
-          </a:bodyPr>
-          <a:lstStyle/>
-          <a:p>
-            <a:pPr algn="ctr"/>
-            <a:r>
-              <a:rPr lang="en-US" sz="3200" dirty="0">
-                <a:solidFill>
-                  <a:srgbClr val="4D4E53"/>
-                </a:solidFill>
-                <a:latin typeface="Palatino Linotype" panose="02040502050505030304" pitchFamily="18" charset="0"/>
-              </a:rPr>
-              <a:t>10.1 Tips and Tricks</a:t>
-            </a:r>
-          </a:p>
-        </p:txBody>
-      </p:sp>
-      <p:sp>
-        <p:nvSpPr>
-          <p:cNvPr id="12" name="TextBox 11">
-            <a:extLst>
-              <a:ext uri="{FF2B5EF4-FFF2-40B4-BE49-F238E27FC236}">
-                <a16:creationId xmlns:a16="http://schemas.microsoft.com/office/drawing/2014/main" id="{65EFFB45-2256-41F0-B651-136B5ECC47D8}"/>
-              </a:ext>
-            </a:extLst>
-          </p:cNvPr>
-          <p:cNvSpPr txBox="1"/>
-          <p:nvPr/>
-        </p:nvSpPr>
-        <p:spPr>
-          <a:xfrm>
-            <a:off x="144780" y="3770382"/>
-            <a:ext cx="11902439" cy="1246495"/>
-          </a:xfrm>
-          <a:prstGeom prst="rect">
-            <a:avLst/>
-          </a:prstGeom>
-          <a:noFill/>
-          <a:ln>
-            <a:noFill/>
-          </a:ln>
-        </p:spPr>
-        <p:txBody>
-          <a:bodyPr wrap="square" rtlCol="0" anchor="ctr">
-            <a:spAutoFit/>
-          </a:bodyPr>
-          <a:lstStyle/>
-          <a:p>
-            <a:pPr algn="ctr"/>
-            <a:r>
-              <a:rPr lang="en-US" sz="7500" dirty="0">
-                <a:solidFill>
-                  <a:srgbClr val="B31B1B"/>
-                </a:solidFill>
-                <a:latin typeface="Franklin Gothic Heavy" panose="020B0903020102020204" pitchFamily="34" charset="0"/>
-              </a:rPr>
-              <a:t>ASPEN PLUS V11</a:t>
-            </a:r>
-          </a:p>
-        </p:txBody>
-      </p:sp>
-      <p:grpSp>
-        <p:nvGrpSpPr>
-          <p:cNvPr id="3" name="Group 2">
-            <a:extLst>
-              <a:ext uri="{FF2B5EF4-FFF2-40B4-BE49-F238E27FC236}">
-                <a16:creationId xmlns:a16="http://schemas.microsoft.com/office/drawing/2014/main" id="{15B81395-E22E-4AD0-994F-85E49604CB5E}"/>
-              </a:ext>
-            </a:extLst>
-          </p:cNvPr>
-          <p:cNvGrpSpPr/>
-          <p:nvPr/>
-        </p:nvGrpSpPr>
-        <p:grpSpPr>
-          <a:xfrm>
-            <a:off x="591645" y="368734"/>
-            <a:ext cx="10803298" cy="863644"/>
-            <a:chOff x="591645" y="368734"/>
-            <a:chExt cx="10803298" cy="863644"/>
-          </a:xfrm>
-        </p:grpSpPr>
-        <p:pic>
-          <p:nvPicPr>
-            <p:cNvPr id="5" name="Picture 4">
-              <a:extLst>
-                <a:ext uri="{FF2B5EF4-FFF2-40B4-BE49-F238E27FC236}">
-                  <a16:creationId xmlns:a16="http://schemas.microsoft.com/office/drawing/2014/main" id="{F685A961-0326-493A-8B03-8FB4C1C0458C}"/>
-                </a:ext>
-              </a:extLst>
-            </p:cNvPr>
-            <p:cNvPicPr>
-              <a:picLocks noChangeAspect="1"/>
-            </p:cNvPicPr>
-            <p:nvPr/>
-          </p:nvPicPr>
-          <p:blipFill>
-            <a:blip r:embed="rId2">
-              <a:extLst>
-                <a:ext uri="{28A0092B-C50C-407E-A947-70E740481C1C}">
-                  <a14:useLocalDpi xmlns:a14="http://schemas.microsoft.com/office/drawing/2010/main" val="0"/>
-                </a:ext>
-              </a:extLst>
-            </a:blip>
-            <a:stretch>
-              <a:fillRect/>
-            </a:stretch>
-          </p:blipFill>
-          <p:spPr>
-            <a:xfrm>
-              <a:off x="1570988" y="368734"/>
-              <a:ext cx="9823955" cy="863644"/>
-            </a:xfrm>
-            <a:prstGeom prst="rect">
-              <a:avLst/>
-            </a:prstGeom>
-          </p:spPr>
-        </p:pic>
-        <p:pic>
-          <p:nvPicPr>
-            <p:cNvPr id="16" name="Picture 4">
-              <a:extLst>
-                <a:ext uri="{FF2B5EF4-FFF2-40B4-BE49-F238E27FC236}">
-                  <a16:creationId xmlns:a16="http://schemas.microsoft.com/office/drawing/2014/main" id="{8EEF5CFD-BE3B-4325-813E-0FE18760F972}"/>
-                </a:ext>
-              </a:extLst>
-            </p:cNvPr>
-            <p:cNvPicPr>
-              <a:picLocks noChangeAspect="1" noChangeArrowheads="1"/>
-            </p:cNvPicPr>
-            <p:nvPr/>
-          </p:nvPicPr>
-          <p:blipFill>
-            <a:blip r:embed="rId3">
-              <a:extLst>
-                <a:ext uri="{28A0092B-C50C-407E-A947-70E740481C1C}">
-                  <a14:useLocalDpi xmlns:a14="http://schemas.microsoft.com/office/drawing/2010/main" val="0"/>
-                </a:ext>
-              </a:extLst>
-            </a:blip>
-            <a:srcRect/>
-            <a:stretch>
-              <a:fillRect/>
-            </a:stretch>
-          </p:blipFill>
-          <p:spPr bwMode="auto">
-            <a:xfrm>
-              <a:off x="591645" y="420022"/>
-              <a:ext cx="709904" cy="690562"/>
-            </a:xfrm>
-            <a:prstGeom prst="rect">
-              <a:avLst/>
-            </a:prstGeom>
-            <a:noFill/>
-            <a:extLst>
-              <a:ext uri="{909E8E84-426E-40DD-AFC4-6F175D3DCCD1}">
-                <a14:hiddenFill xmlns:a14="http://schemas.microsoft.com/office/drawing/2010/main">
-                  <a:solidFill>
-                    <a:srgbClr val="FFFFFF"/>
-                  </a:solidFill>
-                </a14:hiddenFill>
-              </a:ext>
-            </a:extLst>
-          </p:spPr>
-        </p:pic>
-      </p:grpSp>
-      <p:pic>
-        <p:nvPicPr>
-          <p:cNvPr id="4100" name="Picture 4" descr="Intellectual Property Officer, Center for Technology Licensing at Cornell  University - Vortechs Group">
-            <a:extLst>
-              <a:ext uri="{FF2B5EF4-FFF2-40B4-BE49-F238E27FC236}">
-                <a16:creationId xmlns:a16="http://schemas.microsoft.com/office/drawing/2014/main" id="{0609AFD2-FFE2-40E9-91D2-CAD7E959791C}"/>
-              </a:ext>
-            </a:extLst>
-          </p:cNvPr>
-          <p:cNvPicPr>
-            <a:picLocks noChangeAspect="1" noChangeArrowheads="1"/>
-          </p:cNvPicPr>
-          <p:nvPr/>
-        </p:nvPicPr>
-        <p:blipFill>
-          <a:blip r:embed="rId4">
-            <a:extLst>
-              <a:ext uri="{28A0092B-C50C-407E-A947-70E740481C1C}">
-                <a14:useLocalDpi xmlns:a14="http://schemas.microsoft.com/office/drawing/2010/main" val="0"/>
-              </a:ext>
-            </a:extLst>
-          </a:blip>
-          <a:srcRect/>
-          <a:stretch>
-            <a:fillRect/>
-          </a:stretch>
-        </p:blipFill>
-        <p:spPr bwMode="auto">
-          <a:xfrm>
-            <a:off x="4046773" y="1451142"/>
-            <a:ext cx="4022254" cy="2262518"/>
-          </a:xfrm>
-          <a:prstGeom prst="rect">
-            <a:avLst/>
-          </a:prstGeom>
-          <a:noFill/>
-          <a:extLst>
-            <a:ext uri="{909E8E84-426E-40DD-AFC4-6F175D3DCCD1}">
-              <a14:hiddenFill xmlns:a14="http://schemas.microsoft.com/office/drawing/2010/main">
-                <a:solidFill>
-                  <a:srgbClr val="FFFFFF"/>
-                </a:solidFill>
-              </a14:hiddenFill>
-            </a:ext>
-          </a:extLst>
-        </p:spPr>
-      </p:pic>
-    </p:spTree>
-    <p:extLst>
-      <p:ext uri="{BB962C8B-B14F-4D97-AF65-F5344CB8AC3E}">
-        <p14:creationId xmlns:p14="http://schemas.microsoft.com/office/powerpoint/2010/main" val="598986591"/>
-      </p:ext>
-    </p:extLst>
-  </p:cSld>
-  <p:clrMapOvr>
-    <a:masterClrMapping/>
-  </p:clrMapOvr>
-</p:sld>
-</file>
-
-<file path=ppt/slides/slide25.xml><?xml version="1.0" encoding="utf-8"?>
 <p:sld xmlns:a="http://schemas.openxmlformats.org/drawingml/2006/main" xmlns:r="http://schemas.openxmlformats.org/officeDocument/2006/relationships" xmlns:p="http://schemas.openxmlformats.org/presentationml/2006/main">
   <p:cSld>
     <p:spTree>

</xml_diff>

<commit_message>
3.4 and 3.5 renamed properly
Finished editing decanters besides git issues.
</commit_message>
<xml_diff>
--- a/Title Designs/Title Designs.pptx
+++ b/Title Designs/Title Designs.pptx
@@ -8,27 +8,29 @@
     <p:sldId id="271" r:id="rId2"/>
     <p:sldId id="272" r:id="rId3"/>
     <p:sldId id="273" r:id="rId4"/>
-    <p:sldId id="274" r:id="rId5"/>
-    <p:sldId id="288" r:id="rId6"/>
-    <p:sldId id="289" r:id="rId7"/>
-    <p:sldId id="290" r:id="rId8"/>
-    <p:sldId id="291" r:id="rId9"/>
-    <p:sldId id="275" r:id="rId10"/>
-    <p:sldId id="277" r:id="rId11"/>
-    <p:sldId id="279" r:id="rId12"/>
-    <p:sldId id="276" r:id="rId13"/>
-    <p:sldId id="280" r:id="rId14"/>
-    <p:sldId id="281" r:id="rId15"/>
-    <p:sldId id="287" r:id="rId16"/>
-    <p:sldId id="282" r:id="rId17"/>
-    <p:sldId id="267" r:id="rId18"/>
-    <p:sldId id="269" r:id="rId19"/>
-    <p:sldId id="283" r:id="rId20"/>
-    <p:sldId id="284" r:id="rId21"/>
-    <p:sldId id="285" r:id="rId22"/>
-    <p:sldId id="268" r:id="rId23"/>
-    <p:sldId id="270" r:id="rId24"/>
-    <p:sldId id="286" r:id="rId25"/>
+    <p:sldId id="292" r:id="rId5"/>
+    <p:sldId id="293" r:id="rId6"/>
+    <p:sldId id="274" r:id="rId7"/>
+    <p:sldId id="288" r:id="rId8"/>
+    <p:sldId id="289" r:id="rId9"/>
+    <p:sldId id="290" r:id="rId10"/>
+    <p:sldId id="291" r:id="rId11"/>
+    <p:sldId id="275" r:id="rId12"/>
+    <p:sldId id="277" r:id="rId13"/>
+    <p:sldId id="279" r:id="rId14"/>
+    <p:sldId id="276" r:id="rId15"/>
+    <p:sldId id="280" r:id="rId16"/>
+    <p:sldId id="281" r:id="rId17"/>
+    <p:sldId id="287" r:id="rId18"/>
+    <p:sldId id="282" r:id="rId19"/>
+    <p:sldId id="267" r:id="rId20"/>
+    <p:sldId id="269" r:id="rId21"/>
+    <p:sldId id="283" r:id="rId22"/>
+    <p:sldId id="284" r:id="rId23"/>
+    <p:sldId id="285" r:id="rId24"/>
+    <p:sldId id="268" r:id="rId25"/>
+    <p:sldId id="270" r:id="rId26"/>
+    <p:sldId id="286" r:id="rId27"/>
   </p:sldIdLst>
   <p:sldSz cx="12192000" cy="6858000"/>
   <p:notesSz cx="6858000" cy="9144000"/>
@@ -293,7 +295,7 @@
           <a:p>
             <a:fld id="{9F6A7E55-DFC4-46CD-9865-1BDB80A917C9}" type="datetimeFigureOut">
               <a:rPr lang="en-US" smtClean="0"/>
-              <a:t>9/23/2021</a:t>
+              <a:t>9/28/2021</a:t>
             </a:fld>
             <a:endParaRPr lang="en-US"/>
           </a:p>
@@ -491,7 +493,7 @@
           <a:p>
             <a:fld id="{9F6A7E55-DFC4-46CD-9865-1BDB80A917C9}" type="datetimeFigureOut">
               <a:rPr lang="en-US" smtClean="0"/>
-              <a:t>9/23/2021</a:t>
+              <a:t>9/28/2021</a:t>
             </a:fld>
             <a:endParaRPr lang="en-US"/>
           </a:p>
@@ -699,7 +701,7 @@
           <a:p>
             <a:fld id="{9F6A7E55-DFC4-46CD-9865-1BDB80A917C9}" type="datetimeFigureOut">
               <a:rPr lang="en-US" smtClean="0"/>
-              <a:t>9/23/2021</a:t>
+              <a:t>9/28/2021</a:t>
             </a:fld>
             <a:endParaRPr lang="en-US"/>
           </a:p>
@@ -897,7 +899,7 @@
           <a:p>
             <a:fld id="{9F6A7E55-DFC4-46CD-9865-1BDB80A917C9}" type="datetimeFigureOut">
               <a:rPr lang="en-US" smtClean="0"/>
-              <a:t>9/23/2021</a:t>
+              <a:t>9/28/2021</a:t>
             </a:fld>
             <a:endParaRPr lang="en-US"/>
           </a:p>
@@ -1172,7 +1174,7 @@
           <a:p>
             <a:fld id="{9F6A7E55-DFC4-46CD-9865-1BDB80A917C9}" type="datetimeFigureOut">
               <a:rPr lang="en-US" smtClean="0"/>
-              <a:t>9/23/2021</a:t>
+              <a:t>9/28/2021</a:t>
             </a:fld>
             <a:endParaRPr lang="en-US"/>
           </a:p>
@@ -1437,7 +1439,7 @@
           <a:p>
             <a:fld id="{9F6A7E55-DFC4-46CD-9865-1BDB80A917C9}" type="datetimeFigureOut">
               <a:rPr lang="en-US" smtClean="0"/>
-              <a:t>9/23/2021</a:t>
+              <a:t>9/28/2021</a:t>
             </a:fld>
             <a:endParaRPr lang="en-US"/>
           </a:p>
@@ -1849,7 +1851,7 @@
           <a:p>
             <a:fld id="{9F6A7E55-DFC4-46CD-9865-1BDB80A917C9}" type="datetimeFigureOut">
               <a:rPr lang="en-US" smtClean="0"/>
-              <a:t>9/23/2021</a:t>
+              <a:t>9/28/2021</a:t>
             </a:fld>
             <a:endParaRPr lang="en-US"/>
           </a:p>
@@ -1990,7 +1992,7 @@
           <a:p>
             <a:fld id="{9F6A7E55-DFC4-46CD-9865-1BDB80A917C9}" type="datetimeFigureOut">
               <a:rPr lang="en-US" smtClean="0"/>
-              <a:t>9/23/2021</a:t>
+              <a:t>9/28/2021</a:t>
             </a:fld>
             <a:endParaRPr lang="en-US"/>
           </a:p>
@@ -2103,7 +2105,7 @@
           <a:p>
             <a:fld id="{9F6A7E55-DFC4-46CD-9865-1BDB80A917C9}" type="datetimeFigureOut">
               <a:rPr lang="en-US" smtClean="0"/>
-              <a:t>9/23/2021</a:t>
+              <a:t>9/28/2021</a:t>
             </a:fld>
             <a:endParaRPr lang="en-US"/>
           </a:p>
@@ -2414,7 +2416,7 @@
           <a:p>
             <a:fld id="{9F6A7E55-DFC4-46CD-9865-1BDB80A917C9}" type="datetimeFigureOut">
               <a:rPr lang="en-US" smtClean="0"/>
-              <a:t>9/23/2021</a:t>
+              <a:t>9/28/2021</a:t>
             </a:fld>
             <a:endParaRPr lang="en-US"/>
           </a:p>
@@ -2702,7 +2704,7 @@
           <a:p>
             <a:fld id="{9F6A7E55-DFC4-46CD-9865-1BDB80A917C9}" type="datetimeFigureOut">
               <a:rPr lang="en-US" smtClean="0"/>
-              <a:t>9/23/2021</a:t>
+              <a:t>9/28/2021</a:t>
             </a:fld>
             <a:endParaRPr lang="en-US"/>
           </a:p>
@@ -2943,7 +2945,7 @@
           <a:p>
             <a:fld id="{9F6A7E55-DFC4-46CD-9865-1BDB80A917C9}" type="datetimeFigureOut">
               <a:rPr lang="en-US" smtClean="0"/>
-              <a:t>9/23/2021</a:t>
+              <a:t>9/28/2021</a:t>
             </a:fld>
             <a:endParaRPr lang="en-US"/>
           </a:p>
@@ -3704,7 +3706,7 @@
               <a:rPr lang="en-US" sz="4400" dirty="0">
                 <a:latin typeface="Franklin Gothic Demi" panose="020B0703020102020204" pitchFamily="34" charset="0"/>
               </a:rPr>
-              <a:t>Chapter 5: Heat Exchangers</a:t>
+              <a:t>Chapter 4: Solids and Solid Separators</a:t>
             </a:r>
           </a:p>
         </p:txBody>
@@ -3748,7 +3750,7 @@
                 </a:solidFill>
                 <a:latin typeface="Palatino Linotype" panose="02040502050505030304" pitchFamily="18" charset="0"/>
               </a:rPr>
-              <a:t>5.2 Rigorous Heat Exchanger Model</a:t>
+              <a:t>4.5 Ethyl Acetate Plant Dryer</a:t>
             </a:r>
           </a:p>
         </p:txBody>
@@ -3951,7 +3953,7 @@
     </p:spTree>
     <p:extLst>
       <p:ext uri="{BB962C8B-B14F-4D97-AF65-F5344CB8AC3E}">
-        <p14:creationId xmlns:p14="http://schemas.microsoft.com/office/powerpoint/2010/main" val="3094772626"/>
+        <p14:creationId xmlns:p14="http://schemas.microsoft.com/office/powerpoint/2010/main" val="1171978533"/>
       </p:ext>
     </p:extLst>
   </p:cSld>
@@ -4051,22 +4053,13 @@
           <a:p>
             <a:pPr algn="ctr"/>
             <a:r>
-              <a:rPr lang="en-US" sz="3200">
-                <a:solidFill>
-                  <a:srgbClr val="4D4E53"/>
-                </a:solidFill>
-                <a:latin typeface="Palatino Linotype" panose="02040502050505030304" pitchFamily="18" charset="0"/>
-              </a:rPr>
-              <a:t>5.3 Ethyl Acetate Plant </a:t>
-            </a:r>
-            <a:r>
               <a:rPr lang="en-US" sz="3200" dirty="0">
                 <a:solidFill>
                   <a:srgbClr val="4D4E53"/>
                 </a:solidFill>
                 <a:latin typeface="Palatino Linotype" panose="02040502050505030304" pitchFamily="18" charset="0"/>
               </a:rPr>
-              <a:t>Heat Exchanger</a:t>
+              <a:t>5.1 Shortcut Heat Exchanger Model</a:t>
             </a:r>
           </a:p>
         </p:txBody>
@@ -4269,7 +4262,7 @@
     </p:spTree>
     <p:extLst>
       <p:ext uri="{BB962C8B-B14F-4D97-AF65-F5344CB8AC3E}">
-        <p14:creationId xmlns:p14="http://schemas.microsoft.com/office/powerpoint/2010/main" val="2001936663"/>
+        <p14:creationId xmlns:p14="http://schemas.microsoft.com/office/powerpoint/2010/main" val="3914296768"/>
       </p:ext>
     </p:extLst>
   </p:cSld>
@@ -4331,7 +4324,7 @@
               <a:rPr lang="en-US" sz="4400" dirty="0">
                 <a:latin typeface="Franklin Gothic Demi" panose="020B0703020102020204" pitchFamily="34" charset="0"/>
               </a:rPr>
-              <a:t>Chapter 6: Pressure Changers</a:t>
+              <a:t>Chapter 5: Heat Exchangers</a:t>
             </a:r>
           </a:p>
         </p:txBody>
@@ -4375,7 +4368,7 @@
                 </a:solidFill>
                 <a:latin typeface="Palatino Linotype" panose="02040502050505030304" pitchFamily="18" charset="0"/>
               </a:rPr>
-              <a:t>6.1 Pumps</a:t>
+              <a:t>5.2 Rigorous Heat Exchanger Model</a:t>
             </a:r>
           </a:p>
         </p:txBody>
@@ -4578,7 +4571,7 @@
     </p:spTree>
     <p:extLst>
       <p:ext uri="{BB962C8B-B14F-4D97-AF65-F5344CB8AC3E}">
-        <p14:creationId xmlns:p14="http://schemas.microsoft.com/office/powerpoint/2010/main" val="594451192"/>
+        <p14:creationId xmlns:p14="http://schemas.microsoft.com/office/powerpoint/2010/main" val="3094772626"/>
       </p:ext>
     </p:extLst>
   </p:cSld>
@@ -4640,7 +4633,7 @@
               <a:rPr lang="en-US" sz="4400" dirty="0">
                 <a:latin typeface="Franklin Gothic Demi" panose="020B0703020102020204" pitchFamily="34" charset="0"/>
               </a:rPr>
-              <a:t>Chapter 6: Pressure Changers</a:t>
+              <a:t>Chapter 5: Heat Exchangers</a:t>
             </a:r>
           </a:p>
         </p:txBody>
@@ -4678,13 +4671,22 @@
           <a:p>
             <a:pPr algn="ctr"/>
             <a:r>
+              <a:rPr lang="en-US" sz="3200">
+                <a:solidFill>
+                  <a:srgbClr val="4D4E53"/>
+                </a:solidFill>
+                <a:latin typeface="Palatino Linotype" panose="02040502050505030304" pitchFamily="18" charset="0"/>
+              </a:rPr>
+              <a:t>5.3 Ethyl Acetate Plant </a:t>
+            </a:r>
+            <a:r>
               <a:rPr lang="en-US" sz="3200" dirty="0">
                 <a:solidFill>
                   <a:srgbClr val="4D4E53"/>
                 </a:solidFill>
                 <a:latin typeface="Palatino Linotype" panose="02040502050505030304" pitchFamily="18" charset="0"/>
               </a:rPr>
-              <a:t>6.2 Compressors</a:t>
+              <a:t>Heat Exchanger</a:t>
             </a:r>
           </a:p>
         </p:txBody>
@@ -4887,7 +4889,7 @@
     </p:spTree>
     <p:extLst>
       <p:ext uri="{BB962C8B-B14F-4D97-AF65-F5344CB8AC3E}">
-        <p14:creationId xmlns:p14="http://schemas.microsoft.com/office/powerpoint/2010/main" val="2022873747"/>
+        <p14:creationId xmlns:p14="http://schemas.microsoft.com/office/powerpoint/2010/main" val="2001936663"/>
       </p:ext>
     </p:extLst>
   </p:cSld>
@@ -4993,7 +4995,7 @@
                 </a:solidFill>
                 <a:latin typeface="Palatino Linotype" panose="02040502050505030304" pitchFamily="18" charset="0"/>
               </a:rPr>
-              <a:t>6.3 Pipes</a:t>
+              <a:t>6.1 Pumps</a:t>
             </a:r>
           </a:p>
         </p:txBody>
@@ -5196,7 +5198,7 @@
     </p:spTree>
     <p:extLst>
       <p:ext uri="{BB962C8B-B14F-4D97-AF65-F5344CB8AC3E}">
-        <p14:creationId xmlns:p14="http://schemas.microsoft.com/office/powerpoint/2010/main" val="80787561"/>
+        <p14:creationId xmlns:p14="http://schemas.microsoft.com/office/powerpoint/2010/main" val="594451192"/>
       </p:ext>
     </p:extLst>
   </p:cSld>
@@ -5302,7 +5304,7 @@
                 </a:solidFill>
                 <a:latin typeface="Palatino Linotype" panose="02040502050505030304" pitchFamily="18" charset="0"/>
               </a:rPr>
-              <a:t>6.4 Valves</a:t>
+              <a:t>6.2 Compressors</a:t>
             </a:r>
           </a:p>
         </p:txBody>
@@ -5505,7 +5507,7 @@
     </p:spTree>
     <p:extLst>
       <p:ext uri="{BB962C8B-B14F-4D97-AF65-F5344CB8AC3E}">
-        <p14:creationId xmlns:p14="http://schemas.microsoft.com/office/powerpoint/2010/main" val="149539290"/>
+        <p14:creationId xmlns:p14="http://schemas.microsoft.com/office/powerpoint/2010/main" val="2022873747"/>
       </p:ext>
     </p:extLst>
   </p:cSld>
@@ -5611,7 +5613,7 @@
                 </a:solidFill>
                 <a:latin typeface="Palatino Linotype" panose="02040502050505030304" pitchFamily="18" charset="0"/>
               </a:rPr>
-              <a:t>6.5 Ethyl Acetate Plant Pressure Changers</a:t>
+              <a:t>6.3 Pipes</a:t>
             </a:r>
           </a:p>
         </p:txBody>
@@ -5814,7 +5816,7 @@
     </p:spTree>
     <p:extLst>
       <p:ext uri="{BB962C8B-B14F-4D97-AF65-F5344CB8AC3E}">
-        <p14:creationId xmlns:p14="http://schemas.microsoft.com/office/powerpoint/2010/main" val="42729710"/>
+        <p14:creationId xmlns:p14="http://schemas.microsoft.com/office/powerpoint/2010/main" val="80787561"/>
       </p:ext>
     </p:extLst>
   </p:cSld>
@@ -5859,7 +5861,7 @@
         </p:nvSpPr>
         <p:spPr>
           <a:xfrm>
-            <a:off x="144780" y="5016877"/>
+            <a:off x="144779" y="4786090"/>
             <a:ext cx="11902439" cy="1246495"/>
           </a:xfrm>
           <a:ln>
@@ -5876,17 +5878,17 @@
               <a:rPr lang="en-US" sz="4400" dirty="0">
                 <a:latin typeface="Franklin Gothic Demi" panose="020B0703020102020204" pitchFamily="34" charset="0"/>
               </a:rPr>
-              <a:t>Chapter 7: Ethyl Acetate Production Plant</a:t>
-            </a:r>
-          </a:p>
-        </p:txBody>
-      </p:sp>
-      <p:sp>
-        <p:nvSpPr>
-          <p:cNvPr id="12" name="TextBox 11">
-            <a:extLst>
-              <a:ext uri="{FF2B5EF4-FFF2-40B4-BE49-F238E27FC236}">
-                <a16:creationId xmlns:a16="http://schemas.microsoft.com/office/drawing/2014/main" id="{65EFFB45-2256-41F0-B651-136B5ECC47D8}"/>
+              <a:t>Chapter 6: Pressure Changers</a:t>
+            </a:r>
+          </a:p>
+        </p:txBody>
+      </p:sp>
+      <p:sp>
+        <p:nvSpPr>
+          <p:cNvPr id="13" name="TextBox 12">
+            <a:extLst>
+              <a:ext uri="{FF2B5EF4-FFF2-40B4-BE49-F238E27FC236}">
+                <a16:creationId xmlns:a16="http://schemas.microsoft.com/office/drawing/2014/main" id="{CB9CFEEB-613D-4ADB-AB7E-7E2D4DA2BB5E}"/>
               </a:ext>
             </a:extLst>
           </p:cNvPr>
@@ -5895,7 +5897,51 @@
         </p:nvSpPr>
         <p:spPr>
           <a:xfrm>
-            <a:off x="144780" y="3875157"/>
+            <a:off x="144779" y="5815591"/>
+            <a:ext cx="11902439" cy="584775"/>
+          </a:xfrm>
+          <a:prstGeom prst="rect">
+            <a:avLst/>
+          </a:prstGeom>
+          <a:noFill/>
+          <a:ln>
+            <a:noFill/>
+          </a:ln>
+        </p:spPr>
+        <p:txBody>
+          <a:bodyPr wrap="square" rtlCol="0" anchor="ctr">
+            <a:spAutoFit/>
+          </a:bodyPr>
+          <a:lstStyle/>
+          <a:p>
+            <a:pPr algn="ctr"/>
+            <a:r>
+              <a:rPr lang="en-US" sz="3200" dirty="0">
+                <a:solidFill>
+                  <a:srgbClr val="4D4E53"/>
+                </a:solidFill>
+                <a:latin typeface="Palatino Linotype" panose="02040502050505030304" pitchFamily="18" charset="0"/>
+              </a:rPr>
+              <a:t>6.4 Valves</a:t>
+            </a:r>
+          </a:p>
+        </p:txBody>
+      </p:sp>
+      <p:sp>
+        <p:nvSpPr>
+          <p:cNvPr id="12" name="TextBox 11">
+            <a:extLst>
+              <a:ext uri="{FF2B5EF4-FFF2-40B4-BE49-F238E27FC236}">
+                <a16:creationId xmlns:a16="http://schemas.microsoft.com/office/drawing/2014/main" id="{65EFFB45-2256-41F0-B651-136B5ECC47D8}"/>
+              </a:ext>
+            </a:extLst>
+          </p:cNvPr>
+          <p:cNvSpPr txBox="1"/>
+          <p:nvPr/>
+        </p:nvSpPr>
+        <p:spPr>
+          <a:xfrm>
+            <a:off x="144780" y="3770382"/>
             <a:ext cx="11902439" cy="1246495"/>
           </a:xfrm>
           <a:prstGeom prst="rect">
@@ -6058,7 +6104,7 @@
         </p:blipFill>
         <p:spPr bwMode="auto">
           <a:xfrm>
-            <a:off x="4046773" y="1489242"/>
+            <a:off x="4046773" y="1451142"/>
             <a:ext cx="4022254" cy="2262518"/>
           </a:xfrm>
           <a:prstGeom prst="rect">
@@ -6079,7 +6125,7 @@
     </p:spTree>
     <p:extLst>
       <p:ext uri="{BB962C8B-B14F-4D97-AF65-F5344CB8AC3E}">
-        <p14:creationId xmlns:p14="http://schemas.microsoft.com/office/powerpoint/2010/main" val="3807671136"/>
+        <p14:creationId xmlns:p14="http://schemas.microsoft.com/office/powerpoint/2010/main" val="149539290"/>
       </p:ext>
     </p:extLst>
   </p:cSld>
@@ -6141,7 +6187,7 @@
               <a:rPr lang="en-US" sz="4400" dirty="0">
                 <a:latin typeface="Franklin Gothic Demi" panose="020B0703020102020204" pitchFamily="34" charset="0"/>
               </a:rPr>
-              <a:t>Chapter 7: Advanced Principles of Aspen Plus</a:t>
+              <a:t>Chapter 6: Pressure Changers</a:t>
             </a:r>
           </a:p>
         </p:txBody>
@@ -6160,8 +6206,8 @@
         </p:nvSpPr>
         <p:spPr>
           <a:xfrm>
-            <a:off x="144779" y="5838675"/>
-            <a:ext cx="11902439" cy="538609"/>
+            <a:off x="144779" y="5815591"/>
+            <a:ext cx="11902439" cy="584775"/>
           </a:xfrm>
           <a:prstGeom prst="rect">
             <a:avLst/>
@@ -6179,13 +6225,13 @@
           <a:p>
             <a:pPr algn="ctr"/>
             <a:r>
-              <a:rPr lang="en-US" sz="2800" dirty="0">
+              <a:rPr lang="en-US" sz="3200" dirty="0">
                 <a:solidFill>
                   <a:srgbClr val="4D4E53"/>
                 </a:solidFill>
                 <a:latin typeface="Palatino Linotype" panose="02040502050505030304" pitchFamily="18" charset="0"/>
               </a:rPr>
-              <a:t>7.1 Finding Thermophysical Properties and Generating TXY Diagrams</a:t>
+              <a:t>6.5 Ethyl Acetate Plant Pressure Changers</a:t>
             </a:r>
           </a:p>
         </p:txBody>
@@ -6388,7 +6434,7 @@
     </p:spTree>
     <p:extLst>
       <p:ext uri="{BB962C8B-B14F-4D97-AF65-F5344CB8AC3E}">
-        <p14:creationId xmlns:p14="http://schemas.microsoft.com/office/powerpoint/2010/main" val="3160527228"/>
+        <p14:creationId xmlns:p14="http://schemas.microsoft.com/office/powerpoint/2010/main" val="42729710"/>
       </p:ext>
     </p:extLst>
   </p:cSld>
@@ -6433,7 +6479,7 @@
         </p:nvSpPr>
         <p:spPr>
           <a:xfrm>
-            <a:off x="144779" y="4786090"/>
+            <a:off x="144780" y="5016877"/>
             <a:ext cx="11902439" cy="1246495"/>
           </a:xfrm>
           <a:ln>
@@ -6450,17 +6496,17 @@
               <a:rPr lang="en-US" sz="4400" dirty="0">
                 <a:latin typeface="Franklin Gothic Demi" panose="020B0703020102020204" pitchFamily="34" charset="0"/>
               </a:rPr>
-              <a:t>Chapter 7: Advanced Principles of Aspen Plus</a:t>
-            </a:r>
-          </a:p>
-        </p:txBody>
-      </p:sp>
-      <p:sp>
-        <p:nvSpPr>
-          <p:cNvPr id="13" name="TextBox 12">
-            <a:extLst>
-              <a:ext uri="{FF2B5EF4-FFF2-40B4-BE49-F238E27FC236}">
-                <a16:creationId xmlns:a16="http://schemas.microsoft.com/office/drawing/2014/main" id="{CB9CFEEB-613D-4ADB-AB7E-7E2D4DA2BB5E}"/>
+              <a:t>Chapter 7: Ethyl Acetate Production Plant</a:t>
+            </a:r>
+          </a:p>
+        </p:txBody>
+      </p:sp>
+      <p:sp>
+        <p:nvSpPr>
+          <p:cNvPr id="12" name="TextBox 11">
+            <a:extLst>
+              <a:ext uri="{FF2B5EF4-FFF2-40B4-BE49-F238E27FC236}">
+                <a16:creationId xmlns:a16="http://schemas.microsoft.com/office/drawing/2014/main" id="{65EFFB45-2256-41F0-B651-136B5ECC47D8}"/>
               </a:ext>
             </a:extLst>
           </p:cNvPr>
@@ -6469,51 +6515,7 @@
         </p:nvSpPr>
         <p:spPr>
           <a:xfrm>
-            <a:off x="144779" y="5815592"/>
-            <a:ext cx="11902439" cy="584775"/>
-          </a:xfrm>
-          <a:prstGeom prst="rect">
-            <a:avLst/>
-          </a:prstGeom>
-          <a:noFill/>
-          <a:ln>
-            <a:noFill/>
-          </a:ln>
-        </p:spPr>
-        <p:txBody>
-          <a:bodyPr wrap="square" rtlCol="0" anchor="ctr">
-            <a:spAutoFit/>
-          </a:bodyPr>
-          <a:lstStyle/>
-          <a:p>
-            <a:pPr algn="ctr"/>
-            <a:r>
-              <a:rPr lang="en-US" sz="3200" dirty="0">
-                <a:solidFill>
-                  <a:srgbClr val="4D4E53"/>
-                </a:solidFill>
-                <a:latin typeface="Palatino Linotype" panose="02040502050505030304" pitchFamily="18" charset="0"/>
-              </a:rPr>
-              <a:t>7.2 Design Specifications</a:t>
-            </a:r>
-          </a:p>
-        </p:txBody>
-      </p:sp>
-      <p:sp>
-        <p:nvSpPr>
-          <p:cNvPr id="12" name="TextBox 11">
-            <a:extLst>
-              <a:ext uri="{FF2B5EF4-FFF2-40B4-BE49-F238E27FC236}">
-                <a16:creationId xmlns:a16="http://schemas.microsoft.com/office/drawing/2014/main" id="{65EFFB45-2256-41F0-B651-136B5ECC47D8}"/>
-              </a:ext>
-            </a:extLst>
-          </p:cNvPr>
-          <p:cNvSpPr txBox="1"/>
-          <p:nvPr/>
-        </p:nvSpPr>
-        <p:spPr>
-          <a:xfrm>
-            <a:off x="144780" y="3770382"/>
+            <a:off x="144780" y="3875157"/>
             <a:ext cx="11902439" cy="1246495"/>
           </a:xfrm>
           <a:prstGeom prst="rect">
@@ -6676,7 +6678,7 @@
         </p:blipFill>
         <p:spPr bwMode="auto">
           <a:xfrm>
-            <a:off x="4046773" y="1451142"/>
+            <a:off x="4046773" y="1489242"/>
             <a:ext cx="4022254" cy="2262518"/>
           </a:xfrm>
           <a:prstGeom prst="rect">
@@ -6697,7 +6699,7 @@
     </p:spTree>
     <p:extLst>
       <p:ext uri="{BB962C8B-B14F-4D97-AF65-F5344CB8AC3E}">
-        <p14:creationId xmlns:p14="http://schemas.microsoft.com/office/powerpoint/2010/main" val="3453843008"/>
+        <p14:creationId xmlns:p14="http://schemas.microsoft.com/office/powerpoint/2010/main" val="3807671136"/>
       </p:ext>
     </p:extLst>
   </p:cSld>
@@ -7087,8 +7089,8 @@
         </p:nvSpPr>
         <p:spPr>
           <a:xfrm>
-            <a:off x="144779" y="5815592"/>
-            <a:ext cx="11902439" cy="584775"/>
+            <a:off x="144779" y="5838675"/>
+            <a:ext cx="11902439" cy="538609"/>
           </a:xfrm>
           <a:prstGeom prst="rect">
             <a:avLst/>
@@ -7106,13 +7108,13 @@
           <a:p>
             <a:pPr algn="ctr"/>
             <a:r>
-              <a:rPr lang="en-US" sz="3200" dirty="0">
+              <a:rPr lang="en-US" sz="2800" dirty="0">
                 <a:solidFill>
                   <a:srgbClr val="4D4E53"/>
                 </a:solidFill>
                 <a:latin typeface="Palatino Linotype" panose="02040502050505030304" pitchFamily="18" charset="0"/>
               </a:rPr>
-              <a:t>7.3 Running a Sensitivity Analysis</a:t>
+              <a:t>7.1 Finding Thermophysical Properties and Generating TXY Diagrams</a:t>
             </a:r>
           </a:p>
         </p:txBody>
@@ -7315,7 +7317,7 @@
     </p:spTree>
     <p:extLst>
       <p:ext uri="{BB962C8B-B14F-4D97-AF65-F5344CB8AC3E}">
-        <p14:creationId xmlns:p14="http://schemas.microsoft.com/office/powerpoint/2010/main" val="1025950290"/>
+        <p14:creationId xmlns:p14="http://schemas.microsoft.com/office/powerpoint/2010/main" val="3160527228"/>
       </p:ext>
     </p:extLst>
   </p:cSld>
@@ -7421,7 +7423,7 @@
                 </a:solidFill>
                 <a:latin typeface="Palatino Linotype" panose="02040502050505030304" pitchFamily="18" charset="0"/>
               </a:rPr>
-              <a:t>7.4 Calculator Blocks</a:t>
+              <a:t>7.2 Design Specifications</a:t>
             </a:r>
           </a:p>
         </p:txBody>
@@ -7624,7 +7626,7 @@
     </p:spTree>
     <p:extLst>
       <p:ext uri="{BB962C8B-B14F-4D97-AF65-F5344CB8AC3E}">
-        <p14:creationId xmlns:p14="http://schemas.microsoft.com/office/powerpoint/2010/main" val="2392678193"/>
+        <p14:creationId xmlns:p14="http://schemas.microsoft.com/office/powerpoint/2010/main" val="3453843008"/>
       </p:ext>
     </p:extLst>
   </p:cSld>
@@ -7686,7 +7688,7 @@
               <a:rPr lang="en-US" sz="4400" dirty="0">
                 <a:latin typeface="Franklin Gothic Demi" panose="020B0703020102020204" pitchFamily="34" charset="0"/>
               </a:rPr>
-              <a:t>Chapter 8: Batch Models</a:t>
+              <a:t>Chapter 7: Advanced Principles of Aspen Plus</a:t>
             </a:r>
           </a:p>
         </p:txBody>
@@ -7705,7 +7707,7 @@
         </p:nvSpPr>
         <p:spPr>
           <a:xfrm>
-            <a:off x="144779" y="5815591"/>
+            <a:off x="144779" y="5815592"/>
             <a:ext cx="11902439" cy="584775"/>
           </a:xfrm>
           <a:prstGeom prst="rect">
@@ -7730,7 +7732,7 @@
                 </a:solidFill>
                 <a:latin typeface="Palatino Linotype" panose="02040502050505030304" pitchFamily="18" charset="0"/>
               </a:rPr>
-              <a:t>8.1 Batch Reactors</a:t>
+              <a:t>7.3 Running a Sensitivity Analysis</a:t>
             </a:r>
           </a:p>
         </p:txBody>
@@ -7933,7 +7935,7 @@
     </p:spTree>
     <p:extLst>
       <p:ext uri="{BB962C8B-B14F-4D97-AF65-F5344CB8AC3E}">
-        <p14:creationId xmlns:p14="http://schemas.microsoft.com/office/powerpoint/2010/main" val="1611154029"/>
+        <p14:creationId xmlns:p14="http://schemas.microsoft.com/office/powerpoint/2010/main" val="1025950290"/>
       </p:ext>
     </p:extLst>
   </p:cSld>
@@ -7995,7 +7997,7 @@
               <a:rPr lang="en-US" sz="4400" dirty="0">
                 <a:latin typeface="Franklin Gothic Demi" panose="020B0703020102020204" pitchFamily="34" charset="0"/>
               </a:rPr>
-              <a:t>Chapter 10: Appendix</a:t>
+              <a:t>Chapter 7: Advanced Principles of Aspen Plus</a:t>
             </a:r>
           </a:p>
         </p:txBody>
@@ -8014,7 +8016,7 @@
         </p:nvSpPr>
         <p:spPr>
           <a:xfrm>
-            <a:off x="144779" y="5815591"/>
+            <a:off x="144779" y="5815592"/>
             <a:ext cx="11902439" cy="584775"/>
           </a:xfrm>
           <a:prstGeom prst="rect">
@@ -8039,7 +8041,7 @@
                 </a:solidFill>
                 <a:latin typeface="Palatino Linotype" panose="02040502050505030304" pitchFamily="18" charset="0"/>
               </a:rPr>
-              <a:t>10.1 Tips and Tricks</a:t>
+              <a:t>7.4 Calculator Blocks</a:t>
             </a:r>
           </a:p>
         </p:txBody>
@@ -8242,7 +8244,7 @@
     </p:spTree>
     <p:extLst>
       <p:ext uri="{BB962C8B-B14F-4D97-AF65-F5344CB8AC3E}">
-        <p14:creationId xmlns:p14="http://schemas.microsoft.com/office/powerpoint/2010/main" val="598986591"/>
+        <p14:creationId xmlns:p14="http://schemas.microsoft.com/office/powerpoint/2010/main" val="2392678193"/>
       </p:ext>
     </p:extLst>
   </p:cSld>
@@ -8304,7 +8306,7 @@
               <a:rPr lang="en-US" sz="4400" dirty="0">
                 <a:latin typeface="Franklin Gothic Demi" panose="020B0703020102020204" pitchFamily="34" charset="0"/>
               </a:rPr>
-              <a:t>Chapter 10: Appendix</a:t>
+              <a:t>Chapter 8: Batch Models</a:t>
             </a:r>
           </a:p>
         </p:txBody>
@@ -8348,7 +8350,7 @@
                 </a:solidFill>
                 <a:latin typeface="Palatino Linotype" panose="02040502050505030304" pitchFamily="18" charset="0"/>
               </a:rPr>
-              <a:t>10.2 Financial Analysis</a:t>
+              <a:t>8.1 Batch Reactors</a:t>
             </a:r>
           </a:p>
         </p:txBody>
@@ -8551,7 +8553,7 @@
     </p:spTree>
     <p:extLst>
       <p:ext uri="{BB962C8B-B14F-4D97-AF65-F5344CB8AC3E}">
-        <p14:creationId xmlns:p14="http://schemas.microsoft.com/office/powerpoint/2010/main" val="3927957602"/>
+        <p14:creationId xmlns:p14="http://schemas.microsoft.com/office/powerpoint/2010/main" val="1611154029"/>
       </p:ext>
     </p:extLst>
   </p:cSld>
@@ -8561,7 +8563,7 @@
 </p:sld>
 </file>
 
-<file path=ppt/slides/slide3.xml><?xml version="1.0" encoding="utf-8"?>
+<file path=ppt/slides/slide25.xml><?xml version="1.0" encoding="utf-8"?>
 <p:sld xmlns:a="http://schemas.openxmlformats.org/drawingml/2006/main" xmlns:r="http://schemas.openxmlformats.org/officeDocument/2006/relationships" xmlns:p="http://schemas.openxmlformats.org/presentationml/2006/main">
   <p:cSld>
     <p:spTree>
@@ -8613,7 +8615,7 @@
               <a:rPr lang="en-US" sz="4400" dirty="0">
                 <a:latin typeface="Franklin Gothic Demi" panose="020B0703020102020204" pitchFamily="34" charset="0"/>
               </a:rPr>
-              <a:t>Chapter 3: Separators</a:t>
+              <a:t>Chapter 10: Appendix</a:t>
             </a:r>
           </a:p>
         </p:txBody>
@@ -8657,7 +8659,7 @@
                 </a:solidFill>
                 <a:latin typeface="Palatino Linotype" panose="02040502050505030304" pitchFamily="18" charset="0"/>
               </a:rPr>
-              <a:t>3.1 Flash Separators</a:t>
+              <a:t>10.1 Tips and Tricks</a:t>
             </a:r>
           </a:p>
         </p:txBody>
@@ -8860,7 +8862,7 @@
     </p:spTree>
     <p:extLst>
       <p:ext uri="{BB962C8B-B14F-4D97-AF65-F5344CB8AC3E}">
-        <p14:creationId xmlns:p14="http://schemas.microsoft.com/office/powerpoint/2010/main" val="2409316716"/>
+        <p14:creationId xmlns:p14="http://schemas.microsoft.com/office/powerpoint/2010/main" val="598986591"/>
       </p:ext>
     </p:extLst>
   </p:cSld>
@@ -8870,7 +8872,7 @@
 </p:sld>
 </file>
 
-<file path=ppt/slides/slide4.xml><?xml version="1.0" encoding="utf-8"?>
+<file path=ppt/slides/slide26.xml><?xml version="1.0" encoding="utf-8"?>
 <p:sld xmlns:a="http://schemas.openxmlformats.org/drawingml/2006/main" xmlns:r="http://schemas.openxmlformats.org/officeDocument/2006/relationships" xmlns:p="http://schemas.openxmlformats.org/presentationml/2006/main">
   <p:cSld>
     <p:spTree>
@@ -8922,7 +8924,7 @@
               <a:rPr lang="en-US" sz="4400" dirty="0">
                 <a:latin typeface="Franklin Gothic Demi" panose="020B0703020102020204" pitchFamily="34" charset="0"/>
               </a:rPr>
-              <a:t>Chapter 4: Solids and Solid Separators</a:t>
+              <a:t>Chapter 10: Appendix</a:t>
             </a:r>
           </a:p>
         </p:txBody>
@@ -8966,7 +8968,7 @@
                 </a:solidFill>
                 <a:latin typeface="Palatino Linotype" panose="02040502050505030304" pitchFamily="18" charset="0"/>
               </a:rPr>
-              <a:t>4.1 Solids and Solid Separators Overview</a:t>
+              <a:t>10.2 Financial Analysis</a:t>
             </a:r>
           </a:p>
         </p:txBody>
@@ -9169,7 +9171,7 @@
     </p:spTree>
     <p:extLst>
       <p:ext uri="{BB962C8B-B14F-4D97-AF65-F5344CB8AC3E}">
-        <p14:creationId xmlns:p14="http://schemas.microsoft.com/office/powerpoint/2010/main" val="459946364"/>
+        <p14:creationId xmlns:p14="http://schemas.microsoft.com/office/powerpoint/2010/main" val="3927957602"/>
       </p:ext>
     </p:extLst>
   </p:cSld>
@@ -9179,7 +9181,7 @@
 </p:sld>
 </file>
 
-<file path=ppt/slides/slide5.xml><?xml version="1.0" encoding="utf-8"?>
+<file path=ppt/slides/slide3.xml><?xml version="1.0" encoding="utf-8"?>
 <p:sld xmlns:a="http://schemas.openxmlformats.org/drawingml/2006/main" xmlns:r="http://schemas.openxmlformats.org/officeDocument/2006/relationships" xmlns:p="http://schemas.openxmlformats.org/presentationml/2006/main">
   <p:cSld>
     <p:spTree>
@@ -9231,7 +9233,7 @@
               <a:rPr lang="en-US" sz="4400" dirty="0">
                 <a:latin typeface="Franklin Gothic Demi" panose="020B0703020102020204" pitchFamily="34" charset="0"/>
               </a:rPr>
-              <a:t>Chapter 4: Solids and Solid Separators</a:t>
+              <a:t>Chapter 3: Separators</a:t>
             </a:r>
           </a:p>
         </p:txBody>
@@ -9275,7 +9277,7 @@
                 </a:solidFill>
                 <a:latin typeface="Palatino Linotype" panose="02040502050505030304" pitchFamily="18" charset="0"/>
               </a:rPr>
-              <a:t>4.2 Crystallizer</a:t>
+              <a:t>3.1 Flash Separators</a:t>
             </a:r>
           </a:p>
         </p:txBody>
@@ -9478,7 +9480,7 @@
     </p:spTree>
     <p:extLst>
       <p:ext uri="{BB962C8B-B14F-4D97-AF65-F5344CB8AC3E}">
-        <p14:creationId xmlns:p14="http://schemas.microsoft.com/office/powerpoint/2010/main" val="4042433097"/>
+        <p14:creationId xmlns:p14="http://schemas.microsoft.com/office/powerpoint/2010/main" val="2409316716"/>
       </p:ext>
     </p:extLst>
   </p:cSld>
@@ -9488,7 +9490,7 @@
 </p:sld>
 </file>
 
-<file path=ppt/slides/slide6.xml><?xml version="1.0" encoding="utf-8"?>
+<file path=ppt/slides/slide4.xml><?xml version="1.0" encoding="utf-8"?>
 <p:sld xmlns:a="http://schemas.openxmlformats.org/drawingml/2006/main" xmlns:r="http://schemas.openxmlformats.org/officeDocument/2006/relationships" xmlns:p="http://schemas.openxmlformats.org/presentationml/2006/main">
   <p:cSld>
     <p:spTree>
@@ -9540,7 +9542,7 @@
               <a:rPr lang="en-US" sz="4400" dirty="0">
                 <a:latin typeface="Franklin Gothic Demi" panose="020B0703020102020204" pitchFamily="34" charset="0"/>
               </a:rPr>
-              <a:t>Chapter 4: Solids and Solid Separators</a:t>
+              <a:t>Chapter 3: Separators</a:t>
             </a:r>
           </a:p>
         </p:txBody>
@@ -9584,7 +9586,7 @@
                 </a:solidFill>
                 <a:latin typeface="Palatino Linotype" panose="02040502050505030304" pitchFamily="18" charset="0"/>
               </a:rPr>
-              <a:t>4.3 Dryer</a:t>
+              <a:t>3.4 Decanters</a:t>
             </a:r>
           </a:p>
         </p:txBody>
@@ -9787,7 +9789,7 @@
     </p:spTree>
     <p:extLst>
       <p:ext uri="{BB962C8B-B14F-4D97-AF65-F5344CB8AC3E}">
-        <p14:creationId xmlns:p14="http://schemas.microsoft.com/office/powerpoint/2010/main" val="422364884"/>
+        <p14:creationId xmlns:p14="http://schemas.microsoft.com/office/powerpoint/2010/main" val="2406175825"/>
       </p:ext>
     </p:extLst>
   </p:cSld>
@@ -9797,7 +9799,7 @@
 </p:sld>
 </file>
 
-<file path=ppt/slides/slide7.xml><?xml version="1.0" encoding="utf-8"?>
+<file path=ppt/slides/slide5.xml><?xml version="1.0" encoding="utf-8"?>
 <p:sld xmlns:a="http://schemas.openxmlformats.org/drawingml/2006/main" xmlns:r="http://schemas.openxmlformats.org/officeDocument/2006/relationships" xmlns:p="http://schemas.openxmlformats.org/presentationml/2006/main">
   <p:cSld>
     <p:spTree>
@@ -9849,7 +9851,7 @@
               <a:rPr lang="en-US" sz="4400" dirty="0">
                 <a:latin typeface="Franklin Gothic Demi" panose="020B0703020102020204" pitchFamily="34" charset="0"/>
               </a:rPr>
-              <a:t>Chapter 4: Solids and Solid Separators</a:t>
+              <a:t>Chapter 3: Separators</a:t>
             </a:r>
           </a:p>
         </p:txBody>
@@ -9893,8 +9895,23 @@
                 </a:solidFill>
                 <a:latin typeface="Palatino Linotype" panose="02040502050505030304" pitchFamily="18" charset="0"/>
               </a:rPr>
-              <a:t>4.4 Filtration</a:t>
-            </a:r>
+              <a:t>3.5 Ethyl Acetate Plant </a:t>
+            </a:r>
+            <a:r>
+              <a:rPr lang="en-US" sz="3200">
+                <a:solidFill>
+                  <a:srgbClr val="4D4E53"/>
+                </a:solidFill>
+                <a:latin typeface="Palatino Linotype" panose="02040502050505030304" pitchFamily="18" charset="0"/>
+              </a:rPr>
+              <a:t>Distillation Column</a:t>
+            </a:r>
+            <a:endParaRPr lang="en-US" sz="3200" dirty="0">
+              <a:solidFill>
+                <a:srgbClr val="4D4E53"/>
+              </a:solidFill>
+              <a:latin typeface="Palatino Linotype" panose="02040502050505030304" pitchFamily="18" charset="0"/>
+            </a:endParaRPr>
           </a:p>
         </p:txBody>
       </p:sp>
@@ -10096,7 +10113,7 @@
     </p:spTree>
     <p:extLst>
       <p:ext uri="{BB962C8B-B14F-4D97-AF65-F5344CB8AC3E}">
-        <p14:creationId xmlns:p14="http://schemas.microsoft.com/office/powerpoint/2010/main" val="1659431757"/>
+        <p14:creationId xmlns:p14="http://schemas.microsoft.com/office/powerpoint/2010/main" val="1221229820"/>
       </p:ext>
     </p:extLst>
   </p:cSld>
@@ -10106,7 +10123,7 @@
 </p:sld>
 </file>
 
-<file path=ppt/slides/slide8.xml><?xml version="1.0" encoding="utf-8"?>
+<file path=ppt/slides/slide6.xml><?xml version="1.0" encoding="utf-8"?>
 <p:sld xmlns:a="http://schemas.openxmlformats.org/drawingml/2006/main" xmlns:r="http://schemas.openxmlformats.org/officeDocument/2006/relationships" xmlns:p="http://schemas.openxmlformats.org/presentationml/2006/main">
   <p:cSld>
     <p:spTree>
@@ -10202,7 +10219,7 @@
                 </a:solidFill>
                 <a:latin typeface="Palatino Linotype" panose="02040502050505030304" pitchFamily="18" charset="0"/>
               </a:rPr>
-              <a:t>4.5 Ethyl Acetate Plant Dryer</a:t>
+              <a:t>4.1 Solids and Solid Separators Overview</a:t>
             </a:r>
           </a:p>
         </p:txBody>
@@ -10405,7 +10422,7 @@
     </p:spTree>
     <p:extLst>
       <p:ext uri="{BB962C8B-B14F-4D97-AF65-F5344CB8AC3E}">
-        <p14:creationId xmlns:p14="http://schemas.microsoft.com/office/powerpoint/2010/main" val="1171978533"/>
+        <p14:creationId xmlns:p14="http://schemas.microsoft.com/office/powerpoint/2010/main" val="459946364"/>
       </p:ext>
     </p:extLst>
   </p:cSld>
@@ -10415,7 +10432,7 @@
 </p:sld>
 </file>
 
-<file path=ppt/slides/slide9.xml><?xml version="1.0" encoding="utf-8"?>
+<file path=ppt/slides/slide7.xml><?xml version="1.0" encoding="utf-8"?>
 <p:sld xmlns:a="http://schemas.openxmlformats.org/drawingml/2006/main" xmlns:r="http://schemas.openxmlformats.org/officeDocument/2006/relationships" xmlns:p="http://schemas.openxmlformats.org/presentationml/2006/main">
   <p:cSld>
     <p:spTree>
@@ -10467,7 +10484,7 @@
               <a:rPr lang="en-US" sz="4400" dirty="0">
                 <a:latin typeface="Franklin Gothic Demi" panose="020B0703020102020204" pitchFamily="34" charset="0"/>
               </a:rPr>
-              <a:t>Chapter 5: Heat Exchangers</a:t>
+              <a:t>Chapter 4: Solids and Solid Separators</a:t>
             </a:r>
           </a:p>
         </p:txBody>
@@ -10511,7 +10528,7 @@
                 </a:solidFill>
                 <a:latin typeface="Palatino Linotype" panose="02040502050505030304" pitchFamily="18" charset="0"/>
               </a:rPr>
-              <a:t>5.1 Shortcut Heat Exchanger Model</a:t>
+              <a:t>4.2 Crystallizer</a:t>
             </a:r>
           </a:p>
         </p:txBody>
@@ -10714,7 +10731,625 @@
     </p:spTree>
     <p:extLst>
       <p:ext uri="{BB962C8B-B14F-4D97-AF65-F5344CB8AC3E}">
-        <p14:creationId xmlns:p14="http://schemas.microsoft.com/office/powerpoint/2010/main" val="3914296768"/>
+        <p14:creationId xmlns:p14="http://schemas.microsoft.com/office/powerpoint/2010/main" val="4042433097"/>
+      </p:ext>
+    </p:extLst>
+  </p:cSld>
+  <p:clrMapOvr>
+    <a:masterClrMapping/>
+  </p:clrMapOvr>
+</p:sld>
+</file>
+
+<file path=ppt/slides/slide8.xml><?xml version="1.0" encoding="utf-8"?>
+<p:sld xmlns:a="http://schemas.openxmlformats.org/drawingml/2006/main" xmlns:r="http://schemas.openxmlformats.org/officeDocument/2006/relationships" xmlns:p="http://schemas.openxmlformats.org/presentationml/2006/main">
+  <p:cSld>
+    <p:spTree>
+      <p:nvGrpSpPr>
+        <p:cNvPr id="1" name=""/>
+        <p:cNvGrpSpPr/>
+        <p:nvPr/>
+      </p:nvGrpSpPr>
+      <p:grpSpPr>
+        <a:xfrm>
+          <a:off x="0" y="0"/>
+          <a:ext cx="0" cy="0"/>
+          <a:chOff x="0" y="0"/>
+          <a:chExt cx="0" cy="0"/>
+        </a:xfrm>
+      </p:grpSpPr>
+      <p:sp>
+        <p:nvSpPr>
+          <p:cNvPr id="2" name="Title 1">
+            <a:extLst>
+              <a:ext uri="{FF2B5EF4-FFF2-40B4-BE49-F238E27FC236}">
+                <a16:creationId xmlns:a16="http://schemas.microsoft.com/office/drawing/2014/main" id="{EAEE2CE1-2F3B-4DFE-BF38-6E2208CF6BC3}"/>
+              </a:ext>
+            </a:extLst>
+          </p:cNvPr>
+          <p:cNvSpPr>
+            <a:spLocks noGrp="1"/>
+          </p:cNvSpPr>
+          <p:nvPr>
+            <p:ph type="ctrTitle"/>
+          </p:nvPr>
+        </p:nvSpPr>
+        <p:spPr>
+          <a:xfrm>
+            <a:off x="144779" y="4786090"/>
+            <a:ext cx="11902439" cy="1246495"/>
+          </a:xfrm>
+          <a:ln>
+            <a:noFill/>
+          </a:ln>
+        </p:spPr>
+        <p:txBody>
+          <a:bodyPr anchor="ctr">
+            <a:noAutofit/>
+          </a:bodyPr>
+          <a:lstStyle/>
+          <a:p>
+            <a:r>
+              <a:rPr lang="en-US" sz="4400" dirty="0">
+                <a:latin typeface="Franklin Gothic Demi" panose="020B0703020102020204" pitchFamily="34" charset="0"/>
+              </a:rPr>
+              <a:t>Chapter 4: Solids and Solid Separators</a:t>
+            </a:r>
+          </a:p>
+        </p:txBody>
+      </p:sp>
+      <p:sp>
+        <p:nvSpPr>
+          <p:cNvPr id="13" name="TextBox 12">
+            <a:extLst>
+              <a:ext uri="{FF2B5EF4-FFF2-40B4-BE49-F238E27FC236}">
+                <a16:creationId xmlns:a16="http://schemas.microsoft.com/office/drawing/2014/main" id="{CB9CFEEB-613D-4ADB-AB7E-7E2D4DA2BB5E}"/>
+              </a:ext>
+            </a:extLst>
+          </p:cNvPr>
+          <p:cNvSpPr txBox="1"/>
+          <p:nvPr/>
+        </p:nvSpPr>
+        <p:spPr>
+          <a:xfrm>
+            <a:off x="144779" y="5815591"/>
+            <a:ext cx="11902439" cy="584775"/>
+          </a:xfrm>
+          <a:prstGeom prst="rect">
+            <a:avLst/>
+          </a:prstGeom>
+          <a:noFill/>
+          <a:ln>
+            <a:noFill/>
+          </a:ln>
+        </p:spPr>
+        <p:txBody>
+          <a:bodyPr wrap="square" rtlCol="0" anchor="ctr">
+            <a:spAutoFit/>
+          </a:bodyPr>
+          <a:lstStyle/>
+          <a:p>
+            <a:pPr algn="ctr"/>
+            <a:r>
+              <a:rPr lang="en-US" sz="3200" dirty="0">
+                <a:solidFill>
+                  <a:srgbClr val="4D4E53"/>
+                </a:solidFill>
+                <a:latin typeface="Palatino Linotype" panose="02040502050505030304" pitchFamily="18" charset="0"/>
+              </a:rPr>
+              <a:t>4.3 Dryer</a:t>
+            </a:r>
+          </a:p>
+        </p:txBody>
+      </p:sp>
+      <p:sp>
+        <p:nvSpPr>
+          <p:cNvPr id="12" name="TextBox 11">
+            <a:extLst>
+              <a:ext uri="{FF2B5EF4-FFF2-40B4-BE49-F238E27FC236}">
+                <a16:creationId xmlns:a16="http://schemas.microsoft.com/office/drawing/2014/main" id="{65EFFB45-2256-41F0-B651-136B5ECC47D8}"/>
+              </a:ext>
+            </a:extLst>
+          </p:cNvPr>
+          <p:cNvSpPr txBox="1"/>
+          <p:nvPr/>
+        </p:nvSpPr>
+        <p:spPr>
+          <a:xfrm>
+            <a:off x="144780" y="3770382"/>
+            <a:ext cx="11902439" cy="1246495"/>
+          </a:xfrm>
+          <a:prstGeom prst="rect">
+            <a:avLst/>
+          </a:prstGeom>
+          <a:noFill/>
+          <a:ln>
+            <a:noFill/>
+          </a:ln>
+        </p:spPr>
+        <p:txBody>
+          <a:bodyPr wrap="square" rtlCol="0" anchor="ctr">
+            <a:spAutoFit/>
+          </a:bodyPr>
+          <a:lstStyle/>
+          <a:p>
+            <a:pPr algn="ctr"/>
+            <a:r>
+              <a:rPr lang="en-US" sz="7500" dirty="0">
+                <a:solidFill>
+                  <a:srgbClr val="B31B1B"/>
+                </a:solidFill>
+                <a:latin typeface="Franklin Gothic Heavy" panose="020B0903020102020204" pitchFamily="34" charset="0"/>
+              </a:rPr>
+              <a:t>ASPEN PLUS V11</a:t>
+            </a:r>
+          </a:p>
+        </p:txBody>
+      </p:sp>
+      <p:grpSp>
+        <p:nvGrpSpPr>
+          <p:cNvPr id="3" name="Group 2">
+            <a:extLst>
+              <a:ext uri="{FF2B5EF4-FFF2-40B4-BE49-F238E27FC236}">
+                <a16:creationId xmlns:a16="http://schemas.microsoft.com/office/drawing/2014/main" id="{15B81395-E22E-4AD0-994F-85E49604CB5E}"/>
+              </a:ext>
+            </a:extLst>
+          </p:cNvPr>
+          <p:cNvGrpSpPr/>
+          <p:nvPr/>
+        </p:nvGrpSpPr>
+        <p:grpSpPr>
+          <a:xfrm>
+            <a:off x="591645" y="368734"/>
+            <a:ext cx="10803298" cy="863644"/>
+            <a:chOff x="591645" y="368734"/>
+            <a:chExt cx="10803298" cy="863644"/>
+          </a:xfrm>
+        </p:grpSpPr>
+        <p:pic>
+          <p:nvPicPr>
+            <p:cNvPr id="5" name="Picture 4">
+              <a:extLst>
+                <a:ext uri="{FF2B5EF4-FFF2-40B4-BE49-F238E27FC236}">
+                  <a16:creationId xmlns:a16="http://schemas.microsoft.com/office/drawing/2014/main" id="{F685A961-0326-493A-8B03-8FB4C1C0458C}"/>
+                </a:ext>
+              </a:extLst>
+            </p:cNvPr>
+            <p:cNvPicPr>
+              <a:picLocks noChangeAspect="1"/>
+            </p:cNvPicPr>
+            <p:nvPr/>
+          </p:nvPicPr>
+          <p:blipFill>
+            <a:blip r:embed="rId2">
+              <a:extLst>
+                <a:ext uri="{28A0092B-C50C-407E-A947-70E740481C1C}">
+                  <a14:useLocalDpi xmlns:a14="http://schemas.microsoft.com/office/drawing/2010/main" val="0"/>
+                </a:ext>
+              </a:extLst>
+            </a:blip>
+            <a:stretch>
+              <a:fillRect/>
+            </a:stretch>
+          </p:blipFill>
+          <p:spPr>
+            <a:xfrm>
+              <a:off x="1570988" y="368734"/>
+              <a:ext cx="9823955" cy="863644"/>
+            </a:xfrm>
+            <a:prstGeom prst="rect">
+              <a:avLst/>
+            </a:prstGeom>
+          </p:spPr>
+        </p:pic>
+        <p:pic>
+          <p:nvPicPr>
+            <p:cNvPr id="16" name="Picture 4">
+              <a:extLst>
+                <a:ext uri="{FF2B5EF4-FFF2-40B4-BE49-F238E27FC236}">
+                  <a16:creationId xmlns:a16="http://schemas.microsoft.com/office/drawing/2014/main" id="{8EEF5CFD-BE3B-4325-813E-0FE18760F972}"/>
+                </a:ext>
+              </a:extLst>
+            </p:cNvPr>
+            <p:cNvPicPr>
+              <a:picLocks noChangeAspect="1" noChangeArrowheads="1"/>
+            </p:cNvPicPr>
+            <p:nvPr/>
+          </p:nvPicPr>
+          <p:blipFill>
+            <a:blip r:embed="rId3">
+              <a:extLst>
+                <a:ext uri="{28A0092B-C50C-407E-A947-70E740481C1C}">
+                  <a14:useLocalDpi xmlns:a14="http://schemas.microsoft.com/office/drawing/2010/main" val="0"/>
+                </a:ext>
+              </a:extLst>
+            </a:blip>
+            <a:srcRect/>
+            <a:stretch>
+              <a:fillRect/>
+            </a:stretch>
+          </p:blipFill>
+          <p:spPr bwMode="auto">
+            <a:xfrm>
+              <a:off x="591645" y="420022"/>
+              <a:ext cx="709904" cy="690562"/>
+            </a:xfrm>
+            <a:prstGeom prst="rect">
+              <a:avLst/>
+            </a:prstGeom>
+            <a:noFill/>
+            <a:extLst>
+              <a:ext uri="{909E8E84-426E-40DD-AFC4-6F175D3DCCD1}">
+                <a14:hiddenFill xmlns:a14="http://schemas.microsoft.com/office/drawing/2010/main">
+                  <a:solidFill>
+                    <a:srgbClr val="FFFFFF"/>
+                  </a:solidFill>
+                </a14:hiddenFill>
+              </a:ext>
+            </a:extLst>
+          </p:spPr>
+        </p:pic>
+      </p:grpSp>
+      <p:pic>
+        <p:nvPicPr>
+          <p:cNvPr id="4100" name="Picture 4" descr="Intellectual Property Officer, Center for Technology Licensing at Cornell  University - Vortechs Group">
+            <a:extLst>
+              <a:ext uri="{FF2B5EF4-FFF2-40B4-BE49-F238E27FC236}">
+                <a16:creationId xmlns:a16="http://schemas.microsoft.com/office/drawing/2014/main" id="{0609AFD2-FFE2-40E9-91D2-CAD7E959791C}"/>
+              </a:ext>
+            </a:extLst>
+          </p:cNvPr>
+          <p:cNvPicPr>
+            <a:picLocks noChangeAspect="1" noChangeArrowheads="1"/>
+          </p:cNvPicPr>
+          <p:nvPr/>
+        </p:nvPicPr>
+        <p:blipFill>
+          <a:blip r:embed="rId4">
+            <a:extLst>
+              <a:ext uri="{28A0092B-C50C-407E-A947-70E740481C1C}">
+                <a14:useLocalDpi xmlns:a14="http://schemas.microsoft.com/office/drawing/2010/main" val="0"/>
+              </a:ext>
+            </a:extLst>
+          </a:blip>
+          <a:srcRect/>
+          <a:stretch>
+            <a:fillRect/>
+          </a:stretch>
+        </p:blipFill>
+        <p:spPr bwMode="auto">
+          <a:xfrm>
+            <a:off x="4046773" y="1451142"/>
+            <a:ext cx="4022254" cy="2262518"/>
+          </a:xfrm>
+          <a:prstGeom prst="rect">
+            <a:avLst/>
+          </a:prstGeom>
+          <a:noFill/>
+          <a:extLst>
+            <a:ext uri="{909E8E84-426E-40DD-AFC4-6F175D3DCCD1}">
+              <a14:hiddenFill xmlns:a14="http://schemas.microsoft.com/office/drawing/2010/main">
+                <a:solidFill>
+                  <a:srgbClr val="FFFFFF"/>
+                </a:solidFill>
+              </a14:hiddenFill>
+            </a:ext>
+          </a:extLst>
+        </p:spPr>
+      </p:pic>
+    </p:spTree>
+    <p:extLst>
+      <p:ext uri="{BB962C8B-B14F-4D97-AF65-F5344CB8AC3E}">
+        <p14:creationId xmlns:p14="http://schemas.microsoft.com/office/powerpoint/2010/main" val="422364884"/>
+      </p:ext>
+    </p:extLst>
+  </p:cSld>
+  <p:clrMapOvr>
+    <a:masterClrMapping/>
+  </p:clrMapOvr>
+</p:sld>
+</file>
+
+<file path=ppt/slides/slide9.xml><?xml version="1.0" encoding="utf-8"?>
+<p:sld xmlns:a="http://schemas.openxmlformats.org/drawingml/2006/main" xmlns:r="http://schemas.openxmlformats.org/officeDocument/2006/relationships" xmlns:p="http://schemas.openxmlformats.org/presentationml/2006/main">
+  <p:cSld>
+    <p:spTree>
+      <p:nvGrpSpPr>
+        <p:cNvPr id="1" name=""/>
+        <p:cNvGrpSpPr/>
+        <p:nvPr/>
+      </p:nvGrpSpPr>
+      <p:grpSpPr>
+        <a:xfrm>
+          <a:off x="0" y="0"/>
+          <a:ext cx="0" cy="0"/>
+          <a:chOff x="0" y="0"/>
+          <a:chExt cx="0" cy="0"/>
+        </a:xfrm>
+      </p:grpSpPr>
+      <p:sp>
+        <p:nvSpPr>
+          <p:cNvPr id="2" name="Title 1">
+            <a:extLst>
+              <a:ext uri="{FF2B5EF4-FFF2-40B4-BE49-F238E27FC236}">
+                <a16:creationId xmlns:a16="http://schemas.microsoft.com/office/drawing/2014/main" id="{EAEE2CE1-2F3B-4DFE-BF38-6E2208CF6BC3}"/>
+              </a:ext>
+            </a:extLst>
+          </p:cNvPr>
+          <p:cNvSpPr>
+            <a:spLocks noGrp="1"/>
+          </p:cNvSpPr>
+          <p:nvPr>
+            <p:ph type="ctrTitle"/>
+          </p:nvPr>
+        </p:nvSpPr>
+        <p:spPr>
+          <a:xfrm>
+            <a:off x="144779" y="4786090"/>
+            <a:ext cx="11902439" cy="1246495"/>
+          </a:xfrm>
+          <a:ln>
+            <a:noFill/>
+          </a:ln>
+        </p:spPr>
+        <p:txBody>
+          <a:bodyPr anchor="ctr">
+            <a:noAutofit/>
+          </a:bodyPr>
+          <a:lstStyle/>
+          <a:p>
+            <a:r>
+              <a:rPr lang="en-US" sz="4400" dirty="0">
+                <a:latin typeface="Franklin Gothic Demi" panose="020B0703020102020204" pitchFamily="34" charset="0"/>
+              </a:rPr>
+              <a:t>Chapter 4: Solids and Solid Separators</a:t>
+            </a:r>
+          </a:p>
+        </p:txBody>
+      </p:sp>
+      <p:sp>
+        <p:nvSpPr>
+          <p:cNvPr id="13" name="TextBox 12">
+            <a:extLst>
+              <a:ext uri="{FF2B5EF4-FFF2-40B4-BE49-F238E27FC236}">
+                <a16:creationId xmlns:a16="http://schemas.microsoft.com/office/drawing/2014/main" id="{CB9CFEEB-613D-4ADB-AB7E-7E2D4DA2BB5E}"/>
+              </a:ext>
+            </a:extLst>
+          </p:cNvPr>
+          <p:cNvSpPr txBox="1"/>
+          <p:nvPr/>
+        </p:nvSpPr>
+        <p:spPr>
+          <a:xfrm>
+            <a:off x="144779" y="5815591"/>
+            <a:ext cx="11902439" cy="584775"/>
+          </a:xfrm>
+          <a:prstGeom prst="rect">
+            <a:avLst/>
+          </a:prstGeom>
+          <a:noFill/>
+          <a:ln>
+            <a:noFill/>
+          </a:ln>
+        </p:spPr>
+        <p:txBody>
+          <a:bodyPr wrap="square" rtlCol="0" anchor="ctr">
+            <a:spAutoFit/>
+          </a:bodyPr>
+          <a:lstStyle/>
+          <a:p>
+            <a:pPr algn="ctr"/>
+            <a:r>
+              <a:rPr lang="en-US" sz="3200" dirty="0">
+                <a:solidFill>
+                  <a:srgbClr val="4D4E53"/>
+                </a:solidFill>
+                <a:latin typeface="Palatino Linotype" panose="02040502050505030304" pitchFamily="18" charset="0"/>
+              </a:rPr>
+              <a:t>4.4 Filtration</a:t>
+            </a:r>
+          </a:p>
+        </p:txBody>
+      </p:sp>
+      <p:sp>
+        <p:nvSpPr>
+          <p:cNvPr id="12" name="TextBox 11">
+            <a:extLst>
+              <a:ext uri="{FF2B5EF4-FFF2-40B4-BE49-F238E27FC236}">
+                <a16:creationId xmlns:a16="http://schemas.microsoft.com/office/drawing/2014/main" id="{65EFFB45-2256-41F0-B651-136B5ECC47D8}"/>
+              </a:ext>
+            </a:extLst>
+          </p:cNvPr>
+          <p:cNvSpPr txBox="1"/>
+          <p:nvPr/>
+        </p:nvSpPr>
+        <p:spPr>
+          <a:xfrm>
+            <a:off x="144780" y="3770382"/>
+            <a:ext cx="11902439" cy="1246495"/>
+          </a:xfrm>
+          <a:prstGeom prst="rect">
+            <a:avLst/>
+          </a:prstGeom>
+          <a:noFill/>
+          <a:ln>
+            <a:noFill/>
+          </a:ln>
+        </p:spPr>
+        <p:txBody>
+          <a:bodyPr wrap="square" rtlCol="0" anchor="ctr">
+            <a:spAutoFit/>
+          </a:bodyPr>
+          <a:lstStyle/>
+          <a:p>
+            <a:pPr algn="ctr"/>
+            <a:r>
+              <a:rPr lang="en-US" sz="7500" dirty="0">
+                <a:solidFill>
+                  <a:srgbClr val="B31B1B"/>
+                </a:solidFill>
+                <a:latin typeface="Franklin Gothic Heavy" panose="020B0903020102020204" pitchFamily="34" charset="0"/>
+              </a:rPr>
+              <a:t>ASPEN PLUS V11</a:t>
+            </a:r>
+          </a:p>
+        </p:txBody>
+      </p:sp>
+      <p:grpSp>
+        <p:nvGrpSpPr>
+          <p:cNvPr id="3" name="Group 2">
+            <a:extLst>
+              <a:ext uri="{FF2B5EF4-FFF2-40B4-BE49-F238E27FC236}">
+                <a16:creationId xmlns:a16="http://schemas.microsoft.com/office/drawing/2014/main" id="{15B81395-E22E-4AD0-994F-85E49604CB5E}"/>
+              </a:ext>
+            </a:extLst>
+          </p:cNvPr>
+          <p:cNvGrpSpPr/>
+          <p:nvPr/>
+        </p:nvGrpSpPr>
+        <p:grpSpPr>
+          <a:xfrm>
+            <a:off x="591645" y="368734"/>
+            <a:ext cx="10803298" cy="863644"/>
+            <a:chOff x="591645" y="368734"/>
+            <a:chExt cx="10803298" cy="863644"/>
+          </a:xfrm>
+        </p:grpSpPr>
+        <p:pic>
+          <p:nvPicPr>
+            <p:cNvPr id="5" name="Picture 4">
+              <a:extLst>
+                <a:ext uri="{FF2B5EF4-FFF2-40B4-BE49-F238E27FC236}">
+                  <a16:creationId xmlns:a16="http://schemas.microsoft.com/office/drawing/2014/main" id="{F685A961-0326-493A-8B03-8FB4C1C0458C}"/>
+                </a:ext>
+              </a:extLst>
+            </p:cNvPr>
+            <p:cNvPicPr>
+              <a:picLocks noChangeAspect="1"/>
+            </p:cNvPicPr>
+            <p:nvPr/>
+          </p:nvPicPr>
+          <p:blipFill>
+            <a:blip r:embed="rId2">
+              <a:extLst>
+                <a:ext uri="{28A0092B-C50C-407E-A947-70E740481C1C}">
+                  <a14:useLocalDpi xmlns:a14="http://schemas.microsoft.com/office/drawing/2010/main" val="0"/>
+                </a:ext>
+              </a:extLst>
+            </a:blip>
+            <a:stretch>
+              <a:fillRect/>
+            </a:stretch>
+          </p:blipFill>
+          <p:spPr>
+            <a:xfrm>
+              <a:off x="1570988" y="368734"/>
+              <a:ext cx="9823955" cy="863644"/>
+            </a:xfrm>
+            <a:prstGeom prst="rect">
+              <a:avLst/>
+            </a:prstGeom>
+          </p:spPr>
+        </p:pic>
+        <p:pic>
+          <p:nvPicPr>
+            <p:cNvPr id="16" name="Picture 4">
+              <a:extLst>
+                <a:ext uri="{FF2B5EF4-FFF2-40B4-BE49-F238E27FC236}">
+                  <a16:creationId xmlns:a16="http://schemas.microsoft.com/office/drawing/2014/main" id="{8EEF5CFD-BE3B-4325-813E-0FE18760F972}"/>
+                </a:ext>
+              </a:extLst>
+            </p:cNvPr>
+            <p:cNvPicPr>
+              <a:picLocks noChangeAspect="1" noChangeArrowheads="1"/>
+            </p:cNvPicPr>
+            <p:nvPr/>
+          </p:nvPicPr>
+          <p:blipFill>
+            <a:blip r:embed="rId3">
+              <a:extLst>
+                <a:ext uri="{28A0092B-C50C-407E-A947-70E740481C1C}">
+                  <a14:useLocalDpi xmlns:a14="http://schemas.microsoft.com/office/drawing/2010/main" val="0"/>
+                </a:ext>
+              </a:extLst>
+            </a:blip>
+            <a:srcRect/>
+            <a:stretch>
+              <a:fillRect/>
+            </a:stretch>
+          </p:blipFill>
+          <p:spPr bwMode="auto">
+            <a:xfrm>
+              <a:off x="591645" y="420022"/>
+              <a:ext cx="709904" cy="690562"/>
+            </a:xfrm>
+            <a:prstGeom prst="rect">
+              <a:avLst/>
+            </a:prstGeom>
+            <a:noFill/>
+            <a:extLst>
+              <a:ext uri="{909E8E84-426E-40DD-AFC4-6F175D3DCCD1}">
+                <a14:hiddenFill xmlns:a14="http://schemas.microsoft.com/office/drawing/2010/main">
+                  <a:solidFill>
+                    <a:srgbClr val="FFFFFF"/>
+                  </a:solidFill>
+                </a14:hiddenFill>
+              </a:ext>
+            </a:extLst>
+          </p:spPr>
+        </p:pic>
+      </p:grpSp>
+      <p:pic>
+        <p:nvPicPr>
+          <p:cNvPr id="4100" name="Picture 4" descr="Intellectual Property Officer, Center for Technology Licensing at Cornell  University - Vortechs Group">
+            <a:extLst>
+              <a:ext uri="{FF2B5EF4-FFF2-40B4-BE49-F238E27FC236}">
+                <a16:creationId xmlns:a16="http://schemas.microsoft.com/office/drawing/2014/main" id="{0609AFD2-FFE2-40E9-91D2-CAD7E959791C}"/>
+              </a:ext>
+            </a:extLst>
+          </p:cNvPr>
+          <p:cNvPicPr>
+            <a:picLocks noChangeAspect="1" noChangeArrowheads="1"/>
+          </p:cNvPicPr>
+          <p:nvPr/>
+        </p:nvPicPr>
+        <p:blipFill>
+          <a:blip r:embed="rId4">
+            <a:extLst>
+              <a:ext uri="{28A0092B-C50C-407E-A947-70E740481C1C}">
+                <a14:useLocalDpi xmlns:a14="http://schemas.microsoft.com/office/drawing/2010/main" val="0"/>
+              </a:ext>
+            </a:extLst>
+          </a:blip>
+          <a:srcRect/>
+          <a:stretch>
+            <a:fillRect/>
+          </a:stretch>
+        </p:blipFill>
+        <p:spPr bwMode="auto">
+          <a:xfrm>
+            <a:off x="4046773" y="1451142"/>
+            <a:ext cx="4022254" cy="2262518"/>
+          </a:xfrm>
+          <a:prstGeom prst="rect">
+            <a:avLst/>
+          </a:prstGeom>
+          <a:noFill/>
+          <a:extLst>
+            <a:ext uri="{909E8E84-426E-40DD-AFC4-6F175D3DCCD1}">
+              <a14:hiddenFill xmlns:a14="http://schemas.microsoft.com/office/drawing/2010/main">
+                <a:solidFill>
+                  <a:srgbClr val="FFFFFF"/>
+                </a:solidFill>
+              </a14:hiddenFill>
+            </a:ext>
+          </a:extLst>
+        </p:spPr>
+      </p:pic>
+    </p:spTree>
+    <p:extLst>
+      <p:ext uri="{BB962C8B-B14F-4D97-AF65-F5344CB8AC3E}">
+        <p14:creationId xmlns:p14="http://schemas.microsoft.com/office/powerpoint/2010/main" val="1659431757"/>
       </p:ext>
     </p:extLst>
   </p:cSld>

</xml_diff>